<commit_message>
Updated anchor example in ResizeLab
</commit_message>
<xml_diff>
--- a/doc/Examples-ResizeLab.pptx
+++ b/doc/Examples-ResizeLab.pptx
@@ -5,7 +5,7 @@
     <p:sldMasterId id="2147483648" r:id="rId1"/>
   </p:sldMasterIdLst>
   <p:notesMasterIdLst>
-    <p:notesMasterId r:id="rId34"/>
+    <p:notesMasterId r:id="rId33"/>
   </p:notesMasterIdLst>
   <p:sldIdLst>
     <p:sldId id="257" r:id="rId2"/>
@@ -37,9 +37,8 @@
     <p:sldId id="286" r:id="rId28"/>
     <p:sldId id="264" r:id="rId29"/>
     <p:sldId id="289" r:id="rId30"/>
-    <p:sldId id="294" r:id="rId31"/>
-    <p:sldId id="297" r:id="rId32"/>
-    <p:sldId id="295" r:id="rId33"/>
+    <p:sldId id="297" r:id="rId31"/>
+    <p:sldId id="295" r:id="rId32"/>
   </p:sldIdLst>
   <p:sldSz cx="12192000" cy="6858000"/>
   <p:notesSz cx="6858000" cy="9144000"/>
@@ -200,7 +199,6 @@
           <p14:sldIdLst>
             <p14:sldId id="264"/>
             <p14:sldId id="289"/>
-            <p14:sldId id="294"/>
             <p14:sldId id="297"/>
             <p14:sldId id="295"/>
           </p14:sldIdLst>
@@ -296,7 +294,7 @@
           <a:p>
             <a:fld id="{2E15B72F-BDD6-4BDE-B5F4-C2835099BBE8}" type="datetimeFigureOut">
               <a:rPr lang="en-US" smtClean="0"/>
-              <a:t>4/9/2016</a:t>
+              <a:t>4/10/2016</a:t>
             </a:fld>
             <a:endParaRPr lang="en-US"/>
           </a:p>
@@ -729,11 +727,7 @@
             </a:pPr>
             <a:r>
               <a:rPr lang="en-US" baseline="0" dirty="0" smtClean="0"/>
-              <a:t>Anchor </a:t>
-            </a:r>
-            <a:r>
-              <a:rPr lang="en-US" baseline="0" dirty="0" smtClean="0"/>
-              <a:t>bottom center</a:t>
+              <a:t>Anchor bottom center</a:t>
             </a:r>
           </a:p>
           <a:p>
@@ -1556,94 +1550,6 @@
             <a:fld id="{8DDA7B7D-E3F5-4D53-89CF-3B4F50F91877}" type="slidenum">
               <a:rPr lang="en-US" smtClean="0"/>
               <a:t>30</a:t>
-            </a:fld>
-            <a:endParaRPr lang="en-US"/>
-          </a:p>
-        </p:txBody>
-      </p:sp>
-    </p:spTree>
-    <p:extLst>
-      <p:ext uri="{BB962C8B-B14F-4D97-AF65-F5344CB8AC3E}">
-        <p14:creationId xmlns:p14="http://schemas.microsoft.com/office/powerpoint/2010/main" val="3631325048"/>
-      </p:ext>
-    </p:extLst>
-  </p:cSld>
-  <p:clrMapOvr>
-    <a:masterClrMapping/>
-  </p:clrMapOvr>
-</p:notes>
-</file>
-
-<file path=ppt/notesSlides/notesSlide19.xml><?xml version="1.0" encoding="utf-8"?>
-<p:notes xmlns:a="http://schemas.openxmlformats.org/drawingml/2006/main" xmlns:r="http://schemas.openxmlformats.org/officeDocument/2006/relationships" xmlns:p="http://schemas.openxmlformats.org/presentationml/2006/main">
-  <p:cSld>
-    <p:spTree>
-      <p:nvGrpSpPr>
-        <p:cNvPr id="1" name=""/>
-        <p:cNvGrpSpPr/>
-        <p:nvPr/>
-      </p:nvGrpSpPr>
-      <p:grpSpPr>
-        <a:xfrm>
-          <a:off x="0" y="0"/>
-          <a:ext cx="0" cy="0"/>
-          <a:chOff x="0" y="0"/>
-          <a:chExt cx="0" cy="0"/>
-        </a:xfrm>
-      </p:grpSpPr>
-      <p:sp>
-        <p:nvSpPr>
-          <p:cNvPr id="2" name="Slide Image Placeholder 1"/>
-          <p:cNvSpPr>
-            <a:spLocks noGrp="1" noRot="1" noChangeAspect="1"/>
-          </p:cNvSpPr>
-          <p:nvPr>
-            <p:ph type="sldImg"/>
-          </p:nvPr>
-        </p:nvSpPr>
-        <p:spPr/>
-      </p:sp>
-      <p:sp>
-        <p:nvSpPr>
-          <p:cNvPr id="3" name="Notes Placeholder 2"/>
-          <p:cNvSpPr>
-            <a:spLocks noGrp="1"/>
-          </p:cNvSpPr>
-          <p:nvPr>
-            <p:ph type="body" idx="1"/>
-          </p:nvPr>
-        </p:nvSpPr>
-        <p:spPr/>
-        <p:txBody>
-          <a:bodyPr/>
-          <a:lstStyle/>
-          <a:p>
-            <a:pPr marL="0" indent="0">
-              <a:buFont typeface="Arial" panose="020B0604020202020204" pitchFamily="34" charset="0"/>
-              <a:buNone/>
-            </a:pPr>
-            <a:endParaRPr lang="en-US" dirty="0"/>
-          </a:p>
-        </p:txBody>
-      </p:sp>
-      <p:sp>
-        <p:nvSpPr>
-          <p:cNvPr id="4" name="Slide Number Placeholder 3"/>
-          <p:cNvSpPr>
-            <a:spLocks noGrp="1"/>
-          </p:cNvSpPr>
-          <p:nvPr>
-            <p:ph type="sldNum" sz="quarter" idx="10"/>
-          </p:nvPr>
-        </p:nvSpPr>
-        <p:spPr/>
-        <p:txBody>
-          <a:bodyPr/>
-          <a:lstStyle/>
-          <a:p>
-            <a:fld id="{8DDA7B7D-E3F5-4D53-89CF-3B4F50F91877}" type="slidenum">
-              <a:rPr lang="en-US" smtClean="0"/>
-              <a:t>31</a:t>
             </a:fld>
             <a:endParaRPr lang="en-US"/>
           </a:p>
@@ -2847,7 +2753,7 @@
           <a:p>
             <a:fld id="{D5753E2F-842D-4479-8A88-7B79949A13DE}" type="datetimeFigureOut">
               <a:rPr lang="en-US" smtClean="0"/>
-              <a:t>4/9/2016</a:t>
+              <a:t>4/10/2016</a:t>
             </a:fld>
             <a:endParaRPr lang="en-US"/>
           </a:p>
@@ -3017,7 +2923,7 @@
           <a:p>
             <a:fld id="{D5753E2F-842D-4479-8A88-7B79949A13DE}" type="datetimeFigureOut">
               <a:rPr lang="en-US" smtClean="0"/>
-              <a:t>4/9/2016</a:t>
+              <a:t>4/10/2016</a:t>
             </a:fld>
             <a:endParaRPr lang="en-US"/>
           </a:p>
@@ -3197,7 +3103,7 @@
           <a:p>
             <a:fld id="{D5753E2F-842D-4479-8A88-7B79949A13DE}" type="datetimeFigureOut">
               <a:rPr lang="en-US" smtClean="0"/>
-              <a:t>4/9/2016</a:t>
+              <a:t>4/10/2016</a:t>
             </a:fld>
             <a:endParaRPr lang="en-US"/>
           </a:p>
@@ -3367,7 +3273,7 @@
           <a:p>
             <a:fld id="{D5753E2F-842D-4479-8A88-7B79949A13DE}" type="datetimeFigureOut">
               <a:rPr lang="en-US" smtClean="0"/>
-              <a:t>4/9/2016</a:t>
+              <a:t>4/10/2016</a:t>
             </a:fld>
             <a:endParaRPr lang="en-US"/>
           </a:p>
@@ -3613,7 +3519,7 @@
           <a:p>
             <a:fld id="{D5753E2F-842D-4479-8A88-7B79949A13DE}" type="datetimeFigureOut">
               <a:rPr lang="en-US" smtClean="0"/>
-              <a:t>4/9/2016</a:t>
+              <a:t>4/10/2016</a:t>
             </a:fld>
             <a:endParaRPr lang="en-US"/>
           </a:p>
@@ -3845,7 +3751,7 @@
           <a:p>
             <a:fld id="{D5753E2F-842D-4479-8A88-7B79949A13DE}" type="datetimeFigureOut">
               <a:rPr lang="en-US" smtClean="0"/>
-              <a:t>4/9/2016</a:t>
+              <a:t>4/10/2016</a:t>
             </a:fld>
             <a:endParaRPr lang="en-US"/>
           </a:p>
@@ -4212,7 +4118,7 @@
           <a:p>
             <a:fld id="{D5753E2F-842D-4479-8A88-7B79949A13DE}" type="datetimeFigureOut">
               <a:rPr lang="en-US" smtClean="0"/>
-              <a:t>4/9/2016</a:t>
+              <a:t>4/10/2016</a:t>
             </a:fld>
             <a:endParaRPr lang="en-US"/>
           </a:p>
@@ -4330,7 +4236,7 @@
           <a:p>
             <a:fld id="{D5753E2F-842D-4479-8A88-7B79949A13DE}" type="datetimeFigureOut">
               <a:rPr lang="en-US" smtClean="0"/>
-              <a:t>4/9/2016</a:t>
+              <a:t>4/10/2016</a:t>
             </a:fld>
             <a:endParaRPr lang="en-US"/>
           </a:p>
@@ -4425,7 +4331,7 @@
           <a:p>
             <a:fld id="{D5753E2F-842D-4479-8A88-7B79949A13DE}" type="datetimeFigureOut">
               <a:rPr lang="en-US" smtClean="0"/>
-              <a:t>4/9/2016</a:t>
+              <a:t>4/10/2016</a:t>
             </a:fld>
             <a:endParaRPr lang="en-US"/>
           </a:p>
@@ -4702,7 +4608,7 @@
           <a:p>
             <a:fld id="{D5753E2F-842D-4479-8A88-7B79949A13DE}" type="datetimeFigureOut">
               <a:rPr lang="en-US" smtClean="0"/>
-              <a:t>4/9/2016</a:t>
+              <a:t>4/10/2016</a:t>
             </a:fld>
             <a:endParaRPr lang="en-US"/>
           </a:p>
@@ -4955,7 +4861,7 @@
           <a:p>
             <a:fld id="{D5753E2F-842D-4479-8A88-7B79949A13DE}" type="datetimeFigureOut">
               <a:rPr lang="en-US" smtClean="0"/>
-              <a:t>4/9/2016</a:t>
+              <a:t>4/10/2016</a:t>
             </a:fld>
             <a:endParaRPr lang="en-US"/>
           </a:p>
@@ -5168,7 +5074,7 @@
           <a:p>
             <a:fld id="{D5753E2F-842D-4479-8A88-7B79949A13DE}" type="datetimeFigureOut">
               <a:rPr lang="en-US" smtClean="0"/>
-              <a:t>4/9/2016</a:t>
+              <a:t>4/10/2016</a:t>
             </a:fld>
             <a:endParaRPr lang="en-US"/>
           </a:p>
@@ -13175,7 +13081,7 @@
         </p:nvCxnSpPr>
         <p:spPr>
           <a:xfrm>
-            <a:off x="615672" y="3658153"/>
+            <a:off x="-625315" y="3658153"/>
             <a:ext cx="0" cy="968535"/>
           </a:xfrm>
           <a:prstGeom prst="straightConnector1">
@@ -13213,7 +13119,7 @@
         </p:nvCxnSpPr>
         <p:spPr>
           <a:xfrm>
-            <a:off x="1981672" y="3658153"/>
+            <a:off x="895809" y="3658153"/>
             <a:ext cx="0" cy="968535"/>
           </a:xfrm>
           <a:prstGeom prst="straightConnector1">
@@ -13251,7 +13157,7 @@
         </p:nvCxnSpPr>
         <p:spPr>
           <a:xfrm>
-            <a:off x="3347672" y="3658153"/>
+            <a:off x="2416932" y="3658153"/>
             <a:ext cx="0" cy="968535"/>
           </a:xfrm>
           <a:prstGeom prst="straightConnector1">
@@ -13289,7 +13195,7 @@
         </p:nvCxnSpPr>
         <p:spPr>
           <a:xfrm>
-            <a:off x="4713672" y="3658153"/>
+            <a:off x="3938056" y="3658153"/>
             <a:ext cx="0" cy="968535"/>
           </a:xfrm>
           <a:prstGeom prst="straightConnector1">
@@ -13327,7 +13233,7 @@
         </p:nvCxnSpPr>
         <p:spPr>
           <a:xfrm>
-            <a:off x="6079672" y="3658153"/>
+            <a:off x="5459180" y="3658153"/>
             <a:ext cx="0" cy="968535"/>
           </a:xfrm>
           <a:prstGeom prst="straightConnector1">
@@ -13365,7 +13271,7 @@
         </p:nvCxnSpPr>
         <p:spPr>
           <a:xfrm>
-            <a:off x="7445673" y="3658153"/>
+            <a:off x="6980304" y="3658153"/>
             <a:ext cx="0" cy="968535"/>
           </a:xfrm>
           <a:prstGeom prst="straightConnector1">
@@ -13403,7 +13309,7 @@
         </p:nvCxnSpPr>
         <p:spPr>
           <a:xfrm>
-            <a:off x="8811673" y="3658153"/>
+            <a:off x="8501428" y="3658153"/>
             <a:ext cx="0" cy="968535"/>
           </a:xfrm>
           <a:prstGeom prst="straightConnector1">
@@ -13441,7 +13347,7 @@
         </p:nvCxnSpPr>
         <p:spPr>
           <a:xfrm>
-            <a:off x="10177673" y="3658153"/>
+            <a:off x="10022551" y="3658153"/>
             <a:ext cx="0" cy="968535"/>
           </a:xfrm>
           <a:prstGeom prst="straightConnector1">
@@ -13481,8 +13387,8 @@
         </p:nvCxnSpPr>
         <p:spPr>
           <a:xfrm flipH="1">
-            <a:off x="615672" y="1690688"/>
-            <a:ext cx="5480328" cy="1185433"/>
+            <a:off x="-625315" y="1690688"/>
+            <a:ext cx="6721315" cy="1185433"/>
           </a:xfrm>
           <a:prstGeom prst="straightConnector1">
             <a:avLst/>
@@ -13521,8 +13427,8 @@
         </p:nvCxnSpPr>
         <p:spPr>
           <a:xfrm flipH="1">
-            <a:off x="1981672" y="1690688"/>
-            <a:ext cx="4114328" cy="1185433"/>
+            <a:off x="895809" y="1690688"/>
+            <a:ext cx="5200191" cy="1185433"/>
           </a:xfrm>
           <a:prstGeom prst="straightConnector1">
             <a:avLst/>
@@ -13561,8 +13467,8 @@
         </p:nvCxnSpPr>
         <p:spPr>
           <a:xfrm flipH="1">
-            <a:off x="3347672" y="1690688"/>
-            <a:ext cx="2748328" cy="1185433"/>
+            <a:off x="2416933" y="1690688"/>
+            <a:ext cx="3679067" cy="1185433"/>
           </a:xfrm>
           <a:prstGeom prst="straightConnector1">
             <a:avLst/>
@@ -13601,8 +13507,8 @@
         </p:nvCxnSpPr>
         <p:spPr>
           <a:xfrm flipH="1">
-            <a:off x="4713672" y="1690688"/>
-            <a:ext cx="1382328" cy="1185433"/>
+            <a:off x="3938057" y="1690688"/>
+            <a:ext cx="2157943" cy="1185433"/>
           </a:xfrm>
           <a:prstGeom prst="straightConnector1">
             <a:avLst/>
@@ -13641,8 +13547,8 @@
         </p:nvCxnSpPr>
         <p:spPr>
           <a:xfrm flipH="1">
-            <a:off x="6079672" y="1690688"/>
-            <a:ext cx="16328" cy="1185433"/>
+            <a:off x="5459181" y="1690688"/>
+            <a:ext cx="636819" cy="1185433"/>
           </a:xfrm>
           <a:prstGeom prst="straightConnector1">
             <a:avLst/>
@@ -13682,7 +13588,7 @@
         <p:spPr>
           <a:xfrm>
             <a:off x="6096000" y="1690688"/>
-            <a:ext cx="1349672" cy="1185433"/>
+            <a:ext cx="884303" cy="1185433"/>
           </a:xfrm>
           <a:prstGeom prst="straightConnector1">
             <a:avLst/>
@@ -13721,7 +13627,7 @@
         <p:spPr>
           <a:xfrm>
             <a:off x="6064314" y="1690688"/>
-            <a:ext cx="2747359" cy="1185433"/>
+            <a:ext cx="2437114" cy="1185433"/>
           </a:xfrm>
           <a:prstGeom prst="straightConnector1">
             <a:avLst/>
@@ -13761,7 +13667,7 @@
         <p:spPr>
           <a:xfrm>
             <a:off x="6096000" y="1690688"/>
-            <a:ext cx="4081673" cy="1185433"/>
+            <a:ext cx="3926552" cy="1185433"/>
           </a:xfrm>
           <a:prstGeom prst="straightConnector1">
             <a:avLst/>
@@ -13888,7 +13794,7 @@
         </p:blipFill>
         <p:spPr>
           <a:xfrm>
-            <a:off x="187838" y="2876121"/>
+            <a:off x="-1053149" y="2876121"/>
             <a:ext cx="855668" cy="749371"/>
           </a:xfrm>
           <a:prstGeom prst="rect">
@@ -13923,7 +13829,7 @@
         </p:blipFill>
         <p:spPr>
           <a:xfrm>
-            <a:off x="1553838" y="2876121"/>
+            <a:off x="467975" y="2876121"/>
             <a:ext cx="855668" cy="749371"/>
           </a:xfrm>
           <a:prstGeom prst="rect">
@@ -13958,7 +13864,7 @@
         </p:blipFill>
         <p:spPr>
           <a:xfrm>
-            <a:off x="2919838" y="2876121"/>
+            <a:off x="1989099" y="2876121"/>
             <a:ext cx="855668" cy="749371"/>
           </a:xfrm>
           <a:prstGeom prst="rect">
@@ -13993,7 +13899,7 @@
         </p:blipFill>
         <p:spPr>
           <a:xfrm>
-            <a:off x="4285838" y="2876121"/>
+            <a:off x="3510223" y="2876121"/>
             <a:ext cx="855668" cy="749371"/>
           </a:xfrm>
           <a:prstGeom prst="rect">
@@ -14028,7 +13934,7 @@
         </p:blipFill>
         <p:spPr>
           <a:xfrm>
-            <a:off x="5651838" y="2876121"/>
+            <a:off x="5031347" y="2876121"/>
             <a:ext cx="855668" cy="749371"/>
           </a:xfrm>
           <a:prstGeom prst="rect">
@@ -14063,7 +13969,7 @@
         </p:blipFill>
         <p:spPr>
           <a:xfrm>
-            <a:off x="7017838" y="2876121"/>
+            <a:off x="6552469" y="2876121"/>
             <a:ext cx="855668" cy="749371"/>
           </a:xfrm>
           <a:prstGeom prst="rect">
@@ -14098,7 +14004,7 @@
         </p:blipFill>
         <p:spPr>
           <a:xfrm>
-            <a:off x="8383839" y="2876121"/>
+            <a:off x="8073594" y="2876121"/>
             <a:ext cx="855668" cy="749371"/>
           </a:xfrm>
           <a:prstGeom prst="rect">
@@ -14133,7 +14039,7 @@
         </p:blipFill>
         <p:spPr>
           <a:xfrm>
-            <a:off x="9749839" y="2876121"/>
+            <a:off x="9594718" y="2876121"/>
             <a:ext cx="855668" cy="749371"/>
           </a:xfrm>
           <a:prstGeom prst="rect">
@@ -14254,2157 +14160,67 @@
           </a:p>
         </p:txBody>
       </p:sp>
-      <p:grpSp>
-        <p:nvGrpSpPr>
-          <p:cNvPr id="28" name="Group 27"/>
-          <p:cNvGrpSpPr/>
-          <p:nvPr/>
-        </p:nvGrpSpPr>
-        <p:grpSpPr>
-          <a:xfrm>
-            <a:off x="48851" y="4691547"/>
+      <p:sp>
+        <p:nvSpPr>
+          <p:cNvPr id="58" name="Rectangle 57"/>
+          <p:cNvSpPr>
+            <a:spLocks noChangeAspect="1"/>
+          </p:cNvSpPr>
+          <p:nvPr/>
+        </p:nvSpPr>
+        <p:spPr>
+          <a:xfrm>
+            <a:off x="-938136" y="5182613"/>
             <a:ext cx="1133642" cy="1133642"/>
-            <a:chOff x="198922" y="4691547"/>
-            <a:chExt cx="1133642" cy="1133642"/>
-          </a:xfrm>
-        </p:grpSpPr>
-        <p:sp>
-          <p:nvSpPr>
-            <p:cNvPr id="58" name="Rectangle 57"/>
-            <p:cNvSpPr>
-              <a:spLocks noChangeAspect="1"/>
-            </p:cNvSpPr>
-            <p:nvPr/>
-          </p:nvSpPr>
-          <p:spPr>
-            <a:xfrm>
-              <a:off x="198922" y="4691547"/>
-              <a:ext cx="1133642" cy="1133642"/>
-            </a:xfrm>
-            <a:prstGeom prst="rect">
-              <a:avLst/>
-            </a:prstGeom>
+          </a:xfrm>
+          <a:prstGeom prst="rect">
+            <a:avLst/>
+          </a:prstGeom>
+          <a:solidFill>
+            <a:srgbClr val="EA6B13"/>
+          </a:solidFill>
+          <a:ln>
             <a:solidFill>
-              <a:srgbClr val="ED7D31"/>
+              <a:srgbClr val="EE8742"/>
             </a:solidFill>
-            <a:ln>
-              <a:solidFill>
-                <a:srgbClr val="F3B082"/>
-              </a:solidFill>
-            </a:ln>
-          </p:spPr>
-          <p:style>
-            <a:lnRef idx="2">
-              <a:schemeClr val="accent1">
-                <a:shade val="50000"/>
-              </a:schemeClr>
-            </a:lnRef>
-            <a:fillRef idx="1">
-              <a:schemeClr val="accent1"/>
-            </a:fillRef>
-            <a:effectRef idx="0">
-              <a:schemeClr val="accent1"/>
-            </a:effectRef>
-            <a:fontRef idx="minor">
-              <a:schemeClr val="lt1"/>
-            </a:fontRef>
-          </p:style>
-          <p:txBody>
-            <a:bodyPr rtlCol="0" anchor="ctr"/>
-            <a:lstStyle/>
-            <a:p>
-              <a:pPr algn="ctr"/>
-              <a:endParaRPr lang="en-US"/>
-            </a:p>
-          </p:txBody>
-        </p:sp>
-        <p:sp>
-          <p:nvSpPr>
-            <p:cNvPr id="62" name="Rectangle 61"/>
-            <p:cNvSpPr>
-              <a:spLocks noChangeAspect="1"/>
-            </p:cNvSpPr>
-            <p:nvPr/>
-          </p:nvSpPr>
-          <p:spPr>
-            <a:xfrm>
-              <a:off x="198922" y="4691547"/>
-              <a:ext cx="625642" cy="625642"/>
-            </a:xfrm>
-            <a:prstGeom prst="rect">
-              <a:avLst/>
-            </a:prstGeom>
-            <a:solidFill>
-              <a:schemeClr val="accent4">
-                <a:alpha val="30000"/>
-              </a:schemeClr>
-            </a:solidFill>
-            <a:ln>
-              <a:solidFill>
-                <a:srgbClr val="F3B082"/>
-              </a:solidFill>
-              <a:prstDash val="dash"/>
-            </a:ln>
-          </p:spPr>
-          <p:style>
-            <a:lnRef idx="2">
-              <a:schemeClr val="accent1">
-                <a:shade val="50000"/>
-              </a:schemeClr>
-            </a:lnRef>
-            <a:fillRef idx="1">
-              <a:schemeClr val="accent1"/>
-            </a:fillRef>
-            <a:effectRef idx="0">
-              <a:schemeClr val="accent1"/>
-            </a:effectRef>
-            <a:fontRef idx="minor">
-              <a:schemeClr val="lt1"/>
-            </a:fontRef>
-          </p:style>
-          <p:txBody>
-            <a:bodyPr rtlCol="0" anchor="ctr"/>
-            <a:lstStyle/>
-            <a:p>
-              <a:pPr algn="ctr"/>
-              <a:endParaRPr lang="en-US"/>
-            </a:p>
-          </p:txBody>
-        </p:sp>
-      </p:grpSp>
-      <p:grpSp>
-        <p:nvGrpSpPr>
-          <p:cNvPr id="30" name="Group 29"/>
-          <p:cNvGrpSpPr/>
-          <p:nvPr/>
-        </p:nvGrpSpPr>
-        <p:grpSpPr>
-          <a:xfrm>
-            <a:off x="1414851" y="4691547"/>
-            <a:ext cx="1133642" cy="1133642"/>
-            <a:chOff x="1531486" y="4691547"/>
-            <a:chExt cx="1133642" cy="1133642"/>
-          </a:xfrm>
-        </p:grpSpPr>
-        <p:sp>
-          <p:nvSpPr>
-            <p:cNvPr id="179" name="Rectangle 178"/>
-            <p:cNvSpPr>
-              <a:spLocks noChangeAspect="1"/>
-            </p:cNvSpPr>
-            <p:nvPr/>
-          </p:nvSpPr>
-          <p:spPr>
-            <a:xfrm>
-              <a:off x="1531486" y="4691547"/>
-              <a:ext cx="1133642" cy="1133642"/>
-            </a:xfrm>
-            <a:prstGeom prst="rect">
-              <a:avLst/>
-            </a:prstGeom>
-            <a:solidFill>
-              <a:srgbClr val="ED7D31"/>
-            </a:solidFill>
-            <a:ln>
-              <a:solidFill>
-                <a:srgbClr val="F3B082"/>
-              </a:solidFill>
-            </a:ln>
-          </p:spPr>
-          <p:style>
-            <a:lnRef idx="2">
-              <a:schemeClr val="accent1">
-                <a:shade val="50000"/>
-              </a:schemeClr>
-            </a:lnRef>
-            <a:fillRef idx="1">
-              <a:schemeClr val="accent1"/>
-            </a:fillRef>
-            <a:effectRef idx="0">
-              <a:schemeClr val="accent1"/>
-            </a:effectRef>
-            <a:fontRef idx="minor">
-              <a:schemeClr val="lt1"/>
-            </a:fontRef>
-          </p:style>
-          <p:txBody>
-            <a:bodyPr rtlCol="0" anchor="ctr"/>
-            <a:lstStyle/>
-            <a:p>
-              <a:pPr algn="ctr"/>
-              <a:endParaRPr lang="en-US"/>
-            </a:p>
-          </p:txBody>
-        </p:sp>
-        <p:sp>
-          <p:nvSpPr>
-            <p:cNvPr id="180" name="Rectangle 179"/>
-            <p:cNvSpPr>
-              <a:spLocks noChangeAspect="1"/>
-            </p:cNvSpPr>
-            <p:nvPr/>
-          </p:nvSpPr>
-          <p:spPr>
-            <a:xfrm>
-              <a:off x="1785486" y="4691547"/>
-              <a:ext cx="625642" cy="625642"/>
-            </a:xfrm>
-            <a:prstGeom prst="rect">
-              <a:avLst/>
-            </a:prstGeom>
-            <a:solidFill>
-              <a:schemeClr val="accent4">
-                <a:alpha val="30000"/>
-              </a:schemeClr>
-            </a:solidFill>
-            <a:ln>
-              <a:solidFill>
-                <a:srgbClr val="F3B082"/>
-              </a:solidFill>
-              <a:prstDash val="dash"/>
-            </a:ln>
-          </p:spPr>
-          <p:style>
-            <a:lnRef idx="2">
-              <a:schemeClr val="accent1">
-                <a:shade val="50000"/>
-              </a:schemeClr>
-            </a:lnRef>
-            <a:fillRef idx="1">
-              <a:schemeClr val="accent1"/>
-            </a:fillRef>
-            <a:effectRef idx="0">
-              <a:schemeClr val="accent1"/>
-            </a:effectRef>
-            <a:fontRef idx="minor">
-              <a:schemeClr val="lt1"/>
-            </a:fontRef>
-          </p:style>
-          <p:txBody>
-            <a:bodyPr rtlCol="0" anchor="ctr"/>
-            <a:lstStyle/>
-            <a:p>
-              <a:pPr algn="ctr"/>
-              <a:endParaRPr lang="en-US"/>
-            </a:p>
-          </p:txBody>
-        </p:sp>
-      </p:grpSp>
-      <p:grpSp>
-        <p:nvGrpSpPr>
-          <p:cNvPr id="31" name="Group 30"/>
-          <p:cNvGrpSpPr/>
-          <p:nvPr/>
-        </p:nvGrpSpPr>
-        <p:grpSpPr>
-          <a:xfrm>
-            <a:off x="2780851" y="4691547"/>
-            <a:ext cx="1133642" cy="1133642"/>
-            <a:chOff x="2864050" y="4691547"/>
-            <a:chExt cx="1133642" cy="1133642"/>
-          </a:xfrm>
-        </p:grpSpPr>
-        <p:sp>
-          <p:nvSpPr>
-            <p:cNvPr id="181" name="Rectangle 180"/>
-            <p:cNvSpPr>
-              <a:spLocks noChangeAspect="1"/>
-            </p:cNvSpPr>
-            <p:nvPr/>
-          </p:nvSpPr>
-          <p:spPr>
-            <a:xfrm>
-              <a:off x="2864050" y="4691547"/>
-              <a:ext cx="1133642" cy="1133642"/>
-            </a:xfrm>
-            <a:prstGeom prst="rect">
-              <a:avLst/>
-            </a:prstGeom>
-            <a:solidFill>
-              <a:srgbClr val="ED7D31"/>
-            </a:solidFill>
-            <a:ln>
-              <a:solidFill>
-                <a:srgbClr val="F3B082"/>
-              </a:solidFill>
-            </a:ln>
-          </p:spPr>
-          <p:style>
-            <a:lnRef idx="2">
-              <a:schemeClr val="accent1">
-                <a:shade val="50000"/>
-              </a:schemeClr>
-            </a:lnRef>
-            <a:fillRef idx="1">
-              <a:schemeClr val="accent1"/>
-            </a:fillRef>
-            <a:effectRef idx="0">
-              <a:schemeClr val="accent1"/>
-            </a:effectRef>
-            <a:fontRef idx="minor">
-              <a:schemeClr val="lt1"/>
-            </a:fontRef>
-          </p:style>
-          <p:txBody>
-            <a:bodyPr rtlCol="0" anchor="ctr"/>
-            <a:lstStyle/>
-            <a:p>
-              <a:pPr algn="ctr"/>
-              <a:endParaRPr lang="en-US"/>
-            </a:p>
-          </p:txBody>
-        </p:sp>
-        <p:sp>
-          <p:nvSpPr>
-            <p:cNvPr id="182" name="Rectangle 181"/>
-            <p:cNvSpPr>
-              <a:spLocks noChangeAspect="1"/>
-            </p:cNvSpPr>
-            <p:nvPr/>
-          </p:nvSpPr>
-          <p:spPr>
-            <a:xfrm>
-              <a:off x="3372050" y="4691547"/>
-              <a:ext cx="625642" cy="625642"/>
-            </a:xfrm>
-            <a:prstGeom prst="rect">
-              <a:avLst/>
-            </a:prstGeom>
-            <a:solidFill>
-              <a:schemeClr val="accent4">
-                <a:alpha val="30000"/>
-              </a:schemeClr>
-            </a:solidFill>
-            <a:ln>
-              <a:solidFill>
-                <a:srgbClr val="F3B082"/>
-              </a:solidFill>
-              <a:prstDash val="dash"/>
-            </a:ln>
-          </p:spPr>
-          <p:style>
-            <a:lnRef idx="2">
-              <a:schemeClr val="accent1">
-                <a:shade val="50000"/>
-              </a:schemeClr>
-            </a:lnRef>
-            <a:fillRef idx="1">
-              <a:schemeClr val="accent1"/>
-            </a:fillRef>
-            <a:effectRef idx="0">
-              <a:schemeClr val="accent1"/>
-            </a:effectRef>
-            <a:fontRef idx="minor">
-              <a:schemeClr val="lt1"/>
-            </a:fontRef>
-          </p:style>
-          <p:txBody>
-            <a:bodyPr rtlCol="0" anchor="ctr"/>
-            <a:lstStyle/>
-            <a:p>
-              <a:pPr algn="ctr"/>
-              <a:endParaRPr lang="en-US"/>
-            </a:p>
-          </p:txBody>
-        </p:sp>
-      </p:grpSp>
-      <p:grpSp>
-        <p:nvGrpSpPr>
-          <p:cNvPr id="32" name="Group 31"/>
-          <p:cNvGrpSpPr/>
-          <p:nvPr/>
-        </p:nvGrpSpPr>
-        <p:grpSpPr>
-          <a:xfrm>
-            <a:off x="4146851" y="4691547"/>
-            <a:ext cx="1133642" cy="1133642"/>
-            <a:chOff x="4196615" y="4691547"/>
-            <a:chExt cx="1133642" cy="1133642"/>
-          </a:xfrm>
-        </p:grpSpPr>
-        <p:sp>
-          <p:nvSpPr>
-            <p:cNvPr id="183" name="Rectangle 182"/>
-            <p:cNvSpPr>
-              <a:spLocks noChangeAspect="1"/>
-            </p:cNvSpPr>
-            <p:nvPr/>
-          </p:nvSpPr>
-          <p:spPr>
-            <a:xfrm>
-              <a:off x="4196615" y="4691547"/>
-              <a:ext cx="1133642" cy="1133642"/>
-            </a:xfrm>
-            <a:prstGeom prst="rect">
-              <a:avLst/>
-            </a:prstGeom>
-            <a:solidFill>
-              <a:srgbClr val="ED7D31"/>
-            </a:solidFill>
-            <a:ln>
-              <a:solidFill>
-                <a:srgbClr val="F3B082"/>
-              </a:solidFill>
-            </a:ln>
-          </p:spPr>
-          <p:style>
-            <a:lnRef idx="2">
-              <a:schemeClr val="accent1">
-                <a:shade val="50000"/>
-              </a:schemeClr>
-            </a:lnRef>
-            <a:fillRef idx="1">
-              <a:schemeClr val="accent1"/>
-            </a:fillRef>
-            <a:effectRef idx="0">
-              <a:schemeClr val="accent1"/>
-            </a:effectRef>
-            <a:fontRef idx="minor">
-              <a:schemeClr val="lt1"/>
-            </a:fontRef>
-          </p:style>
-          <p:txBody>
-            <a:bodyPr rtlCol="0" anchor="ctr"/>
-            <a:lstStyle/>
-            <a:p>
-              <a:pPr algn="ctr"/>
-              <a:endParaRPr lang="en-US"/>
-            </a:p>
-          </p:txBody>
-        </p:sp>
-        <p:sp>
-          <p:nvSpPr>
-            <p:cNvPr id="184" name="Rectangle 183"/>
-            <p:cNvSpPr>
-              <a:spLocks noChangeAspect="1"/>
-            </p:cNvSpPr>
-            <p:nvPr/>
-          </p:nvSpPr>
-          <p:spPr>
-            <a:xfrm>
-              <a:off x="4196615" y="4945547"/>
-              <a:ext cx="625642" cy="625642"/>
-            </a:xfrm>
-            <a:prstGeom prst="rect">
-              <a:avLst/>
-            </a:prstGeom>
-            <a:solidFill>
-              <a:schemeClr val="accent4">
-                <a:alpha val="30000"/>
-              </a:schemeClr>
-            </a:solidFill>
-            <a:ln>
-              <a:solidFill>
-                <a:srgbClr val="F3B082"/>
-              </a:solidFill>
-              <a:prstDash val="dash"/>
-            </a:ln>
-          </p:spPr>
-          <p:style>
-            <a:lnRef idx="2">
-              <a:schemeClr val="accent1">
-                <a:shade val="50000"/>
-              </a:schemeClr>
-            </a:lnRef>
-            <a:fillRef idx="1">
-              <a:schemeClr val="accent1"/>
-            </a:fillRef>
-            <a:effectRef idx="0">
-              <a:schemeClr val="accent1"/>
-            </a:effectRef>
-            <a:fontRef idx="minor">
-              <a:schemeClr val="lt1"/>
-            </a:fontRef>
-          </p:style>
-          <p:txBody>
-            <a:bodyPr rtlCol="0" anchor="ctr"/>
-            <a:lstStyle/>
-            <a:p>
-              <a:pPr algn="ctr"/>
-              <a:endParaRPr lang="en-US"/>
-            </a:p>
-          </p:txBody>
-        </p:sp>
-      </p:grpSp>
-      <p:grpSp>
-        <p:nvGrpSpPr>
-          <p:cNvPr id="36" name="Group 35"/>
-          <p:cNvGrpSpPr>
-            <a:grpSpLocks/>
-          </p:cNvGrpSpPr>
-          <p:nvPr/>
-        </p:nvGrpSpPr>
-        <p:grpSpPr>
-          <a:xfrm>
-            <a:off x="5512851" y="4691547"/>
-            <a:ext cx="1133642" cy="1133642"/>
-            <a:chOff x="5529179" y="4691547"/>
-            <a:chExt cx="1133642" cy="1133642"/>
-          </a:xfrm>
-        </p:grpSpPr>
-        <p:sp>
-          <p:nvSpPr>
-            <p:cNvPr id="185" name="Rectangle 184"/>
-            <p:cNvSpPr>
-              <a:spLocks noChangeAspect="1"/>
-            </p:cNvSpPr>
-            <p:nvPr/>
-          </p:nvSpPr>
-          <p:spPr>
-            <a:xfrm>
-              <a:off x="5529179" y="4691547"/>
-              <a:ext cx="1133642" cy="1133642"/>
-            </a:xfrm>
-            <a:prstGeom prst="rect">
-              <a:avLst/>
-            </a:prstGeom>
-            <a:solidFill>
-              <a:srgbClr val="ED7D31"/>
-            </a:solidFill>
-            <a:ln>
-              <a:solidFill>
-                <a:srgbClr val="F3B082"/>
-              </a:solidFill>
-            </a:ln>
-          </p:spPr>
-          <p:style>
-            <a:lnRef idx="2">
-              <a:schemeClr val="accent1">
-                <a:shade val="50000"/>
-              </a:schemeClr>
-            </a:lnRef>
-            <a:fillRef idx="1">
-              <a:schemeClr val="accent1"/>
-            </a:fillRef>
-            <a:effectRef idx="0">
-              <a:schemeClr val="accent1"/>
-            </a:effectRef>
-            <a:fontRef idx="minor">
-              <a:schemeClr val="lt1"/>
-            </a:fontRef>
-          </p:style>
-          <p:txBody>
-            <a:bodyPr rtlCol="0" anchor="ctr"/>
-            <a:lstStyle/>
-            <a:p>
-              <a:pPr algn="ctr"/>
-              <a:endParaRPr lang="en-US"/>
-            </a:p>
-          </p:txBody>
-        </p:sp>
-        <p:sp>
-          <p:nvSpPr>
-            <p:cNvPr id="186" name="Rectangle 185"/>
-            <p:cNvSpPr>
-              <a:spLocks noChangeAspect="1"/>
-            </p:cNvSpPr>
-            <p:nvPr/>
-          </p:nvSpPr>
-          <p:spPr>
-            <a:xfrm>
-              <a:off x="5783179" y="4945547"/>
-              <a:ext cx="625642" cy="625642"/>
-            </a:xfrm>
-            <a:prstGeom prst="rect">
-              <a:avLst/>
-            </a:prstGeom>
-            <a:solidFill>
-              <a:schemeClr val="accent4">
-                <a:alpha val="30000"/>
-              </a:schemeClr>
-            </a:solidFill>
-            <a:ln>
-              <a:solidFill>
-                <a:srgbClr val="F3B082"/>
-              </a:solidFill>
-              <a:prstDash val="dash"/>
-            </a:ln>
-          </p:spPr>
-          <p:style>
-            <a:lnRef idx="2">
-              <a:schemeClr val="accent1">
-                <a:shade val="50000"/>
-              </a:schemeClr>
-            </a:lnRef>
-            <a:fillRef idx="1">
-              <a:schemeClr val="accent1"/>
-            </a:fillRef>
-            <a:effectRef idx="0">
-              <a:schemeClr val="accent1"/>
-            </a:effectRef>
-            <a:fontRef idx="minor">
-              <a:schemeClr val="lt1"/>
-            </a:fontRef>
-          </p:style>
-          <p:txBody>
-            <a:bodyPr rtlCol="0" anchor="ctr"/>
-            <a:lstStyle/>
-            <a:p>
-              <a:pPr algn="ctr"/>
-              <a:endParaRPr lang="en-US"/>
-            </a:p>
-          </p:txBody>
-        </p:sp>
-      </p:grpSp>
-      <p:grpSp>
-        <p:nvGrpSpPr>
-          <p:cNvPr id="37" name="Group 36"/>
-          <p:cNvGrpSpPr/>
-          <p:nvPr/>
-        </p:nvGrpSpPr>
-        <p:grpSpPr>
-          <a:xfrm>
-            <a:off x="6878850" y="4691547"/>
-            <a:ext cx="1133642" cy="1133642"/>
-            <a:chOff x="6861743" y="4691547"/>
-            <a:chExt cx="1133642" cy="1133642"/>
-          </a:xfrm>
-        </p:grpSpPr>
-        <p:sp>
-          <p:nvSpPr>
-            <p:cNvPr id="187" name="Rectangle 186"/>
-            <p:cNvSpPr>
-              <a:spLocks noChangeAspect="1"/>
-            </p:cNvSpPr>
-            <p:nvPr/>
-          </p:nvSpPr>
-          <p:spPr>
-            <a:xfrm>
-              <a:off x="6861743" y="4691547"/>
-              <a:ext cx="1133642" cy="1133642"/>
-            </a:xfrm>
-            <a:prstGeom prst="rect">
-              <a:avLst/>
-            </a:prstGeom>
-            <a:solidFill>
-              <a:srgbClr val="ED7D31"/>
-            </a:solidFill>
-            <a:ln>
-              <a:solidFill>
-                <a:srgbClr val="F3B082"/>
-              </a:solidFill>
-            </a:ln>
-          </p:spPr>
-          <p:style>
-            <a:lnRef idx="2">
-              <a:schemeClr val="accent1">
-                <a:shade val="50000"/>
-              </a:schemeClr>
-            </a:lnRef>
-            <a:fillRef idx="1">
-              <a:schemeClr val="accent1"/>
-            </a:fillRef>
-            <a:effectRef idx="0">
-              <a:schemeClr val="accent1"/>
-            </a:effectRef>
-            <a:fontRef idx="minor">
-              <a:schemeClr val="lt1"/>
-            </a:fontRef>
-          </p:style>
-          <p:txBody>
-            <a:bodyPr rtlCol="0" anchor="ctr"/>
-            <a:lstStyle/>
-            <a:p>
-              <a:pPr algn="ctr"/>
-              <a:endParaRPr lang="en-US"/>
-            </a:p>
-          </p:txBody>
-        </p:sp>
-        <p:sp>
-          <p:nvSpPr>
-            <p:cNvPr id="188" name="Rectangle 187"/>
-            <p:cNvSpPr>
-              <a:spLocks noChangeAspect="1"/>
-            </p:cNvSpPr>
-            <p:nvPr/>
-          </p:nvSpPr>
-          <p:spPr>
-            <a:xfrm>
-              <a:off x="7369743" y="4945547"/>
-              <a:ext cx="625642" cy="625642"/>
-            </a:xfrm>
-            <a:prstGeom prst="rect">
-              <a:avLst/>
-            </a:prstGeom>
-            <a:solidFill>
-              <a:schemeClr val="accent4">
-                <a:alpha val="30000"/>
-              </a:schemeClr>
-            </a:solidFill>
-            <a:ln>
-              <a:solidFill>
-                <a:srgbClr val="F3B082"/>
-              </a:solidFill>
-              <a:prstDash val="dash"/>
-            </a:ln>
-          </p:spPr>
-          <p:style>
-            <a:lnRef idx="2">
-              <a:schemeClr val="accent1">
-                <a:shade val="50000"/>
-              </a:schemeClr>
-            </a:lnRef>
-            <a:fillRef idx="1">
-              <a:schemeClr val="accent1"/>
-            </a:fillRef>
-            <a:effectRef idx="0">
-              <a:schemeClr val="accent1"/>
-            </a:effectRef>
-            <a:fontRef idx="minor">
-              <a:schemeClr val="lt1"/>
-            </a:fontRef>
-          </p:style>
-          <p:txBody>
-            <a:bodyPr rtlCol="0" anchor="ctr"/>
-            <a:lstStyle/>
-            <a:p>
-              <a:pPr algn="ctr"/>
-              <a:endParaRPr lang="en-US"/>
-            </a:p>
-          </p:txBody>
-        </p:sp>
-      </p:grpSp>
-      <p:grpSp>
-        <p:nvGrpSpPr>
-          <p:cNvPr id="38" name="Group 37"/>
-          <p:cNvGrpSpPr/>
-          <p:nvPr/>
-        </p:nvGrpSpPr>
-        <p:grpSpPr>
-          <a:xfrm>
-            <a:off x="8244850" y="4691548"/>
-            <a:ext cx="1133642" cy="1133642"/>
-            <a:chOff x="8194307" y="4691548"/>
-            <a:chExt cx="1133642" cy="1133642"/>
-          </a:xfrm>
-        </p:grpSpPr>
-        <p:sp>
-          <p:nvSpPr>
-            <p:cNvPr id="189" name="Rectangle 188"/>
-            <p:cNvSpPr>
-              <a:spLocks noChangeAspect="1"/>
-            </p:cNvSpPr>
-            <p:nvPr/>
-          </p:nvSpPr>
-          <p:spPr>
-            <a:xfrm>
-              <a:off x="8194307" y="4691548"/>
-              <a:ext cx="1133642" cy="1133642"/>
-            </a:xfrm>
-            <a:prstGeom prst="rect">
-              <a:avLst/>
-            </a:prstGeom>
-            <a:solidFill>
-              <a:srgbClr val="ED7D31"/>
-            </a:solidFill>
-            <a:ln>
-              <a:solidFill>
-                <a:srgbClr val="F3B082"/>
-              </a:solidFill>
-            </a:ln>
-          </p:spPr>
-          <p:style>
-            <a:lnRef idx="2">
-              <a:schemeClr val="accent1">
-                <a:shade val="50000"/>
-              </a:schemeClr>
-            </a:lnRef>
-            <a:fillRef idx="1">
-              <a:schemeClr val="accent1"/>
-            </a:fillRef>
-            <a:effectRef idx="0">
-              <a:schemeClr val="accent1"/>
-            </a:effectRef>
-            <a:fontRef idx="minor">
-              <a:schemeClr val="lt1"/>
-            </a:fontRef>
-          </p:style>
-          <p:txBody>
-            <a:bodyPr rtlCol="0" anchor="ctr"/>
-            <a:lstStyle/>
-            <a:p>
-              <a:pPr algn="ctr"/>
-              <a:endParaRPr lang="en-US"/>
-            </a:p>
-          </p:txBody>
-        </p:sp>
-        <p:sp>
-          <p:nvSpPr>
-            <p:cNvPr id="190" name="Rectangle 189"/>
-            <p:cNvSpPr>
-              <a:spLocks noChangeAspect="1"/>
-            </p:cNvSpPr>
-            <p:nvPr/>
-          </p:nvSpPr>
-          <p:spPr>
-            <a:xfrm>
-              <a:off x="8194307" y="5199548"/>
-              <a:ext cx="625642" cy="625642"/>
-            </a:xfrm>
-            <a:prstGeom prst="rect">
-              <a:avLst/>
-            </a:prstGeom>
-            <a:solidFill>
-              <a:schemeClr val="accent4">
-                <a:alpha val="30000"/>
-              </a:schemeClr>
-            </a:solidFill>
-            <a:ln>
-              <a:solidFill>
-                <a:srgbClr val="F3B082"/>
-              </a:solidFill>
-              <a:prstDash val="dash"/>
-            </a:ln>
-          </p:spPr>
-          <p:style>
-            <a:lnRef idx="2">
-              <a:schemeClr val="accent1">
-                <a:shade val="50000"/>
-              </a:schemeClr>
-            </a:lnRef>
-            <a:fillRef idx="1">
-              <a:schemeClr val="accent1"/>
-            </a:fillRef>
-            <a:effectRef idx="0">
-              <a:schemeClr val="accent1"/>
-            </a:effectRef>
-            <a:fontRef idx="minor">
-              <a:schemeClr val="lt1"/>
-            </a:fontRef>
-          </p:style>
-          <p:txBody>
-            <a:bodyPr rtlCol="0" anchor="ctr"/>
-            <a:lstStyle/>
-            <a:p>
-              <a:pPr algn="ctr"/>
-              <a:endParaRPr lang="en-US"/>
-            </a:p>
-          </p:txBody>
-        </p:sp>
-      </p:grpSp>
-      <p:grpSp>
-        <p:nvGrpSpPr>
-          <p:cNvPr id="39" name="Group 38"/>
-          <p:cNvGrpSpPr/>
-          <p:nvPr/>
-        </p:nvGrpSpPr>
-        <p:grpSpPr>
-          <a:xfrm>
-            <a:off x="9610851" y="4691548"/>
-            <a:ext cx="1133642" cy="1133642"/>
-            <a:chOff x="9526872" y="4691548"/>
-            <a:chExt cx="1133642" cy="1133642"/>
-          </a:xfrm>
-        </p:grpSpPr>
-        <p:sp>
-          <p:nvSpPr>
-            <p:cNvPr id="191" name="Rectangle 190"/>
-            <p:cNvSpPr>
-              <a:spLocks noChangeAspect="1"/>
-            </p:cNvSpPr>
-            <p:nvPr/>
-          </p:nvSpPr>
-          <p:spPr>
-            <a:xfrm>
-              <a:off x="9526872" y="4691548"/>
-              <a:ext cx="1133642" cy="1133642"/>
-            </a:xfrm>
-            <a:prstGeom prst="rect">
-              <a:avLst/>
-            </a:prstGeom>
-            <a:solidFill>
-              <a:srgbClr val="ED7D31"/>
-            </a:solidFill>
-            <a:ln>
-              <a:solidFill>
-                <a:srgbClr val="F3B082"/>
-              </a:solidFill>
-            </a:ln>
-          </p:spPr>
-          <p:style>
-            <a:lnRef idx="2">
-              <a:schemeClr val="accent1">
-                <a:shade val="50000"/>
-              </a:schemeClr>
-            </a:lnRef>
-            <a:fillRef idx="1">
-              <a:schemeClr val="accent1"/>
-            </a:fillRef>
-            <a:effectRef idx="0">
-              <a:schemeClr val="accent1"/>
-            </a:effectRef>
-            <a:fontRef idx="minor">
-              <a:schemeClr val="lt1"/>
-            </a:fontRef>
-          </p:style>
-          <p:txBody>
-            <a:bodyPr rtlCol="0" anchor="ctr"/>
-            <a:lstStyle/>
-            <a:p>
-              <a:pPr algn="ctr"/>
-              <a:endParaRPr lang="en-US"/>
-            </a:p>
-          </p:txBody>
-        </p:sp>
-        <p:sp>
-          <p:nvSpPr>
-            <p:cNvPr id="192" name="Rectangle 191"/>
-            <p:cNvSpPr>
-              <a:spLocks noChangeAspect="1"/>
-            </p:cNvSpPr>
-            <p:nvPr/>
-          </p:nvSpPr>
-          <p:spPr>
-            <a:xfrm>
-              <a:off x="9780872" y="5199548"/>
-              <a:ext cx="625642" cy="625642"/>
-            </a:xfrm>
-            <a:prstGeom prst="rect">
-              <a:avLst/>
-            </a:prstGeom>
-            <a:solidFill>
-              <a:schemeClr val="accent4">
-                <a:alpha val="30000"/>
-              </a:schemeClr>
-            </a:solidFill>
-            <a:ln>
-              <a:solidFill>
-                <a:srgbClr val="F3B082"/>
-              </a:solidFill>
-              <a:prstDash val="dash"/>
-            </a:ln>
-          </p:spPr>
-          <p:style>
-            <a:lnRef idx="2">
-              <a:schemeClr val="accent1">
-                <a:shade val="50000"/>
-              </a:schemeClr>
-            </a:lnRef>
-            <a:fillRef idx="1">
-              <a:schemeClr val="accent1"/>
-            </a:fillRef>
-            <a:effectRef idx="0">
-              <a:schemeClr val="accent1"/>
-            </a:effectRef>
-            <a:fontRef idx="minor">
-              <a:schemeClr val="lt1"/>
-            </a:fontRef>
-          </p:style>
-          <p:txBody>
-            <a:bodyPr rtlCol="0" anchor="ctr"/>
-            <a:lstStyle/>
-            <a:p>
-              <a:pPr algn="ctr"/>
-              <a:endParaRPr lang="en-US"/>
-            </a:p>
-          </p:txBody>
-        </p:sp>
-      </p:grpSp>
-      <p:grpSp>
-        <p:nvGrpSpPr>
-          <p:cNvPr id="29" name="Group 28"/>
-          <p:cNvGrpSpPr/>
-          <p:nvPr/>
-        </p:nvGrpSpPr>
-        <p:grpSpPr>
-          <a:xfrm>
-            <a:off x="10976852" y="4691547"/>
-            <a:ext cx="1133643" cy="1133642"/>
-            <a:chOff x="10859436" y="4691547"/>
-            <a:chExt cx="1133643" cy="1133642"/>
-          </a:xfrm>
-        </p:grpSpPr>
-        <p:sp>
-          <p:nvSpPr>
-            <p:cNvPr id="193" name="Rectangle 192"/>
-            <p:cNvSpPr>
-              <a:spLocks noChangeAspect="1"/>
-            </p:cNvSpPr>
-            <p:nvPr/>
-          </p:nvSpPr>
-          <p:spPr>
-            <a:xfrm>
-              <a:off x="10859436" y="4691547"/>
-              <a:ext cx="1133642" cy="1133642"/>
-            </a:xfrm>
-            <a:prstGeom prst="rect">
-              <a:avLst/>
-            </a:prstGeom>
-            <a:solidFill>
-              <a:srgbClr val="ED7D31"/>
-            </a:solidFill>
-            <a:ln>
-              <a:solidFill>
-                <a:srgbClr val="F3B082"/>
-              </a:solidFill>
-            </a:ln>
-          </p:spPr>
-          <p:style>
-            <a:lnRef idx="2">
-              <a:schemeClr val="accent1">
-                <a:shade val="50000"/>
-              </a:schemeClr>
-            </a:lnRef>
-            <a:fillRef idx="1">
-              <a:schemeClr val="accent1"/>
-            </a:fillRef>
-            <a:effectRef idx="0">
-              <a:schemeClr val="accent1"/>
-            </a:effectRef>
-            <a:fontRef idx="minor">
-              <a:schemeClr val="lt1"/>
-            </a:fontRef>
-          </p:style>
-          <p:txBody>
-            <a:bodyPr rtlCol="0" anchor="ctr"/>
-            <a:lstStyle/>
-            <a:p>
-              <a:pPr algn="ctr"/>
-              <a:endParaRPr lang="en-US"/>
-            </a:p>
-          </p:txBody>
-        </p:sp>
-        <p:sp>
-          <p:nvSpPr>
-            <p:cNvPr id="194" name="Rectangle 193"/>
-            <p:cNvSpPr>
-              <a:spLocks noChangeAspect="1"/>
-            </p:cNvSpPr>
-            <p:nvPr/>
-          </p:nvSpPr>
-          <p:spPr>
-            <a:xfrm>
-              <a:off x="11367437" y="5199547"/>
-              <a:ext cx="625642" cy="625642"/>
-            </a:xfrm>
-            <a:prstGeom prst="rect">
-              <a:avLst/>
-            </a:prstGeom>
-            <a:solidFill>
-              <a:schemeClr val="accent4">
-                <a:alpha val="30000"/>
-              </a:schemeClr>
-            </a:solidFill>
-            <a:ln>
-              <a:solidFill>
-                <a:srgbClr val="F3B082"/>
-              </a:solidFill>
-              <a:prstDash val="dash"/>
-            </a:ln>
-          </p:spPr>
-          <p:style>
-            <a:lnRef idx="2">
-              <a:schemeClr val="accent1">
-                <a:shade val="50000"/>
-              </a:schemeClr>
-            </a:lnRef>
-            <a:fillRef idx="1">
-              <a:schemeClr val="accent1"/>
-            </a:fillRef>
-            <a:effectRef idx="0">
-              <a:schemeClr val="accent1"/>
-            </a:effectRef>
-            <a:fontRef idx="minor">
-              <a:schemeClr val="lt1"/>
-            </a:fontRef>
-          </p:style>
-          <p:txBody>
-            <a:bodyPr rtlCol="0" anchor="ctr"/>
-            <a:lstStyle/>
-            <a:p>
-              <a:pPr algn="ctr"/>
-              <a:endParaRPr lang="en-US"/>
-            </a:p>
-          </p:txBody>
-        </p:sp>
-      </p:grpSp>
-    </p:spTree>
-    <p:extLst>
-      <p:ext uri="{BB962C8B-B14F-4D97-AF65-F5344CB8AC3E}">
-        <p14:creationId xmlns:p14="http://schemas.microsoft.com/office/powerpoint/2010/main" val="2681463959"/>
-      </p:ext>
-    </p:extLst>
-  </p:cSld>
-  <p:clrMapOvr>
-    <a:masterClrMapping/>
-  </p:clrMapOvr>
-  <p:timing>
-    <p:tnLst>
-      <p:par>
-        <p:cTn id="1" dur="indefinite" restart="never" nodeType="tmRoot"/>
-      </p:par>
-    </p:tnLst>
-  </p:timing>
-</p:sld>
-</file>
-
-<file path=ppt/slides/slide31.xml><?xml version="1.0" encoding="utf-8"?>
-<p:sld xmlns:a="http://schemas.openxmlformats.org/drawingml/2006/main" xmlns:r="http://schemas.openxmlformats.org/officeDocument/2006/relationships" xmlns:p="http://schemas.openxmlformats.org/presentationml/2006/main">
-  <p:cSld>
-    <p:spTree>
-      <p:nvGrpSpPr>
-        <p:cNvPr id="1" name=""/>
-        <p:cNvGrpSpPr/>
-        <p:nvPr/>
-      </p:nvGrpSpPr>
-      <p:grpSpPr>
-        <a:xfrm>
-          <a:off x="0" y="0"/>
-          <a:ext cx="0" cy="0"/>
-          <a:chOff x="0" y="0"/>
-          <a:chExt cx="0" cy="0"/>
-        </a:xfrm>
-      </p:grpSpPr>
-      <p:cxnSp>
-        <p:nvCxnSpPr>
-          <p:cNvPr id="433" name="Straight Arrow Connector 15"/>
-          <p:cNvCxnSpPr>
-            <a:cxnSpLocks/>
-          </p:cNvCxnSpPr>
-          <p:nvPr/>
-        </p:nvCxnSpPr>
-        <p:spPr>
-          <a:xfrm>
-            <a:off x="-625315" y="3658153"/>
-            <a:ext cx="0" cy="968535"/>
-          </a:xfrm>
-          <a:prstGeom prst="straightConnector1">
-            <a:avLst/>
-          </a:prstGeom>
-          <a:ln w="63500">
-            <a:solidFill>
-              <a:srgbClr val="C64F00"/>
-            </a:solidFill>
-            <a:tailEnd type="stealth" w="lg" len="lg"/>
           </a:ln>
         </p:spPr>
         <p:style>
-          <a:lnRef idx="1">
-            <a:schemeClr val="accent1"/>
+          <a:lnRef idx="2">
+            <a:schemeClr val="accent1">
+              <a:shade val="50000"/>
+            </a:schemeClr>
           </a:lnRef>
-          <a:fillRef idx="0">
+          <a:fillRef idx="1">
             <a:schemeClr val="accent1"/>
           </a:fillRef>
           <a:effectRef idx="0">
             <a:schemeClr val="accent1"/>
           </a:effectRef>
           <a:fontRef idx="minor">
-            <a:schemeClr val="tx1"/>
+            <a:schemeClr val="lt1"/>
           </a:fontRef>
         </p:style>
-      </p:cxnSp>
-      <p:cxnSp>
-        <p:nvCxnSpPr>
-          <p:cNvPr id="434" name="Straight Arrow Connector 15"/>
-          <p:cNvCxnSpPr>
-            <a:cxnSpLocks/>
-          </p:cNvCxnSpPr>
-          <p:nvPr/>
-        </p:nvCxnSpPr>
-        <p:spPr>
-          <a:xfrm>
-            <a:off x="895809" y="3658153"/>
-            <a:ext cx="0" cy="968535"/>
-          </a:xfrm>
-          <a:prstGeom prst="straightConnector1">
-            <a:avLst/>
-          </a:prstGeom>
-          <a:ln w="63500">
-            <a:solidFill>
-              <a:srgbClr val="C64F00"/>
-            </a:solidFill>
-            <a:tailEnd type="stealth" w="lg" len="lg"/>
-          </a:ln>
-        </p:spPr>
-        <p:style>
-          <a:lnRef idx="1">
-            <a:schemeClr val="accent1"/>
-          </a:lnRef>
-          <a:fillRef idx="0">
-            <a:schemeClr val="accent1"/>
-          </a:fillRef>
-          <a:effectRef idx="0">
-            <a:schemeClr val="accent1"/>
-          </a:effectRef>
-          <a:fontRef idx="minor">
-            <a:schemeClr val="tx1"/>
-          </a:fontRef>
-        </p:style>
-      </p:cxnSp>
-      <p:cxnSp>
-        <p:nvCxnSpPr>
-          <p:cNvPr id="435" name="Straight Arrow Connector 15"/>
-          <p:cNvCxnSpPr>
-            <a:cxnSpLocks/>
-          </p:cNvCxnSpPr>
-          <p:nvPr/>
-        </p:nvCxnSpPr>
-        <p:spPr>
-          <a:xfrm>
-            <a:off x="2416932" y="3658153"/>
-            <a:ext cx="0" cy="968535"/>
-          </a:xfrm>
-          <a:prstGeom prst="straightConnector1">
-            <a:avLst/>
-          </a:prstGeom>
-          <a:ln w="63500">
-            <a:solidFill>
-              <a:srgbClr val="C64F00"/>
-            </a:solidFill>
-            <a:tailEnd type="stealth" w="lg" len="lg"/>
-          </a:ln>
-        </p:spPr>
-        <p:style>
-          <a:lnRef idx="1">
-            <a:schemeClr val="accent1"/>
-          </a:lnRef>
-          <a:fillRef idx="0">
-            <a:schemeClr val="accent1"/>
-          </a:fillRef>
-          <a:effectRef idx="0">
-            <a:schemeClr val="accent1"/>
-          </a:effectRef>
-          <a:fontRef idx="minor">
-            <a:schemeClr val="tx1"/>
-          </a:fontRef>
-        </p:style>
-      </p:cxnSp>
-      <p:cxnSp>
-        <p:nvCxnSpPr>
-          <p:cNvPr id="436" name="Straight Arrow Connector 15"/>
-          <p:cNvCxnSpPr>
-            <a:cxnSpLocks/>
-          </p:cNvCxnSpPr>
-          <p:nvPr/>
-        </p:nvCxnSpPr>
-        <p:spPr>
-          <a:xfrm>
-            <a:off x="3938056" y="3658153"/>
-            <a:ext cx="0" cy="968535"/>
-          </a:xfrm>
-          <a:prstGeom prst="straightConnector1">
-            <a:avLst/>
-          </a:prstGeom>
-          <a:ln w="63500">
-            <a:solidFill>
-              <a:srgbClr val="C64F00"/>
-            </a:solidFill>
-            <a:tailEnd type="stealth" w="lg" len="lg"/>
-          </a:ln>
-        </p:spPr>
-        <p:style>
-          <a:lnRef idx="1">
-            <a:schemeClr val="accent1"/>
-          </a:lnRef>
-          <a:fillRef idx="0">
-            <a:schemeClr val="accent1"/>
-          </a:fillRef>
-          <a:effectRef idx="0">
-            <a:schemeClr val="accent1"/>
-          </a:effectRef>
-          <a:fontRef idx="minor">
-            <a:schemeClr val="tx1"/>
-          </a:fontRef>
-        </p:style>
-      </p:cxnSp>
-      <p:cxnSp>
-        <p:nvCxnSpPr>
-          <p:cNvPr id="437" name="Straight Arrow Connector 15"/>
-          <p:cNvCxnSpPr>
-            <a:cxnSpLocks/>
-          </p:cNvCxnSpPr>
-          <p:nvPr/>
-        </p:nvCxnSpPr>
-        <p:spPr>
-          <a:xfrm>
-            <a:off x="5459180" y="3658153"/>
-            <a:ext cx="0" cy="968535"/>
-          </a:xfrm>
-          <a:prstGeom prst="straightConnector1">
-            <a:avLst/>
-          </a:prstGeom>
-          <a:ln w="63500">
-            <a:solidFill>
-              <a:srgbClr val="C64F00"/>
-            </a:solidFill>
-            <a:tailEnd type="stealth" w="lg" len="lg"/>
-          </a:ln>
-        </p:spPr>
-        <p:style>
-          <a:lnRef idx="1">
-            <a:schemeClr val="accent1"/>
-          </a:lnRef>
-          <a:fillRef idx="0">
-            <a:schemeClr val="accent1"/>
-          </a:fillRef>
-          <a:effectRef idx="0">
-            <a:schemeClr val="accent1"/>
-          </a:effectRef>
-          <a:fontRef idx="minor">
-            <a:schemeClr val="tx1"/>
-          </a:fontRef>
-        </p:style>
-      </p:cxnSp>
-      <p:cxnSp>
-        <p:nvCxnSpPr>
-          <p:cNvPr id="438" name="Straight Arrow Connector 15"/>
-          <p:cNvCxnSpPr>
-            <a:cxnSpLocks/>
-          </p:cNvCxnSpPr>
-          <p:nvPr/>
-        </p:nvCxnSpPr>
-        <p:spPr>
-          <a:xfrm>
-            <a:off x="6980304" y="3658153"/>
-            <a:ext cx="0" cy="968535"/>
-          </a:xfrm>
-          <a:prstGeom prst="straightConnector1">
-            <a:avLst/>
-          </a:prstGeom>
-          <a:ln w="63500">
-            <a:solidFill>
-              <a:srgbClr val="C64F00"/>
-            </a:solidFill>
-            <a:tailEnd type="stealth" w="lg" len="lg"/>
-          </a:ln>
-        </p:spPr>
-        <p:style>
-          <a:lnRef idx="1">
-            <a:schemeClr val="accent1"/>
-          </a:lnRef>
-          <a:fillRef idx="0">
-            <a:schemeClr val="accent1"/>
-          </a:fillRef>
-          <a:effectRef idx="0">
-            <a:schemeClr val="accent1"/>
-          </a:effectRef>
-          <a:fontRef idx="minor">
-            <a:schemeClr val="tx1"/>
-          </a:fontRef>
-        </p:style>
-      </p:cxnSp>
-      <p:cxnSp>
-        <p:nvCxnSpPr>
-          <p:cNvPr id="439" name="Straight Arrow Connector 15"/>
-          <p:cNvCxnSpPr>
-            <a:cxnSpLocks/>
-          </p:cNvCxnSpPr>
-          <p:nvPr/>
-        </p:nvCxnSpPr>
-        <p:spPr>
-          <a:xfrm>
-            <a:off x="8501428" y="3658153"/>
-            <a:ext cx="0" cy="968535"/>
-          </a:xfrm>
-          <a:prstGeom prst="straightConnector1">
-            <a:avLst/>
-          </a:prstGeom>
-          <a:ln w="63500">
-            <a:solidFill>
-              <a:srgbClr val="C64F00"/>
-            </a:solidFill>
-            <a:tailEnd type="stealth" w="lg" len="lg"/>
-          </a:ln>
-        </p:spPr>
-        <p:style>
-          <a:lnRef idx="1">
-            <a:schemeClr val="accent1"/>
-          </a:lnRef>
-          <a:fillRef idx="0">
-            <a:schemeClr val="accent1"/>
-          </a:fillRef>
-          <a:effectRef idx="0">
-            <a:schemeClr val="accent1"/>
-          </a:effectRef>
-          <a:fontRef idx="minor">
-            <a:schemeClr val="tx1"/>
-          </a:fontRef>
-        </p:style>
-      </p:cxnSp>
-      <p:cxnSp>
-        <p:nvCxnSpPr>
-          <p:cNvPr id="440" name="Straight Arrow Connector 15"/>
-          <p:cNvCxnSpPr>
-            <a:cxnSpLocks/>
-          </p:cNvCxnSpPr>
-          <p:nvPr/>
-        </p:nvCxnSpPr>
-        <p:spPr>
-          <a:xfrm>
-            <a:off x="10022551" y="3658153"/>
-            <a:ext cx="0" cy="968535"/>
-          </a:xfrm>
-          <a:prstGeom prst="straightConnector1">
-            <a:avLst/>
-          </a:prstGeom>
-          <a:ln w="63500">
-            <a:solidFill>
-              <a:srgbClr val="C64F00"/>
-            </a:solidFill>
-            <a:tailEnd type="stealth" w="lg" len="lg"/>
-          </a:ln>
-        </p:spPr>
-        <p:style>
-          <a:lnRef idx="1">
-            <a:schemeClr val="accent1"/>
-          </a:lnRef>
-          <a:fillRef idx="0">
-            <a:schemeClr val="accent1"/>
-          </a:fillRef>
-          <a:effectRef idx="0">
-            <a:schemeClr val="accent1"/>
-          </a:effectRef>
-          <a:fontRef idx="minor">
-            <a:schemeClr val="tx1"/>
-          </a:fontRef>
-        </p:style>
-      </p:cxnSp>
-      <p:cxnSp>
-        <p:nvCxnSpPr>
-          <p:cNvPr id="692" name="Straight Arrow Connector 15"/>
-          <p:cNvCxnSpPr>
-            <a:cxnSpLocks/>
-            <a:stCxn id="2" idx="2"/>
-            <a:endCxn id="33" idx="0"/>
-          </p:cNvCxnSpPr>
-          <p:nvPr/>
-        </p:nvCxnSpPr>
-        <p:spPr>
-          <a:xfrm flipH="1">
-            <a:off x="-625315" y="1690688"/>
-            <a:ext cx="6721315" cy="1185433"/>
-          </a:xfrm>
-          <a:prstGeom prst="straightConnector1">
-            <a:avLst/>
-          </a:prstGeom>
-          <a:ln w="63500">
-            <a:solidFill>
-              <a:srgbClr val="C64F00"/>
-            </a:solidFill>
-            <a:tailEnd type="none" w="lg" len="lg"/>
-          </a:ln>
-        </p:spPr>
-        <p:style>
-          <a:lnRef idx="1">
-            <a:schemeClr val="accent1"/>
-          </a:lnRef>
-          <a:fillRef idx="0">
-            <a:schemeClr val="accent1"/>
-          </a:fillRef>
-          <a:effectRef idx="0">
-            <a:schemeClr val="accent1"/>
-          </a:effectRef>
-          <a:fontRef idx="minor">
-            <a:schemeClr val="tx1"/>
-          </a:fontRef>
-        </p:style>
-      </p:cxnSp>
-      <p:cxnSp>
-        <p:nvCxnSpPr>
-          <p:cNvPr id="694" name="Straight Arrow Connector 15"/>
-          <p:cNvCxnSpPr>
-            <a:cxnSpLocks/>
-            <a:stCxn id="2" idx="2"/>
-            <a:endCxn id="54" idx="0"/>
-          </p:cNvCxnSpPr>
-          <p:nvPr/>
-        </p:nvCxnSpPr>
-        <p:spPr>
-          <a:xfrm flipH="1">
-            <a:off x="895809" y="1690688"/>
-            <a:ext cx="5200191" cy="1185433"/>
-          </a:xfrm>
-          <a:prstGeom prst="straightConnector1">
-            <a:avLst/>
-          </a:prstGeom>
-          <a:ln w="63500">
-            <a:solidFill>
-              <a:srgbClr val="C64F00"/>
-            </a:solidFill>
-            <a:tailEnd type="none" w="lg" len="lg"/>
-          </a:ln>
-        </p:spPr>
-        <p:style>
-          <a:lnRef idx="1">
-            <a:schemeClr val="accent1"/>
-          </a:lnRef>
-          <a:fillRef idx="0">
-            <a:schemeClr val="accent1"/>
-          </a:fillRef>
-          <a:effectRef idx="0">
-            <a:schemeClr val="accent1"/>
-          </a:effectRef>
-          <a:fontRef idx="minor">
-            <a:schemeClr val="tx1"/>
-          </a:fontRef>
-        </p:style>
-      </p:cxnSp>
-      <p:cxnSp>
-        <p:nvCxnSpPr>
-          <p:cNvPr id="697" name="Straight Arrow Connector 15"/>
-          <p:cNvCxnSpPr>
-            <a:cxnSpLocks/>
-            <a:stCxn id="2" idx="2"/>
-            <a:endCxn id="59" idx="0"/>
-          </p:cNvCxnSpPr>
-          <p:nvPr/>
-        </p:nvCxnSpPr>
-        <p:spPr>
-          <a:xfrm flipH="1">
-            <a:off x="2416933" y="1690688"/>
-            <a:ext cx="3679067" cy="1185433"/>
-          </a:xfrm>
-          <a:prstGeom prst="straightConnector1">
-            <a:avLst/>
-          </a:prstGeom>
-          <a:ln w="63500">
-            <a:solidFill>
-              <a:srgbClr val="C64F00"/>
-            </a:solidFill>
-            <a:tailEnd type="none" w="lg" len="lg"/>
-          </a:ln>
-        </p:spPr>
-        <p:style>
-          <a:lnRef idx="1">
-            <a:schemeClr val="accent1"/>
-          </a:lnRef>
-          <a:fillRef idx="0">
-            <a:schemeClr val="accent1"/>
-          </a:fillRef>
-          <a:effectRef idx="0">
-            <a:schemeClr val="accent1"/>
-          </a:effectRef>
-          <a:fontRef idx="minor">
-            <a:schemeClr val="tx1"/>
-          </a:fontRef>
-        </p:style>
-      </p:cxnSp>
-      <p:cxnSp>
-        <p:nvCxnSpPr>
-          <p:cNvPr id="700" name="Straight Arrow Connector 15"/>
-          <p:cNvCxnSpPr>
-            <a:cxnSpLocks/>
-            <a:stCxn id="2" idx="2"/>
-            <a:endCxn id="66" idx="0"/>
-          </p:cNvCxnSpPr>
-          <p:nvPr/>
-        </p:nvCxnSpPr>
-        <p:spPr>
-          <a:xfrm flipH="1">
-            <a:off x="3938057" y="1690688"/>
-            <a:ext cx="2157943" cy="1185433"/>
-          </a:xfrm>
-          <a:prstGeom prst="straightConnector1">
-            <a:avLst/>
-          </a:prstGeom>
-          <a:ln w="63500">
-            <a:solidFill>
-              <a:srgbClr val="C64F00"/>
-            </a:solidFill>
-            <a:tailEnd type="none" w="lg" len="lg"/>
-          </a:ln>
-        </p:spPr>
-        <p:style>
-          <a:lnRef idx="1">
-            <a:schemeClr val="accent1"/>
-          </a:lnRef>
-          <a:fillRef idx="0">
-            <a:schemeClr val="accent1"/>
-          </a:fillRef>
-          <a:effectRef idx="0">
-            <a:schemeClr val="accent1"/>
-          </a:effectRef>
-          <a:fontRef idx="minor">
-            <a:schemeClr val="tx1"/>
-          </a:fontRef>
-        </p:style>
-      </p:cxnSp>
-      <p:cxnSp>
-        <p:nvCxnSpPr>
-          <p:cNvPr id="703" name="Straight Arrow Connector 15"/>
-          <p:cNvCxnSpPr>
-            <a:cxnSpLocks/>
-            <a:stCxn id="2" idx="2"/>
-            <a:endCxn id="69" idx="0"/>
-          </p:cNvCxnSpPr>
-          <p:nvPr/>
-        </p:nvCxnSpPr>
-        <p:spPr>
-          <a:xfrm flipH="1">
-            <a:off x="5459181" y="1690688"/>
-            <a:ext cx="636819" cy="1185433"/>
-          </a:xfrm>
-          <a:prstGeom prst="straightConnector1">
-            <a:avLst/>
-          </a:prstGeom>
-          <a:ln w="63500">
-            <a:solidFill>
-              <a:srgbClr val="C64F00"/>
-            </a:solidFill>
-            <a:tailEnd type="none" w="lg" len="lg"/>
-          </a:ln>
-        </p:spPr>
-        <p:style>
-          <a:lnRef idx="1">
-            <a:schemeClr val="accent1"/>
-          </a:lnRef>
-          <a:fillRef idx="0">
-            <a:schemeClr val="accent1"/>
-          </a:fillRef>
-          <a:effectRef idx="0">
-            <a:schemeClr val="accent1"/>
-          </a:effectRef>
-          <a:fontRef idx="minor">
-            <a:schemeClr val="tx1"/>
-          </a:fontRef>
-        </p:style>
-      </p:cxnSp>
-      <p:cxnSp>
-        <p:nvCxnSpPr>
-          <p:cNvPr id="706" name="Straight Arrow Connector 15"/>
-          <p:cNvCxnSpPr>
-            <a:cxnSpLocks/>
-            <a:stCxn id="2" idx="2"/>
-            <a:endCxn id="74" idx="0"/>
-          </p:cNvCxnSpPr>
-          <p:nvPr/>
-        </p:nvCxnSpPr>
-        <p:spPr>
-          <a:xfrm>
-            <a:off x="6096000" y="1690688"/>
-            <a:ext cx="884303" cy="1185433"/>
-          </a:xfrm>
-          <a:prstGeom prst="straightConnector1">
-            <a:avLst/>
-          </a:prstGeom>
-          <a:ln w="63500">
-            <a:solidFill>
-              <a:srgbClr val="C64F00"/>
-            </a:solidFill>
-            <a:tailEnd type="none" w="lg" len="lg"/>
-          </a:ln>
-        </p:spPr>
-        <p:style>
-          <a:lnRef idx="1">
-            <a:schemeClr val="accent1"/>
-          </a:lnRef>
-          <a:fillRef idx="0">
-            <a:schemeClr val="accent1"/>
-          </a:fillRef>
-          <a:effectRef idx="0">
-            <a:schemeClr val="accent1"/>
-          </a:effectRef>
-          <a:fontRef idx="minor">
-            <a:schemeClr val="tx1"/>
-          </a:fontRef>
-        </p:style>
-      </p:cxnSp>
-      <p:cxnSp>
-        <p:nvCxnSpPr>
-          <p:cNvPr id="710" name="Straight Arrow Connector 15"/>
-          <p:cNvCxnSpPr>
-            <a:cxnSpLocks/>
-            <a:endCxn id="77" idx="0"/>
-          </p:cNvCxnSpPr>
-          <p:nvPr/>
-        </p:nvCxnSpPr>
-        <p:spPr>
-          <a:xfrm>
-            <a:off x="6064314" y="1690688"/>
-            <a:ext cx="2437114" cy="1185433"/>
-          </a:xfrm>
-          <a:prstGeom prst="straightConnector1">
-            <a:avLst/>
-          </a:prstGeom>
-          <a:ln w="63500">
-            <a:solidFill>
-              <a:srgbClr val="C64F00"/>
-            </a:solidFill>
-            <a:tailEnd type="none" w="lg" len="lg"/>
-          </a:ln>
-        </p:spPr>
-        <p:style>
-          <a:lnRef idx="1">
-            <a:schemeClr val="accent1"/>
-          </a:lnRef>
-          <a:fillRef idx="0">
-            <a:schemeClr val="accent1"/>
-          </a:fillRef>
-          <a:effectRef idx="0">
-            <a:schemeClr val="accent1"/>
-          </a:effectRef>
-          <a:fontRef idx="minor">
-            <a:schemeClr val="tx1"/>
-          </a:fontRef>
-        </p:style>
-      </p:cxnSp>
-      <p:cxnSp>
-        <p:nvCxnSpPr>
-          <p:cNvPr id="712" name="Straight Arrow Connector 15"/>
-          <p:cNvCxnSpPr>
-            <a:cxnSpLocks/>
-            <a:stCxn id="2" idx="2"/>
-            <a:endCxn id="80" idx="0"/>
-          </p:cNvCxnSpPr>
-          <p:nvPr/>
-        </p:nvCxnSpPr>
-        <p:spPr>
-          <a:xfrm>
-            <a:off x="6096000" y="1690688"/>
-            <a:ext cx="3926552" cy="1185433"/>
-          </a:xfrm>
-          <a:prstGeom prst="straightConnector1">
-            <a:avLst/>
-          </a:prstGeom>
-          <a:ln w="63500">
-            <a:solidFill>
-              <a:srgbClr val="C64F00"/>
-            </a:solidFill>
-            <a:tailEnd type="none" w="lg" len="lg"/>
-          </a:ln>
-        </p:spPr>
-        <p:style>
-          <a:lnRef idx="1">
-            <a:schemeClr val="accent1"/>
-          </a:lnRef>
-          <a:fillRef idx="0">
-            <a:schemeClr val="accent1"/>
-          </a:fillRef>
-          <a:effectRef idx="0">
-            <a:schemeClr val="accent1"/>
-          </a:effectRef>
-          <a:fontRef idx="minor">
-            <a:schemeClr val="tx1"/>
-          </a:fontRef>
-        </p:style>
-      </p:cxnSp>
-      <p:cxnSp>
-        <p:nvCxnSpPr>
-          <p:cNvPr id="441" name="Straight Arrow Connector 15"/>
-          <p:cNvCxnSpPr>
-            <a:cxnSpLocks/>
-          </p:cNvCxnSpPr>
-          <p:nvPr/>
-        </p:nvCxnSpPr>
-        <p:spPr>
-          <a:xfrm>
-            <a:off x="11543674" y="3658153"/>
-            <a:ext cx="0" cy="968535"/>
-          </a:xfrm>
-          <a:prstGeom prst="straightConnector1">
-            <a:avLst/>
-          </a:prstGeom>
-          <a:ln w="63500">
-            <a:solidFill>
-              <a:srgbClr val="C64F00"/>
-            </a:solidFill>
-            <a:tailEnd type="stealth" w="lg" len="lg"/>
-          </a:ln>
-        </p:spPr>
-        <p:style>
-          <a:lnRef idx="1">
-            <a:schemeClr val="accent1"/>
-          </a:lnRef>
-          <a:fillRef idx="0">
-            <a:schemeClr val="accent1"/>
-          </a:fillRef>
-          <a:effectRef idx="0">
-            <a:schemeClr val="accent1"/>
-          </a:effectRef>
-          <a:fontRef idx="minor">
-            <a:schemeClr val="tx1"/>
-          </a:fontRef>
-        </p:style>
-      </p:cxnSp>
-      <p:cxnSp>
-        <p:nvCxnSpPr>
-          <p:cNvPr id="715" name="Straight Arrow Connector 15"/>
-          <p:cNvCxnSpPr>
-            <a:cxnSpLocks/>
-            <a:stCxn id="2" idx="2"/>
-            <a:endCxn id="83" idx="0"/>
-          </p:cNvCxnSpPr>
-          <p:nvPr/>
-        </p:nvCxnSpPr>
-        <p:spPr>
-          <a:xfrm>
-            <a:off x="6096000" y="1690688"/>
-            <a:ext cx="5447674" cy="1185433"/>
-          </a:xfrm>
-          <a:prstGeom prst="straightConnector1">
-            <a:avLst/>
-          </a:prstGeom>
-          <a:ln w="63500">
-            <a:solidFill>
-              <a:srgbClr val="C64F00"/>
-            </a:solidFill>
-            <a:tailEnd type="none" w="lg" len="lg"/>
-          </a:ln>
-        </p:spPr>
-        <p:style>
-          <a:lnRef idx="1">
-            <a:schemeClr val="accent1"/>
-          </a:lnRef>
-          <a:fillRef idx="0">
-            <a:schemeClr val="accent1"/>
-          </a:fillRef>
-          <a:effectRef idx="0">
-            <a:schemeClr val="accent1"/>
-          </a:effectRef>
-          <a:fontRef idx="minor">
-            <a:schemeClr val="tx1"/>
-          </a:fontRef>
-        </p:style>
-      </p:cxnSp>
-      <p:pic>
-        <p:nvPicPr>
-          <p:cNvPr id="33" name="Picture 14"/>
-          <p:cNvPicPr>
-            <a:picLocks noChangeAspect="1"/>
-          </p:cNvPicPr>
-          <p:nvPr/>
-        </p:nvPicPr>
-        <p:blipFill>
-          <a:blip r:embed="rId3">
-            <a:extLst>
-              <a:ext uri="{28A0092B-C50C-407E-A947-70E740481C1C}">
-                <a14:useLocalDpi xmlns:a14="http://schemas.microsoft.com/office/drawing/2010/main" val="0"/>
-              </a:ext>
-            </a:extLst>
-          </a:blip>
-          <a:stretch>
-            <a:fillRect/>
-          </a:stretch>
-        </p:blipFill>
-        <p:spPr>
-          <a:xfrm>
-            <a:off x="-1053149" y="2876121"/>
-            <a:ext cx="855668" cy="749371"/>
-          </a:xfrm>
-          <a:prstGeom prst="rect">
-            <a:avLst/>
-          </a:prstGeom>
-          <a:effectLst>
-            <a:glow rad="304800">
-              <a:schemeClr val="bg1"/>
-            </a:glow>
-          </a:effectLst>
-        </p:spPr>
-      </p:pic>
-      <p:pic>
-        <p:nvPicPr>
-          <p:cNvPr id="54" name="Picture 13"/>
-          <p:cNvPicPr>
-            <a:picLocks noChangeAspect="1"/>
-          </p:cNvPicPr>
-          <p:nvPr/>
-        </p:nvPicPr>
-        <p:blipFill>
-          <a:blip r:embed="rId4">
-            <a:extLst>
-              <a:ext uri="{28A0092B-C50C-407E-A947-70E740481C1C}">
-                <a14:useLocalDpi xmlns:a14="http://schemas.microsoft.com/office/drawing/2010/main" val="0"/>
-              </a:ext>
-            </a:extLst>
-          </a:blip>
-          <a:stretch>
-            <a:fillRect/>
-          </a:stretch>
-        </p:blipFill>
-        <p:spPr>
-          <a:xfrm>
-            <a:off x="467975" y="2876121"/>
-            <a:ext cx="855668" cy="749371"/>
-          </a:xfrm>
-          <a:prstGeom prst="rect">
-            <a:avLst/>
-          </a:prstGeom>
-          <a:effectLst>
-            <a:glow rad="304800">
-              <a:schemeClr val="bg1"/>
-            </a:glow>
-          </a:effectLst>
-        </p:spPr>
-      </p:pic>
-      <p:pic>
-        <p:nvPicPr>
-          <p:cNvPr id="59" name="Picture 15"/>
-          <p:cNvPicPr>
-            <a:picLocks noChangeAspect="1"/>
-          </p:cNvPicPr>
-          <p:nvPr/>
-        </p:nvPicPr>
-        <p:blipFill>
-          <a:blip r:embed="rId5">
-            <a:extLst>
-              <a:ext uri="{28A0092B-C50C-407E-A947-70E740481C1C}">
-                <a14:useLocalDpi xmlns:a14="http://schemas.microsoft.com/office/drawing/2010/main" val="0"/>
-              </a:ext>
-            </a:extLst>
-          </a:blip>
-          <a:stretch>
-            <a:fillRect/>
-          </a:stretch>
-        </p:blipFill>
-        <p:spPr>
-          <a:xfrm>
-            <a:off x="1989099" y="2876121"/>
-            <a:ext cx="855668" cy="749371"/>
-          </a:xfrm>
-          <a:prstGeom prst="rect">
-            <a:avLst/>
-          </a:prstGeom>
-          <a:effectLst>
-            <a:glow rad="304800">
-              <a:schemeClr val="bg1"/>
-            </a:glow>
-          </a:effectLst>
-        </p:spPr>
-      </p:pic>
-      <p:pic>
-        <p:nvPicPr>
-          <p:cNvPr id="66" name="Picture 11"/>
-          <p:cNvPicPr>
-            <a:picLocks noChangeAspect="1"/>
-          </p:cNvPicPr>
-          <p:nvPr/>
-        </p:nvPicPr>
-        <p:blipFill>
-          <a:blip r:embed="rId6">
-            <a:extLst>
-              <a:ext uri="{28A0092B-C50C-407E-A947-70E740481C1C}">
-                <a14:useLocalDpi xmlns:a14="http://schemas.microsoft.com/office/drawing/2010/main" val="0"/>
-              </a:ext>
-            </a:extLst>
-          </a:blip>
-          <a:stretch>
-            <a:fillRect/>
-          </a:stretch>
-        </p:blipFill>
-        <p:spPr>
-          <a:xfrm>
-            <a:off x="3510223" y="2876121"/>
-            <a:ext cx="855668" cy="749371"/>
-          </a:xfrm>
-          <a:prstGeom prst="rect">
-            <a:avLst/>
-          </a:prstGeom>
-          <a:effectLst>
-            <a:glow rad="304800">
-              <a:schemeClr val="bg1"/>
-            </a:glow>
-          </a:effectLst>
-        </p:spPr>
-      </p:pic>
-      <p:pic>
-        <p:nvPicPr>
-          <p:cNvPr id="69" name="Picture 10"/>
-          <p:cNvPicPr>
-            <a:picLocks noChangeAspect="1"/>
-          </p:cNvPicPr>
-          <p:nvPr/>
-        </p:nvPicPr>
-        <p:blipFill>
-          <a:blip r:embed="rId7">
-            <a:extLst>
-              <a:ext uri="{28A0092B-C50C-407E-A947-70E740481C1C}">
-                <a14:useLocalDpi xmlns:a14="http://schemas.microsoft.com/office/drawing/2010/main" val="0"/>
-              </a:ext>
-            </a:extLst>
-          </a:blip>
-          <a:stretch>
-            <a:fillRect/>
-          </a:stretch>
-        </p:blipFill>
-        <p:spPr>
-          <a:xfrm>
-            <a:off x="5031347" y="2876121"/>
-            <a:ext cx="855668" cy="749371"/>
-          </a:xfrm>
-          <a:prstGeom prst="rect">
-            <a:avLst/>
-          </a:prstGeom>
-          <a:effectLst>
-            <a:glow rad="304800">
-              <a:schemeClr val="bg1"/>
-            </a:glow>
-          </a:effectLst>
-        </p:spPr>
-      </p:pic>
-      <p:pic>
-        <p:nvPicPr>
-          <p:cNvPr id="74" name="Picture 12"/>
-          <p:cNvPicPr>
-            <a:picLocks noChangeAspect="1"/>
-          </p:cNvPicPr>
-          <p:nvPr/>
-        </p:nvPicPr>
-        <p:blipFill>
-          <a:blip r:embed="rId8">
-            <a:extLst>
-              <a:ext uri="{28A0092B-C50C-407E-A947-70E740481C1C}">
-                <a14:useLocalDpi xmlns:a14="http://schemas.microsoft.com/office/drawing/2010/main" val="0"/>
-              </a:ext>
-            </a:extLst>
-          </a:blip>
-          <a:stretch>
-            <a:fillRect/>
-          </a:stretch>
-        </p:blipFill>
-        <p:spPr>
-          <a:xfrm>
-            <a:off x="6552469" y="2876121"/>
-            <a:ext cx="855668" cy="749371"/>
-          </a:xfrm>
-          <a:prstGeom prst="rect">
-            <a:avLst/>
-          </a:prstGeom>
-          <a:effectLst>
-            <a:glow rad="304800">
-              <a:schemeClr val="bg1"/>
-            </a:glow>
-          </a:effectLst>
-        </p:spPr>
-      </p:pic>
-      <p:pic>
-        <p:nvPicPr>
-          <p:cNvPr id="77" name="Picture 8"/>
-          <p:cNvPicPr>
-            <a:picLocks noChangeAspect="1"/>
-          </p:cNvPicPr>
-          <p:nvPr/>
-        </p:nvPicPr>
-        <p:blipFill>
-          <a:blip r:embed="rId9">
-            <a:extLst>
-              <a:ext uri="{28A0092B-C50C-407E-A947-70E740481C1C}">
-                <a14:useLocalDpi xmlns:a14="http://schemas.microsoft.com/office/drawing/2010/main" val="0"/>
-              </a:ext>
-            </a:extLst>
-          </a:blip>
-          <a:stretch>
-            <a:fillRect/>
-          </a:stretch>
-        </p:blipFill>
-        <p:spPr>
-          <a:xfrm>
-            <a:off x="8073594" y="2876121"/>
-            <a:ext cx="855668" cy="749371"/>
-          </a:xfrm>
-          <a:prstGeom prst="rect">
-            <a:avLst/>
-          </a:prstGeom>
-          <a:effectLst>
-            <a:glow rad="304800">
-              <a:schemeClr val="bg1"/>
-            </a:glow>
-          </a:effectLst>
-        </p:spPr>
-      </p:pic>
-      <p:pic>
-        <p:nvPicPr>
-          <p:cNvPr id="80" name="Picture 7"/>
-          <p:cNvPicPr>
-            <a:picLocks noChangeAspect="1"/>
-          </p:cNvPicPr>
-          <p:nvPr/>
-        </p:nvPicPr>
-        <p:blipFill>
-          <a:blip r:embed="rId10">
-            <a:extLst>
-              <a:ext uri="{28A0092B-C50C-407E-A947-70E740481C1C}">
-                <a14:useLocalDpi xmlns:a14="http://schemas.microsoft.com/office/drawing/2010/main" val="0"/>
-              </a:ext>
-            </a:extLst>
-          </a:blip>
-          <a:stretch>
-            <a:fillRect/>
-          </a:stretch>
-        </p:blipFill>
-        <p:spPr>
-          <a:xfrm>
-            <a:off x="9594718" y="2876121"/>
-            <a:ext cx="855668" cy="749371"/>
-          </a:xfrm>
-          <a:prstGeom prst="rect">
-            <a:avLst/>
-          </a:prstGeom>
-          <a:effectLst>
-            <a:glow rad="304800">
-              <a:schemeClr val="bg1"/>
-            </a:glow>
-          </a:effectLst>
-        </p:spPr>
-      </p:pic>
-      <p:pic>
-        <p:nvPicPr>
-          <p:cNvPr id="83" name="Picture 9"/>
-          <p:cNvPicPr>
-            <a:picLocks noChangeAspect="1"/>
-          </p:cNvPicPr>
-          <p:nvPr/>
-        </p:nvPicPr>
-        <p:blipFill>
-          <a:blip r:embed="rId11">
-            <a:extLst>
-              <a:ext uri="{28A0092B-C50C-407E-A947-70E740481C1C}">
-                <a14:useLocalDpi xmlns:a14="http://schemas.microsoft.com/office/drawing/2010/main" val="0"/>
-              </a:ext>
-            </a:extLst>
-          </a:blip>
-          <a:stretch>
-            <a:fillRect/>
-          </a:stretch>
-        </p:blipFill>
-        <p:spPr>
-          <a:xfrm>
-            <a:off x="11115840" y="2876121"/>
-            <a:ext cx="855668" cy="749371"/>
-          </a:xfrm>
-          <a:prstGeom prst="rect">
-            <a:avLst/>
-          </a:prstGeom>
-          <a:effectLst>
-            <a:glow rad="304800">
-              <a:schemeClr val="bg1"/>
-            </a:glow>
-          </a:effectLst>
-        </p:spPr>
-      </p:pic>
-      <p:sp>
-        <p:nvSpPr>
-          <p:cNvPr id="2" name="Title 1"/>
+        <p:txBody>
+          <a:bodyPr rtlCol="0" anchor="ctr"/>
+          <a:lstStyle/>
+          <a:p>
+            <a:pPr algn="ctr"/>
+            <a:endParaRPr lang="en-US"/>
+          </a:p>
+        </p:txBody>
+      </p:sp>
+      <p:sp>
+        <p:nvSpPr>
+          <p:cNvPr id="62" name="Rectangle 61"/>
           <p:cNvSpPr>
-            <a:spLocks noGrp="1"/>
+            <a:spLocks noChangeAspect="1"/>
           </p:cNvSpPr>
-          <p:nvPr>
-            <p:ph type="title"/>
-          </p:nvPr>
-        </p:nvSpPr>
-        <p:spPr/>
-        <p:txBody>
-          <a:bodyPr/>
-          <a:lstStyle/>
-          <a:p>
-            <a:r>
-              <a:rPr lang="en-US" dirty="0" smtClean="0"/>
-              <a:t>Example</a:t>
-            </a:r>
-            <a:endParaRPr lang="en-US" dirty="0"/>
-          </a:p>
-        </p:txBody>
-      </p:sp>
-      <p:sp>
-        <p:nvSpPr>
-          <p:cNvPr id="4" name="Rectangle 3"/>
-          <p:cNvSpPr>
-            <a:spLocks/>
-          </p:cNvSpPr>
-          <p:nvPr/>
-        </p:nvSpPr>
-        <p:spPr>
-          <a:xfrm>
-            <a:off x="5783179" y="826326"/>
+          <p:nvPr/>
+        </p:nvSpPr>
+        <p:spPr>
+          <a:xfrm>
+            <a:off x="-938136" y="5182613"/>
             <a:ext cx="625642" cy="625642"/>
           </a:xfrm>
           <a:prstGeom prst="rect">
@@ -16417,6 +14233,7 @@
             <a:solidFill>
               <a:srgbClr val="F3B082"/>
             </a:solidFill>
+            <a:prstDash val="dash"/>
           </a:ln>
         </p:spPr>
         <p:style>
@@ -16446,7 +14263,7 @@
       </p:sp>
       <p:sp>
         <p:nvSpPr>
-          <p:cNvPr id="58" name="Rectangle 57"/>
+          <p:cNvPr id="179" name="Rectangle 178"/>
           <p:cNvSpPr>
             <a:spLocks noChangeAspect="1"/>
           </p:cNvSpPr>
@@ -16454,8 +14271,58 @@
         </p:nvSpPr>
         <p:spPr>
           <a:xfrm>
-            <a:off x="-938136" y="5182613"/>
+            <a:off x="328987" y="5182613"/>
             <a:ext cx="1133642" cy="1133642"/>
+          </a:xfrm>
+          <a:prstGeom prst="rect">
+            <a:avLst/>
+          </a:prstGeom>
+          <a:solidFill>
+            <a:srgbClr val="EA6B13"/>
+          </a:solidFill>
+          <a:ln>
+            <a:solidFill>
+              <a:srgbClr val="EE8742"/>
+            </a:solidFill>
+          </a:ln>
+        </p:spPr>
+        <p:style>
+          <a:lnRef idx="2">
+            <a:schemeClr val="accent1">
+              <a:shade val="50000"/>
+            </a:schemeClr>
+          </a:lnRef>
+          <a:fillRef idx="1">
+            <a:schemeClr val="accent1"/>
+          </a:fillRef>
+          <a:effectRef idx="0">
+            <a:schemeClr val="accent1"/>
+          </a:effectRef>
+          <a:fontRef idx="minor">
+            <a:schemeClr val="lt1"/>
+          </a:fontRef>
+        </p:style>
+        <p:txBody>
+          <a:bodyPr rtlCol="0" anchor="ctr"/>
+          <a:lstStyle/>
+          <a:p>
+            <a:pPr algn="ctr"/>
+            <a:endParaRPr lang="en-US"/>
+          </a:p>
+        </p:txBody>
+      </p:sp>
+      <p:sp>
+        <p:nvSpPr>
+          <p:cNvPr id="180" name="Rectangle 179"/>
+          <p:cNvSpPr>
+            <a:spLocks noChangeAspect="1"/>
+          </p:cNvSpPr>
+          <p:nvPr/>
+        </p:nvSpPr>
+        <p:spPr>
+          <a:xfrm>
+            <a:off x="582987" y="5182613"/>
+            <a:ext cx="625642" cy="625642"/>
           </a:xfrm>
           <a:prstGeom prst="rect">
             <a:avLst/>
@@ -16467,6 +14334,7 @@
             <a:solidFill>
               <a:srgbClr val="F3B082"/>
             </a:solidFill>
+            <a:prstDash val="dash"/>
           </a:ln>
         </p:spPr>
         <p:style>
@@ -16496,7 +14364,7 @@
       </p:sp>
       <p:sp>
         <p:nvSpPr>
-          <p:cNvPr id="62" name="Rectangle 61"/>
+          <p:cNvPr id="181" name="Rectangle 180"/>
           <p:cNvSpPr>
             <a:spLocks noChangeAspect="1"/>
           </p:cNvSpPr>
@@ -16504,16 +14372,64 @@
         </p:nvSpPr>
         <p:spPr>
           <a:xfrm>
-            <a:off x="-938136" y="5182613"/>
+            <a:off x="1596110" y="5182613"/>
+            <a:ext cx="1133642" cy="1133642"/>
+          </a:xfrm>
+          <a:prstGeom prst="rect">
+            <a:avLst/>
+          </a:prstGeom>
+          <a:solidFill>
+            <a:srgbClr val="EA6B13"/>
+          </a:solidFill>
+          <a:ln>
+            <a:solidFill>
+              <a:srgbClr val="EE8742"/>
+            </a:solidFill>
+          </a:ln>
+        </p:spPr>
+        <p:style>
+          <a:lnRef idx="2">
+            <a:schemeClr val="accent1">
+              <a:shade val="50000"/>
+            </a:schemeClr>
+          </a:lnRef>
+          <a:fillRef idx="1">
+            <a:schemeClr val="accent1"/>
+          </a:fillRef>
+          <a:effectRef idx="0">
+            <a:schemeClr val="accent1"/>
+          </a:effectRef>
+          <a:fontRef idx="minor">
+            <a:schemeClr val="lt1"/>
+          </a:fontRef>
+        </p:style>
+        <p:txBody>
+          <a:bodyPr rtlCol="0" anchor="ctr"/>
+          <a:lstStyle/>
+          <a:p>
+            <a:pPr algn="ctr"/>
+            <a:endParaRPr lang="en-US"/>
+          </a:p>
+        </p:txBody>
+      </p:sp>
+      <p:sp>
+        <p:nvSpPr>
+          <p:cNvPr id="182" name="Rectangle 181"/>
+          <p:cNvSpPr>
+            <a:spLocks noChangeAspect="1"/>
+          </p:cNvSpPr>
+          <p:nvPr/>
+        </p:nvSpPr>
+        <p:spPr>
+          <a:xfrm>
+            <a:off x="2104110" y="5182613"/>
             <a:ext cx="625642" cy="625642"/>
           </a:xfrm>
           <a:prstGeom prst="rect">
             <a:avLst/>
           </a:prstGeom>
           <a:solidFill>
-            <a:schemeClr val="accent4">
-              <a:alpha val="30000"/>
-            </a:schemeClr>
+            <a:srgbClr val="ED7D31"/>
           </a:solidFill>
           <a:ln>
             <a:solidFill>
@@ -16549,7 +14465,7 @@
       </p:sp>
       <p:sp>
         <p:nvSpPr>
-          <p:cNvPr id="179" name="Rectangle 178"/>
+          <p:cNvPr id="183" name="Rectangle 182"/>
           <p:cNvSpPr>
             <a:spLocks noChangeAspect="1"/>
           </p:cNvSpPr>
@@ -16557,8 +14473,58 @@
         </p:nvSpPr>
         <p:spPr>
           <a:xfrm>
-            <a:off x="328987" y="5182613"/>
+            <a:off x="3625234" y="4928613"/>
             <a:ext cx="1133642" cy="1133642"/>
+          </a:xfrm>
+          <a:prstGeom prst="rect">
+            <a:avLst/>
+          </a:prstGeom>
+          <a:solidFill>
+            <a:srgbClr val="EA6B13"/>
+          </a:solidFill>
+          <a:ln>
+            <a:solidFill>
+              <a:srgbClr val="EE8742"/>
+            </a:solidFill>
+          </a:ln>
+        </p:spPr>
+        <p:style>
+          <a:lnRef idx="2">
+            <a:schemeClr val="accent1">
+              <a:shade val="50000"/>
+            </a:schemeClr>
+          </a:lnRef>
+          <a:fillRef idx="1">
+            <a:schemeClr val="accent1"/>
+          </a:fillRef>
+          <a:effectRef idx="0">
+            <a:schemeClr val="accent1"/>
+          </a:effectRef>
+          <a:fontRef idx="minor">
+            <a:schemeClr val="lt1"/>
+          </a:fontRef>
+        </p:style>
+        <p:txBody>
+          <a:bodyPr rtlCol="0" anchor="ctr"/>
+          <a:lstStyle/>
+          <a:p>
+            <a:pPr algn="ctr"/>
+            <a:endParaRPr lang="en-US"/>
+          </a:p>
+        </p:txBody>
+      </p:sp>
+      <p:sp>
+        <p:nvSpPr>
+          <p:cNvPr id="184" name="Rectangle 183"/>
+          <p:cNvSpPr>
+            <a:spLocks noChangeAspect="1"/>
+          </p:cNvSpPr>
+          <p:nvPr/>
+        </p:nvSpPr>
+        <p:spPr>
+          <a:xfrm>
+            <a:off x="3625234" y="5182613"/>
+            <a:ext cx="625642" cy="625642"/>
           </a:xfrm>
           <a:prstGeom prst="rect">
             <a:avLst/>
@@ -16570,6 +14536,7 @@
             <a:solidFill>
               <a:srgbClr val="F3B082"/>
             </a:solidFill>
+            <a:prstDash val="dash"/>
           </a:ln>
         </p:spPr>
         <p:style>
@@ -16599,7 +14566,7 @@
       </p:sp>
       <p:sp>
         <p:nvSpPr>
-          <p:cNvPr id="180" name="Rectangle 179"/>
+          <p:cNvPr id="185" name="Rectangle 184"/>
           <p:cNvSpPr>
             <a:spLocks noChangeAspect="1"/>
           </p:cNvSpPr>
@@ -16607,16 +14574,64 @@
         </p:nvSpPr>
         <p:spPr>
           <a:xfrm>
-            <a:off x="582987" y="5182613"/>
+            <a:off x="4892357" y="4928613"/>
+            <a:ext cx="1133642" cy="1133642"/>
+          </a:xfrm>
+          <a:prstGeom prst="rect">
+            <a:avLst/>
+          </a:prstGeom>
+          <a:solidFill>
+            <a:srgbClr val="EA6B13"/>
+          </a:solidFill>
+          <a:ln>
+            <a:solidFill>
+              <a:srgbClr val="EE8742"/>
+            </a:solidFill>
+          </a:ln>
+        </p:spPr>
+        <p:style>
+          <a:lnRef idx="2">
+            <a:schemeClr val="accent1">
+              <a:shade val="50000"/>
+            </a:schemeClr>
+          </a:lnRef>
+          <a:fillRef idx="1">
+            <a:schemeClr val="accent1"/>
+          </a:fillRef>
+          <a:effectRef idx="0">
+            <a:schemeClr val="accent1"/>
+          </a:effectRef>
+          <a:fontRef idx="minor">
+            <a:schemeClr val="lt1"/>
+          </a:fontRef>
+        </p:style>
+        <p:txBody>
+          <a:bodyPr rtlCol="0" anchor="ctr"/>
+          <a:lstStyle/>
+          <a:p>
+            <a:pPr algn="ctr"/>
+            <a:endParaRPr lang="en-US"/>
+          </a:p>
+        </p:txBody>
+      </p:sp>
+      <p:sp>
+        <p:nvSpPr>
+          <p:cNvPr id="186" name="Rectangle 185"/>
+          <p:cNvSpPr>
+            <a:spLocks noChangeAspect="1"/>
+          </p:cNvSpPr>
+          <p:nvPr/>
+        </p:nvSpPr>
+        <p:spPr>
+          <a:xfrm>
+            <a:off x="5146357" y="5182613"/>
             <a:ext cx="625642" cy="625642"/>
           </a:xfrm>
           <a:prstGeom prst="rect">
             <a:avLst/>
           </a:prstGeom>
           <a:solidFill>
-            <a:schemeClr val="accent4">
-              <a:alpha val="30000"/>
-            </a:schemeClr>
+            <a:srgbClr val="ED7D31"/>
           </a:solidFill>
           <a:ln>
             <a:solidFill>
@@ -16652,7 +14667,7 @@
       </p:sp>
       <p:sp>
         <p:nvSpPr>
-          <p:cNvPr id="181" name="Rectangle 180"/>
+          <p:cNvPr id="187" name="Rectangle 186"/>
           <p:cNvSpPr>
             <a:spLocks noChangeAspect="1"/>
           </p:cNvSpPr>
@@ -16660,8 +14675,58 @@
         </p:nvSpPr>
         <p:spPr>
           <a:xfrm>
-            <a:off x="1596110" y="5182613"/>
+            <a:off x="6159481" y="4928613"/>
             <a:ext cx="1133642" cy="1133642"/>
+          </a:xfrm>
+          <a:prstGeom prst="rect">
+            <a:avLst/>
+          </a:prstGeom>
+          <a:solidFill>
+            <a:srgbClr val="EA6B13"/>
+          </a:solidFill>
+          <a:ln>
+            <a:solidFill>
+              <a:srgbClr val="EE8742"/>
+            </a:solidFill>
+          </a:ln>
+        </p:spPr>
+        <p:style>
+          <a:lnRef idx="2">
+            <a:schemeClr val="accent1">
+              <a:shade val="50000"/>
+            </a:schemeClr>
+          </a:lnRef>
+          <a:fillRef idx="1">
+            <a:schemeClr val="accent1"/>
+          </a:fillRef>
+          <a:effectRef idx="0">
+            <a:schemeClr val="accent1"/>
+          </a:effectRef>
+          <a:fontRef idx="minor">
+            <a:schemeClr val="lt1"/>
+          </a:fontRef>
+        </p:style>
+        <p:txBody>
+          <a:bodyPr rtlCol="0" anchor="ctr"/>
+          <a:lstStyle/>
+          <a:p>
+            <a:pPr algn="ctr"/>
+            <a:endParaRPr lang="en-US"/>
+          </a:p>
+        </p:txBody>
+      </p:sp>
+      <p:sp>
+        <p:nvSpPr>
+          <p:cNvPr id="188" name="Rectangle 187"/>
+          <p:cNvSpPr>
+            <a:spLocks noChangeAspect="1"/>
+          </p:cNvSpPr>
+          <p:nvPr/>
+        </p:nvSpPr>
+        <p:spPr>
+          <a:xfrm>
+            <a:off x="6667481" y="5182613"/>
+            <a:ext cx="625642" cy="625642"/>
           </a:xfrm>
           <a:prstGeom prst="rect">
             <a:avLst/>
@@ -16673,6 +14738,7 @@
             <a:solidFill>
               <a:srgbClr val="F3B082"/>
             </a:solidFill>
+            <a:prstDash val="dash"/>
           </a:ln>
         </p:spPr>
         <p:style>
@@ -16702,7 +14768,7 @@
       </p:sp>
       <p:sp>
         <p:nvSpPr>
-          <p:cNvPr id="182" name="Rectangle 181"/>
+          <p:cNvPr id="189" name="Rectangle 188"/>
           <p:cNvSpPr>
             <a:spLocks noChangeAspect="1"/>
           </p:cNvSpPr>
@@ -16710,16 +14776,64 @@
         </p:nvSpPr>
         <p:spPr>
           <a:xfrm>
-            <a:off x="2104110" y="5182613"/>
+            <a:off x="8188603" y="4674614"/>
+            <a:ext cx="1133642" cy="1133642"/>
+          </a:xfrm>
+          <a:prstGeom prst="rect">
+            <a:avLst/>
+          </a:prstGeom>
+          <a:solidFill>
+            <a:srgbClr val="EA6B13"/>
+          </a:solidFill>
+          <a:ln>
+            <a:solidFill>
+              <a:srgbClr val="EE8742"/>
+            </a:solidFill>
+          </a:ln>
+        </p:spPr>
+        <p:style>
+          <a:lnRef idx="2">
+            <a:schemeClr val="accent1">
+              <a:shade val="50000"/>
+            </a:schemeClr>
+          </a:lnRef>
+          <a:fillRef idx="1">
+            <a:schemeClr val="accent1"/>
+          </a:fillRef>
+          <a:effectRef idx="0">
+            <a:schemeClr val="accent1"/>
+          </a:effectRef>
+          <a:fontRef idx="minor">
+            <a:schemeClr val="lt1"/>
+          </a:fontRef>
+        </p:style>
+        <p:txBody>
+          <a:bodyPr rtlCol="0" anchor="ctr"/>
+          <a:lstStyle/>
+          <a:p>
+            <a:pPr algn="ctr"/>
+            <a:endParaRPr lang="en-US"/>
+          </a:p>
+        </p:txBody>
+      </p:sp>
+      <p:sp>
+        <p:nvSpPr>
+          <p:cNvPr id="190" name="Rectangle 189"/>
+          <p:cNvSpPr>
+            <a:spLocks noChangeAspect="1"/>
+          </p:cNvSpPr>
+          <p:nvPr/>
+        </p:nvSpPr>
+        <p:spPr>
+          <a:xfrm>
+            <a:off x="8188603" y="5182614"/>
             <a:ext cx="625642" cy="625642"/>
           </a:xfrm>
           <a:prstGeom prst="rect">
             <a:avLst/>
           </a:prstGeom>
           <a:solidFill>
-            <a:schemeClr val="accent4">
-              <a:alpha val="30000"/>
-            </a:schemeClr>
+            <a:srgbClr val="ED7D31"/>
           </a:solidFill>
           <a:ln>
             <a:solidFill>
@@ -16755,7 +14869,7 @@
       </p:sp>
       <p:sp>
         <p:nvSpPr>
-          <p:cNvPr id="183" name="Rectangle 182"/>
+          <p:cNvPr id="191" name="Rectangle 190"/>
           <p:cNvSpPr>
             <a:spLocks noChangeAspect="1"/>
           </p:cNvSpPr>
@@ -16763,8 +14877,58 @@
         </p:nvSpPr>
         <p:spPr>
           <a:xfrm>
-            <a:off x="3625234" y="4928613"/>
+            <a:off x="9455726" y="4674614"/>
             <a:ext cx="1133642" cy="1133642"/>
+          </a:xfrm>
+          <a:prstGeom prst="rect">
+            <a:avLst/>
+          </a:prstGeom>
+          <a:solidFill>
+            <a:srgbClr val="EA6B13"/>
+          </a:solidFill>
+          <a:ln>
+            <a:solidFill>
+              <a:srgbClr val="EE8742"/>
+            </a:solidFill>
+          </a:ln>
+        </p:spPr>
+        <p:style>
+          <a:lnRef idx="2">
+            <a:schemeClr val="accent1">
+              <a:shade val="50000"/>
+            </a:schemeClr>
+          </a:lnRef>
+          <a:fillRef idx="1">
+            <a:schemeClr val="accent1"/>
+          </a:fillRef>
+          <a:effectRef idx="0">
+            <a:schemeClr val="accent1"/>
+          </a:effectRef>
+          <a:fontRef idx="minor">
+            <a:schemeClr val="lt1"/>
+          </a:fontRef>
+        </p:style>
+        <p:txBody>
+          <a:bodyPr rtlCol="0" anchor="ctr"/>
+          <a:lstStyle/>
+          <a:p>
+            <a:pPr algn="ctr"/>
+            <a:endParaRPr lang="en-US"/>
+          </a:p>
+        </p:txBody>
+      </p:sp>
+      <p:sp>
+        <p:nvSpPr>
+          <p:cNvPr id="192" name="Rectangle 191"/>
+          <p:cNvSpPr>
+            <a:spLocks noChangeAspect="1"/>
+          </p:cNvSpPr>
+          <p:nvPr/>
+        </p:nvSpPr>
+        <p:spPr>
+          <a:xfrm>
+            <a:off x="9709726" y="5182614"/>
+            <a:ext cx="625642" cy="625642"/>
           </a:xfrm>
           <a:prstGeom prst="rect">
             <a:avLst/>
@@ -16776,6 +14940,7 @@
             <a:solidFill>
               <a:srgbClr val="F3B082"/>
             </a:solidFill>
+            <a:prstDash val="dash"/>
           </a:ln>
         </p:spPr>
         <p:style>
@@ -16805,7 +14970,7 @@
       </p:sp>
       <p:sp>
         <p:nvSpPr>
-          <p:cNvPr id="184" name="Rectangle 183"/>
+          <p:cNvPr id="193" name="Rectangle 192"/>
           <p:cNvSpPr>
             <a:spLocks noChangeAspect="1"/>
           </p:cNvSpPr>
@@ -16813,22 +14978,19 @@
         </p:nvSpPr>
         <p:spPr>
           <a:xfrm>
-            <a:off x="3625234" y="5182613"/>
-            <a:ext cx="625642" cy="625642"/>
+            <a:off x="10722851" y="4674613"/>
+            <a:ext cx="1133642" cy="1133642"/>
           </a:xfrm>
           <a:prstGeom prst="rect">
             <a:avLst/>
           </a:prstGeom>
           <a:solidFill>
-            <a:schemeClr val="accent4">
-              <a:alpha val="30000"/>
-            </a:schemeClr>
+            <a:srgbClr val="EA6B13"/>
           </a:solidFill>
           <a:ln>
             <a:solidFill>
-              <a:srgbClr val="F3B082"/>
+              <a:srgbClr val="EE8742"/>
             </a:solidFill>
-            <a:prstDash val="dash"/>
           </a:ln>
         </p:spPr>
         <p:style>
@@ -16856,485 +15018,6 @@
           </a:p>
         </p:txBody>
       </p:sp>
-      <p:grpSp>
-        <p:nvGrpSpPr>
-          <p:cNvPr id="36" name="Group 35"/>
-          <p:cNvGrpSpPr>
-            <a:grpSpLocks/>
-          </p:cNvGrpSpPr>
-          <p:nvPr/>
-        </p:nvGrpSpPr>
-        <p:grpSpPr>
-          <a:xfrm>
-            <a:off x="4892357" y="4928613"/>
-            <a:ext cx="1133642" cy="1133642"/>
-            <a:chOff x="5529179" y="4691547"/>
-            <a:chExt cx="1133642" cy="1133642"/>
-          </a:xfrm>
-        </p:grpSpPr>
-        <p:sp>
-          <p:nvSpPr>
-            <p:cNvPr id="185" name="Rectangle 184"/>
-            <p:cNvSpPr>
-              <a:spLocks noChangeAspect="1"/>
-            </p:cNvSpPr>
-            <p:nvPr/>
-          </p:nvSpPr>
-          <p:spPr>
-            <a:xfrm>
-              <a:off x="5529179" y="4691547"/>
-              <a:ext cx="1133642" cy="1133642"/>
-            </a:xfrm>
-            <a:prstGeom prst="rect">
-              <a:avLst/>
-            </a:prstGeom>
-            <a:solidFill>
-              <a:srgbClr val="ED7D31"/>
-            </a:solidFill>
-            <a:ln>
-              <a:solidFill>
-                <a:srgbClr val="F3B082"/>
-              </a:solidFill>
-            </a:ln>
-          </p:spPr>
-          <p:style>
-            <a:lnRef idx="2">
-              <a:schemeClr val="accent1">
-                <a:shade val="50000"/>
-              </a:schemeClr>
-            </a:lnRef>
-            <a:fillRef idx="1">
-              <a:schemeClr val="accent1"/>
-            </a:fillRef>
-            <a:effectRef idx="0">
-              <a:schemeClr val="accent1"/>
-            </a:effectRef>
-            <a:fontRef idx="minor">
-              <a:schemeClr val="lt1"/>
-            </a:fontRef>
-          </p:style>
-          <p:txBody>
-            <a:bodyPr rtlCol="0" anchor="ctr"/>
-            <a:lstStyle/>
-            <a:p>
-              <a:pPr algn="ctr"/>
-              <a:endParaRPr lang="en-US"/>
-            </a:p>
-          </p:txBody>
-        </p:sp>
-        <p:sp>
-          <p:nvSpPr>
-            <p:cNvPr id="186" name="Rectangle 185"/>
-            <p:cNvSpPr>
-              <a:spLocks noChangeAspect="1"/>
-            </p:cNvSpPr>
-            <p:nvPr/>
-          </p:nvSpPr>
-          <p:spPr>
-            <a:xfrm>
-              <a:off x="5783179" y="4945547"/>
-              <a:ext cx="625642" cy="625642"/>
-            </a:xfrm>
-            <a:prstGeom prst="rect">
-              <a:avLst/>
-            </a:prstGeom>
-            <a:solidFill>
-              <a:schemeClr val="accent4">
-                <a:alpha val="30000"/>
-              </a:schemeClr>
-            </a:solidFill>
-            <a:ln>
-              <a:solidFill>
-                <a:srgbClr val="F3B082"/>
-              </a:solidFill>
-              <a:prstDash val="dash"/>
-            </a:ln>
-          </p:spPr>
-          <p:style>
-            <a:lnRef idx="2">
-              <a:schemeClr val="accent1">
-                <a:shade val="50000"/>
-              </a:schemeClr>
-            </a:lnRef>
-            <a:fillRef idx="1">
-              <a:schemeClr val="accent1"/>
-            </a:fillRef>
-            <a:effectRef idx="0">
-              <a:schemeClr val="accent1"/>
-            </a:effectRef>
-            <a:fontRef idx="minor">
-              <a:schemeClr val="lt1"/>
-            </a:fontRef>
-          </p:style>
-          <p:txBody>
-            <a:bodyPr rtlCol="0" anchor="ctr"/>
-            <a:lstStyle/>
-            <a:p>
-              <a:pPr algn="ctr"/>
-              <a:endParaRPr lang="en-US"/>
-            </a:p>
-          </p:txBody>
-        </p:sp>
-      </p:grpSp>
-      <p:sp>
-        <p:nvSpPr>
-          <p:cNvPr id="187" name="Rectangle 186"/>
-          <p:cNvSpPr>
-            <a:spLocks noChangeAspect="1"/>
-          </p:cNvSpPr>
-          <p:nvPr/>
-        </p:nvSpPr>
-        <p:spPr>
-          <a:xfrm>
-            <a:off x="6159481" y="4928613"/>
-            <a:ext cx="1133642" cy="1133642"/>
-          </a:xfrm>
-          <a:prstGeom prst="rect">
-            <a:avLst/>
-          </a:prstGeom>
-          <a:solidFill>
-            <a:srgbClr val="ED7D31"/>
-          </a:solidFill>
-          <a:ln>
-            <a:solidFill>
-              <a:srgbClr val="F3B082"/>
-            </a:solidFill>
-          </a:ln>
-        </p:spPr>
-        <p:style>
-          <a:lnRef idx="2">
-            <a:schemeClr val="accent1">
-              <a:shade val="50000"/>
-            </a:schemeClr>
-          </a:lnRef>
-          <a:fillRef idx="1">
-            <a:schemeClr val="accent1"/>
-          </a:fillRef>
-          <a:effectRef idx="0">
-            <a:schemeClr val="accent1"/>
-          </a:effectRef>
-          <a:fontRef idx="minor">
-            <a:schemeClr val="lt1"/>
-          </a:fontRef>
-        </p:style>
-        <p:txBody>
-          <a:bodyPr rtlCol="0" anchor="ctr"/>
-          <a:lstStyle/>
-          <a:p>
-            <a:pPr algn="ctr"/>
-            <a:endParaRPr lang="en-US"/>
-          </a:p>
-        </p:txBody>
-      </p:sp>
-      <p:sp>
-        <p:nvSpPr>
-          <p:cNvPr id="188" name="Rectangle 187"/>
-          <p:cNvSpPr>
-            <a:spLocks noChangeAspect="1"/>
-          </p:cNvSpPr>
-          <p:nvPr/>
-        </p:nvSpPr>
-        <p:spPr>
-          <a:xfrm>
-            <a:off x="6667481" y="5182613"/>
-            <a:ext cx="625642" cy="625642"/>
-          </a:xfrm>
-          <a:prstGeom prst="rect">
-            <a:avLst/>
-          </a:prstGeom>
-          <a:solidFill>
-            <a:schemeClr val="accent4">
-              <a:alpha val="30000"/>
-            </a:schemeClr>
-          </a:solidFill>
-          <a:ln>
-            <a:solidFill>
-              <a:srgbClr val="F3B082"/>
-            </a:solidFill>
-            <a:prstDash val="dash"/>
-          </a:ln>
-        </p:spPr>
-        <p:style>
-          <a:lnRef idx="2">
-            <a:schemeClr val="accent1">
-              <a:shade val="50000"/>
-            </a:schemeClr>
-          </a:lnRef>
-          <a:fillRef idx="1">
-            <a:schemeClr val="accent1"/>
-          </a:fillRef>
-          <a:effectRef idx="0">
-            <a:schemeClr val="accent1"/>
-          </a:effectRef>
-          <a:fontRef idx="minor">
-            <a:schemeClr val="lt1"/>
-          </a:fontRef>
-        </p:style>
-        <p:txBody>
-          <a:bodyPr rtlCol="0" anchor="ctr"/>
-          <a:lstStyle/>
-          <a:p>
-            <a:pPr algn="ctr"/>
-            <a:endParaRPr lang="en-US"/>
-          </a:p>
-        </p:txBody>
-      </p:sp>
-      <p:sp>
-        <p:nvSpPr>
-          <p:cNvPr id="189" name="Rectangle 188"/>
-          <p:cNvSpPr>
-            <a:spLocks noChangeAspect="1"/>
-          </p:cNvSpPr>
-          <p:nvPr/>
-        </p:nvSpPr>
-        <p:spPr>
-          <a:xfrm>
-            <a:off x="8188603" y="4674614"/>
-            <a:ext cx="1133642" cy="1133642"/>
-          </a:xfrm>
-          <a:prstGeom prst="rect">
-            <a:avLst/>
-          </a:prstGeom>
-          <a:solidFill>
-            <a:srgbClr val="ED7D31"/>
-          </a:solidFill>
-          <a:ln>
-            <a:solidFill>
-              <a:srgbClr val="F3B082"/>
-            </a:solidFill>
-          </a:ln>
-        </p:spPr>
-        <p:style>
-          <a:lnRef idx="2">
-            <a:schemeClr val="accent1">
-              <a:shade val="50000"/>
-            </a:schemeClr>
-          </a:lnRef>
-          <a:fillRef idx="1">
-            <a:schemeClr val="accent1"/>
-          </a:fillRef>
-          <a:effectRef idx="0">
-            <a:schemeClr val="accent1"/>
-          </a:effectRef>
-          <a:fontRef idx="minor">
-            <a:schemeClr val="lt1"/>
-          </a:fontRef>
-        </p:style>
-        <p:txBody>
-          <a:bodyPr rtlCol="0" anchor="ctr"/>
-          <a:lstStyle/>
-          <a:p>
-            <a:pPr algn="ctr"/>
-            <a:endParaRPr lang="en-US"/>
-          </a:p>
-        </p:txBody>
-      </p:sp>
-      <p:sp>
-        <p:nvSpPr>
-          <p:cNvPr id="190" name="Rectangle 189"/>
-          <p:cNvSpPr>
-            <a:spLocks noChangeAspect="1"/>
-          </p:cNvSpPr>
-          <p:nvPr/>
-        </p:nvSpPr>
-        <p:spPr>
-          <a:xfrm>
-            <a:off x="8188603" y="5182614"/>
-            <a:ext cx="625642" cy="625642"/>
-          </a:xfrm>
-          <a:prstGeom prst="rect">
-            <a:avLst/>
-          </a:prstGeom>
-          <a:solidFill>
-            <a:schemeClr val="accent4">
-              <a:alpha val="30000"/>
-            </a:schemeClr>
-          </a:solidFill>
-          <a:ln>
-            <a:solidFill>
-              <a:srgbClr val="F3B082"/>
-            </a:solidFill>
-            <a:prstDash val="dash"/>
-          </a:ln>
-        </p:spPr>
-        <p:style>
-          <a:lnRef idx="2">
-            <a:schemeClr val="accent1">
-              <a:shade val="50000"/>
-            </a:schemeClr>
-          </a:lnRef>
-          <a:fillRef idx="1">
-            <a:schemeClr val="accent1"/>
-          </a:fillRef>
-          <a:effectRef idx="0">
-            <a:schemeClr val="accent1"/>
-          </a:effectRef>
-          <a:fontRef idx="minor">
-            <a:schemeClr val="lt1"/>
-          </a:fontRef>
-        </p:style>
-        <p:txBody>
-          <a:bodyPr rtlCol="0" anchor="ctr"/>
-          <a:lstStyle/>
-          <a:p>
-            <a:pPr algn="ctr"/>
-            <a:endParaRPr lang="en-US"/>
-          </a:p>
-        </p:txBody>
-      </p:sp>
-      <p:sp>
-        <p:nvSpPr>
-          <p:cNvPr id="191" name="Rectangle 190"/>
-          <p:cNvSpPr>
-            <a:spLocks noChangeAspect="1"/>
-          </p:cNvSpPr>
-          <p:nvPr/>
-        </p:nvSpPr>
-        <p:spPr>
-          <a:xfrm>
-            <a:off x="9455726" y="4674614"/>
-            <a:ext cx="1133642" cy="1133642"/>
-          </a:xfrm>
-          <a:prstGeom prst="rect">
-            <a:avLst/>
-          </a:prstGeom>
-          <a:solidFill>
-            <a:srgbClr val="ED7D31"/>
-          </a:solidFill>
-          <a:ln>
-            <a:solidFill>
-              <a:srgbClr val="F3B082"/>
-            </a:solidFill>
-          </a:ln>
-        </p:spPr>
-        <p:style>
-          <a:lnRef idx="2">
-            <a:schemeClr val="accent1">
-              <a:shade val="50000"/>
-            </a:schemeClr>
-          </a:lnRef>
-          <a:fillRef idx="1">
-            <a:schemeClr val="accent1"/>
-          </a:fillRef>
-          <a:effectRef idx="0">
-            <a:schemeClr val="accent1"/>
-          </a:effectRef>
-          <a:fontRef idx="minor">
-            <a:schemeClr val="lt1"/>
-          </a:fontRef>
-        </p:style>
-        <p:txBody>
-          <a:bodyPr rtlCol="0" anchor="ctr"/>
-          <a:lstStyle/>
-          <a:p>
-            <a:pPr algn="ctr"/>
-            <a:endParaRPr lang="en-US"/>
-          </a:p>
-        </p:txBody>
-      </p:sp>
-      <p:sp>
-        <p:nvSpPr>
-          <p:cNvPr id="192" name="Rectangle 191"/>
-          <p:cNvSpPr>
-            <a:spLocks noChangeAspect="1"/>
-          </p:cNvSpPr>
-          <p:nvPr/>
-        </p:nvSpPr>
-        <p:spPr>
-          <a:xfrm>
-            <a:off x="9709726" y="5182614"/>
-            <a:ext cx="625642" cy="625642"/>
-          </a:xfrm>
-          <a:prstGeom prst="rect">
-            <a:avLst/>
-          </a:prstGeom>
-          <a:solidFill>
-            <a:schemeClr val="accent4">
-              <a:alpha val="30000"/>
-            </a:schemeClr>
-          </a:solidFill>
-          <a:ln>
-            <a:solidFill>
-              <a:srgbClr val="F3B082"/>
-            </a:solidFill>
-            <a:prstDash val="dash"/>
-          </a:ln>
-        </p:spPr>
-        <p:style>
-          <a:lnRef idx="2">
-            <a:schemeClr val="accent1">
-              <a:shade val="50000"/>
-            </a:schemeClr>
-          </a:lnRef>
-          <a:fillRef idx="1">
-            <a:schemeClr val="accent1"/>
-          </a:fillRef>
-          <a:effectRef idx="0">
-            <a:schemeClr val="accent1"/>
-          </a:effectRef>
-          <a:fontRef idx="minor">
-            <a:schemeClr val="lt1"/>
-          </a:fontRef>
-        </p:style>
-        <p:txBody>
-          <a:bodyPr rtlCol="0" anchor="ctr"/>
-          <a:lstStyle/>
-          <a:p>
-            <a:pPr algn="ctr"/>
-            <a:endParaRPr lang="en-US"/>
-          </a:p>
-        </p:txBody>
-      </p:sp>
-      <p:sp>
-        <p:nvSpPr>
-          <p:cNvPr id="193" name="Rectangle 192"/>
-          <p:cNvSpPr>
-            <a:spLocks noChangeAspect="1"/>
-          </p:cNvSpPr>
-          <p:nvPr/>
-        </p:nvSpPr>
-        <p:spPr>
-          <a:xfrm>
-            <a:off x="10722851" y="4674613"/>
-            <a:ext cx="1133642" cy="1133642"/>
-          </a:xfrm>
-          <a:prstGeom prst="rect">
-            <a:avLst/>
-          </a:prstGeom>
-          <a:solidFill>
-            <a:srgbClr val="ED7D31"/>
-          </a:solidFill>
-          <a:ln>
-            <a:solidFill>
-              <a:srgbClr val="F3B082"/>
-            </a:solidFill>
-          </a:ln>
-        </p:spPr>
-        <p:style>
-          <a:lnRef idx="2">
-            <a:schemeClr val="accent1">
-              <a:shade val="50000"/>
-            </a:schemeClr>
-          </a:lnRef>
-          <a:fillRef idx="1">
-            <a:schemeClr val="accent1"/>
-          </a:fillRef>
-          <a:effectRef idx="0">
-            <a:schemeClr val="accent1"/>
-          </a:effectRef>
-          <a:fontRef idx="minor">
-            <a:schemeClr val="lt1"/>
-          </a:fontRef>
-        </p:style>
-        <p:txBody>
-          <a:bodyPr rtlCol="0" anchor="ctr"/>
-          <a:lstStyle/>
-          <a:p>
-            <a:pPr algn="ctr"/>
-            <a:endParaRPr lang="en-US"/>
-          </a:p>
-        </p:txBody>
-      </p:sp>
       <p:sp>
         <p:nvSpPr>
           <p:cNvPr id="194" name="Rectangle 193"/>
@@ -17352,9 +15035,7 @@
             <a:avLst/>
           </a:prstGeom>
           <a:solidFill>
-            <a:schemeClr val="accent4">
-              <a:alpha val="30000"/>
-            </a:schemeClr>
+            <a:srgbClr val="ED7D31"/>
           </a:solidFill>
           <a:ln>
             <a:solidFill>
@@ -17408,7 +15089,7 @@
 </p:sld>
 </file>
 
-<file path=ppt/slides/slide32.xml><?xml version="1.0" encoding="utf-8"?>
+<file path=ppt/slides/slide31.xml><?xml version="1.0" encoding="utf-8"?>
 <p:sld xmlns:a="http://schemas.openxmlformats.org/drawingml/2006/main" xmlns:r="http://schemas.openxmlformats.org/officeDocument/2006/relationships" xmlns:p="http://schemas.openxmlformats.org/presentationml/2006/main">
   <p:cSld>
     <p:spTree>

</xml_diff>

<commit_message>
Updated resize lab examples
</commit_message>
<xml_diff>
--- a/doc/Examples-ResizeLab.pptx
+++ b/doc/Examples-ResizeLab.pptx
@@ -5,7 +5,7 @@
     <p:sldMasterId id="2147483648" r:id="rId1"/>
   </p:sldMasterIdLst>
   <p:notesMasterIdLst>
-    <p:notesMasterId r:id="rId20"/>
+    <p:notesMasterId r:id="rId19"/>
   </p:notesMasterIdLst>
   <p:sldIdLst>
     <p:sldId id="256" r:id="rId2"/>
@@ -20,12 +20,11 @@
     <p:sldId id="266" r:id="rId11"/>
     <p:sldId id="267" r:id="rId12"/>
     <p:sldId id="270" r:id="rId13"/>
-    <p:sldId id="271" r:id="rId14"/>
+    <p:sldId id="275" r:id="rId14"/>
     <p:sldId id="274" r:id="rId15"/>
     <p:sldId id="272" r:id="rId16"/>
     <p:sldId id="273" r:id="rId17"/>
     <p:sldId id="268" r:id="rId18"/>
-    <p:sldId id="265" r:id="rId19"/>
   </p:sldIdLst>
   <p:sldSz cx="9144000" cy="6858000" type="screen4x3"/>
   <p:notesSz cx="6858000" cy="9144000"/>
@@ -169,7 +168,7 @@
         <p14:section name="Settings" id="{009C9635-C8F2-4A03-AF82-287BA69E9319}">
           <p14:sldIdLst>
             <p14:sldId id="270"/>
-            <p14:sldId id="271"/>
+            <p14:sldId id="275"/>
             <p14:sldId id="274"/>
             <p14:sldId id="272"/>
             <p14:sldId id="273"/>
@@ -178,13 +177,12 @@
         <p14:section name="Unimplemented" id="{4CAA046B-BF2B-40C4-975B-B30F93ECEB3D}">
           <p14:sldIdLst>
             <p14:sldId id="268"/>
-            <p14:sldId id="265"/>
           </p14:sldIdLst>
         </p14:section>
       </p14:sectionLst>
     </p:ext>
     <p:ext uri="{EFAFB233-063F-42B5-8137-9DF3F51BA10A}">
-      <p15:sldGuideLst xmlns:p15="http://schemas.microsoft.com/office/powerpoint/2012/main">
+      <p15:sldGuideLst xmlns="" xmlns:p15="http://schemas.microsoft.com/office/powerpoint/2012/main">
         <p15:guide id="1" orient="horz" pos="2160">
           <p15:clr>
             <a:srgbClr val="A4A3A4"/>
@@ -283,7 +281,7 @@
           <a:p>
             <a:fld id="{9977043E-3993-4B53-B253-438D686EFD8D}" type="datetimeFigureOut">
               <a:rPr lang="en-US" smtClean="0"/>
-              <a:t>5/19/2016</a:t>
+              <a:t>5/23/2016</a:t>
             </a:fld>
             <a:endParaRPr lang="en-US"/>
           </a:p>
@@ -913,7 +911,7 @@
             <a:fld id="{1D8BD707-D9CF-40AE-B4C6-C98DA3205C09}" type="datetimeFigureOut">
               <a:rPr lang="en-US" smtClean="0"/>
               <a:pPr/>
-              <a:t>5/19/2016</a:t>
+              <a:t>5/23/2016</a:t>
             </a:fld>
             <a:endParaRPr lang="en-US"/>
           </a:p>
@@ -1080,7 +1078,7 @@
             <a:fld id="{1D8BD707-D9CF-40AE-B4C6-C98DA3205C09}" type="datetimeFigureOut">
               <a:rPr lang="en-US" smtClean="0"/>
               <a:pPr/>
-              <a:t>5/19/2016</a:t>
+              <a:t>5/23/2016</a:t>
             </a:fld>
             <a:endParaRPr lang="en-US"/>
           </a:p>
@@ -1257,7 +1255,7 @@
             <a:fld id="{1D8BD707-D9CF-40AE-B4C6-C98DA3205C09}" type="datetimeFigureOut">
               <a:rPr lang="en-US" smtClean="0"/>
               <a:pPr/>
-              <a:t>5/19/2016</a:t>
+              <a:t>5/23/2016</a:t>
             </a:fld>
             <a:endParaRPr lang="en-US"/>
           </a:p>
@@ -1424,7 +1422,7 @@
             <a:fld id="{1D8BD707-D9CF-40AE-B4C6-C98DA3205C09}" type="datetimeFigureOut">
               <a:rPr lang="en-US" smtClean="0"/>
               <a:pPr/>
-              <a:t>5/19/2016</a:t>
+              <a:t>5/23/2016</a:t>
             </a:fld>
             <a:endParaRPr lang="en-US"/>
           </a:p>
@@ -1667,7 +1665,7 @@
             <a:fld id="{1D8BD707-D9CF-40AE-B4C6-C98DA3205C09}" type="datetimeFigureOut">
               <a:rPr lang="en-US" smtClean="0"/>
               <a:pPr/>
-              <a:t>5/19/2016</a:t>
+              <a:t>5/23/2016</a:t>
             </a:fld>
             <a:endParaRPr lang="en-US"/>
           </a:p>
@@ -1952,7 +1950,7 @@
             <a:fld id="{1D8BD707-D9CF-40AE-B4C6-C98DA3205C09}" type="datetimeFigureOut">
               <a:rPr lang="en-US" smtClean="0"/>
               <a:pPr/>
-              <a:t>5/19/2016</a:t>
+              <a:t>5/23/2016</a:t>
             </a:fld>
             <a:endParaRPr lang="en-US"/>
           </a:p>
@@ -2371,7 +2369,7 @@
             <a:fld id="{1D8BD707-D9CF-40AE-B4C6-C98DA3205C09}" type="datetimeFigureOut">
               <a:rPr lang="en-US" smtClean="0"/>
               <a:pPr/>
-              <a:t>5/19/2016</a:t>
+              <a:t>5/23/2016</a:t>
             </a:fld>
             <a:endParaRPr lang="en-US"/>
           </a:p>
@@ -2486,7 +2484,7 @@
             <a:fld id="{1D8BD707-D9CF-40AE-B4C6-C98DA3205C09}" type="datetimeFigureOut">
               <a:rPr lang="en-US" smtClean="0"/>
               <a:pPr/>
-              <a:t>5/19/2016</a:t>
+              <a:t>5/23/2016</a:t>
             </a:fld>
             <a:endParaRPr lang="en-US"/>
           </a:p>
@@ -2578,7 +2576,7 @@
             <a:fld id="{1D8BD707-D9CF-40AE-B4C6-C98DA3205C09}" type="datetimeFigureOut">
               <a:rPr lang="en-US" smtClean="0"/>
               <a:pPr/>
-              <a:t>5/19/2016</a:t>
+              <a:t>5/23/2016</a:t>
             </a:fld>
             <a:endParaRPr lang="en-US"/>
           </a:p>
@@ -2852,7 +2850,7 @@
             <a:fld id="{1D8BD707-D9CF-40AE-B4C6-C98DA3205C09}" type="datetimeFigureOut">
               <a:rPr lang="en-US" smtClean="0"/>
               <a:pPr/>
-              <a:t>5/19/2016</a:t>
+              <a:t>5/23/2016</a:t>
             </a:fld>
             <a:endParaRPr lang="en-US"/>
           </a:p>
@@ -3102,7 +3100,7 @@
             <a:fld id="{1D8BD707-D9CF-40AE-B4C6-C98DA3205C09}" type="datetimeFigureOut">
               <a:rPr lang="en-US" smtClean="0"/>
               <a:pPr/>
-              <a:t>5/19/2016</a:t>
+              <a:t>5/23/2016</a:t>
             </a:fld>
             <a:endParaRPr lang="en-US"/>
           </a:p>
@@ -3312,7 +3310,7 @@
             <a:fld id="{1D8BD707-D9CF-40AE-B4C6-C98DA3205C09}" type="datetimeFigureOut">
               <a:rPr lang="en-US" smtClean="0"/>
               <a:pPr/>
-              <a:t>5/19/2016</a:t>
+              <a:t>5/23/2016</a:t>
             </a:fld>
             <a:endParaRPr lang="en-US"/>
           </a:p>
@@ -5974,699 +5972,6 @@
           </a:p>
         </p:txBody>
       </p:sp>
-      <p:cxnSp>
-        <p:nvCxnSpPr>
-          <p:cNvPr id="50" name="Straight Arrow Connector 15"/>
-          <p:cNvCxnSpPr>
-            <a:cxnSpLocks/>
-          </p:cNvCxnSpPr>
-          <p:nvPr/>
-        </p:nvCxnSpPr>
-        <p:spPr>
-          <a:xfrm>
-            <a:off x="-51050" y="3479334"/>
-            <a:ext cx="0" cy="746944"/>
-          </a:xfrm>
-          <a:prstGeom prst="straightConnector1">
-            <a:avLst/>
-          </a:prstGeom>
-          <a:ln w="63500">
-            <a:solidFill>
-              <a:srgbClr val="C64F00"/>
-            </a:solidFill>
-            <a:tailEnd type="stealth" w="lg" len="lg"/>
-          </a:ln>
-        </p:spPr>
-        <p:style>
-          <a:lnRef idx="1">
-            <a:schemeClr val="accent1"/>
-          </a:lnRef>
-          <a:fillRef idx="0">
-            <a:schemeClr val="accent1"/>
-          </a:fillRef>
-          <a:effectRef idx="0">
-            <a:schemeClr val="accent1"/>
-          </a:effectRef>
-          <a:fontRef idx="minor">
-            <a:schemeClr val="tx1"/>
-          </a:fontRef>
-        </p:style>
-      </p:cxnSp>
-      <p:cxnSp>
-        <p:nvCxnSpPr>
-          <p:cNvPr id="51" name="Straight Arrow Connector 15"/>
-          <p:cNvCxnSpPr>
-            <a:cxnSpLocks/>
-          </p:cNvCxnSpPr>
-          <p:nvPr/>
-        </p:nvCxnSpPr>
-        <p:spPr>
-          <a:xfrm>
-            <a:off x="1122056" y="3479334"/>
-            <a:ext cx="0" cy="746944"/>
-          </a:xfrm>
-          <a:prstGeom prst="straightConnector1">
-            <a:avLst/>
-          </a:prstGeom>
-          <a:ln w="63500">
-            <a:solidFill>
-              <a:srgbClr val="C64F00"/>
-            </a:solidFill>
-            <a:tailEnd type="stealth" w="lg" len="lg"/>
-          </a:ln>
-        </p:spPr>
-        <p:style>
-          <a:lnRef idx="1">
-            <a:schemeClr val="accent1"/>
-          </a:lnRef>
-          <a:fillRef idx="0">
-            <a:schemeClr val="accent1"/>
-          </a:fillRef>
-          <a:effectRef idx="0">
-            <a:schemeClr val="accent1"/>
-          </a:effectRef>
-          <a:fontRef idx="minor">
-            <a:schemeClr val="tx1"/>
-          </a:fontRef>
-        </p:style>
-      </p:cxnSp>
-      <p:cxnSp>
-        <p:nvCxnSpPr>
-          <p:cNvPr id="52" name="Straight Arrow Connector 15"/>
-          <p:cNvCxnSpPr>
-            <a:cxnSpLocks/>
-          </p:cNvCxnSpPr>
-          <p:nvPr/>
-        </p:nvCxnSpPr>
-        <p:spPr>
-          <a:xfrm>
-            <a:off x="2295162" y="3479334"/>
-            <a:ext cx="0" cy="746944"/>
-          </a:xfrm>
-          <a:prstGeom prst="straightConnector1">
-            <a:avLst/>
-          </a:prstGeom>
-          <a:ln w="63500">
-            <a:solidFill>
-              <a:srgbClr val="C64F00"/>
-            </a:solidFill>
-            <a:tailEnd type="stealth" w="lg" len="lg"/>
-          </a:ln>
-        </p:spPr>
-        <p:style>
-          <a:lnRef idx="1">
-            <a:schemeClr val="accent1"/>
-          </a:lnRef>
-          <a:fillRef idx="0">
-            <a:schemeClr val="accent1"/>
-          </a:fillRef>
-          <a:effectRef idx="0">
-            <a:schemeClr val="accent1"/>
-          </a:effectRef>
-          <a:fontRef idx="minor">
-            <a:schemeClr val="tx1"/>
-          </a:fontRef>
-        </p:style>
-      </p:cxnSp>
-      <p:cxnSp>
-        <p:nvCxnSpPr>
-          <p:cNvPr id="53" name="Straight Arrow Connector 15"/>
-          <p:cNvCxnSpPr>
-            <a:cxnSpLocks/>
-          </p:cNvCxnSpPr>
-          <p:nvPr/>
-        </p:nvCxnSpPr>
-        <p:spPr>
-          <a:xfrm>
-            <a:off x="3468268" y="3479334"/>
-            <a:ext cx="0" cy="746944"/>
-          </a:xfrm>
-          <a:prstGeom prst="straightConnector1">
-            <a:avLst/>
-          </a:prstGeom>
-          <a:ln w="63500">
-            <a:solidFill>
-              <a:srgbClr val="C64F00"/>
-            </a:solidFill>
-            <a:tailEnd type="stealth" w="lg" len="lg"/>
-          </a:ln>
-        </p:spPr>
-        <p:style>
-          <a:lnRef idx="1">
-            <a:schemeClr val="accent1"/>
-          </a:lnRef>
-          <a:fillRef idx="0">
-            <a:schemeClr val="accent1"/>
-          </a:fillRef>
-          <a:effectRef idx="0">
-            <a:schemeClr val="accent1"/>
-          </a:effectRef>
-          <a:fontRef idx="minor">
-            <a:schemeClr val="tx1"/>
-          </a:fontRef>
-        </p:style>
-      </p:cxnSp>
-      <p:cxnSp>
-        <p:nvCxnSpPr>
-          <p:cNvPr id="55" name="Straight Arrow Connector 15"/>
-          <p:cNvCxnSpPr>
-            <a:cxnSpLocks/>
-          </p:cNvCxnSpPr>
-          <p:nvPr/>
-        </p:nvCxnSpPr>
-        <p:spPr>
-          <a:xfrm>
-            <a:off x="4641375" y="3479334"/>
-            <a:ext cx="0" cy="746944"/>
-          </a:xfrm>
-          <a:prstGeom prst="straightConnector1">
-            <a:avLst/>
-          </a:prstGeom>
-          <a:ln w="63500">
-            <a:solidFill>
-              <a:srgbClr val="C64F00"/>
-            </a:solidFill>
-            <a:tailEnd type="stealth" w="lg" len="lg"/>
-          </a:ln>
-        </p:spPr>
-        <p:style>
-          <a:lnRef idx="1">
-            <a:schemeClr val="accent1"/>
-          </a:lnRef>
-          <a:fillRef idx="0">
-            <a:schemeClr val="accent1"/>
-          </a:fillRef>
-          <a:effectRef idx="0">
-            <a:schemeClr val="accent1"/>
-          </a:effectRef>
-          <a:fontRef idx="minor">
-            <a:schemeClr val="tx1"/>
-          </a:fontRef>
-        </p:style>
-      </p:cxnSp>
-      <p:cxnSp>
-        <p:nvCxnSpPr>
-          <p:cNvPr id="56" name="Straight Arrow Connector 15"/>
-          <p:cNvCxnSpPr>
-            <a:cxnSpLocks/>
-          </p:cNvCxnSpPr>
-          <p:nvPr/>
-        </p:nvCxnSpPr>
-        <p:spPr>
-          <a:xfrm>
-            <a:off x="5814481" y="3479334"/>
-            <a:ext cx="0" cy="746944"/>
-          </a:xfrm>
-          <a:prstGeom prst="straightConnector1">
-            <a:avLst/>
-          </a:prstGeom>
-          <a:ln w="63500">
-            <a:solidFill>
-              <a:srgbClr val="C64F00"/>
-            </a:solidFill>
-            <a:tailEnd type="stealth" w="lg" len="lg"/>
-          </a:ln>
-        </p:spPr>
-        <p:style>
-          <a:lnRef idx="1">
-            <a:schemeClr val="accent1"/>
-          </a:lnRef>
-          <a:fillRef idx="0">
-            <a:schemeClr val="accent1"/>
-          </a:fillRef>
-          <a:effectRef idx="0">
-            <a:schemeClr val="accent1"/>
-          </a:effectRef>
-          <a:fontRef idx="minor">
-            <a:schemeClr val="tx1"/>
-          </a:fontRef>
-        </p:style>
-      </p:cxnSp>
-      <p:cxnSp>
-        <p:nvCxnSpPr>
-          <p:cNvPr id="57" name="Straight Arrow Connector 15"/>
-          <p:cNvCxnSpPr>
-            <a:cxnSpLocks/>
-          </p:cNvCxnSpPr>
-          <p:nvPr/>
-        </p:nvCxnSpPr>
-        <p:spPr>
-          <a:xfrm>
-            <a:off x="6987588" y="3479334"/>
-            <a:ext cx="0" cy="746944"/>
-          </a:xfrm>
-          <a:prstGeom prst="straightConnector1">
-            <a:avLst/>
-          </a:prstGeom>
-          <a:ln w="63500">
-            <a:solidFill>
-              <a:srgbClr val="C64F00"/>
-            </a:solidFill>
-            <a:tailEnd type="stealth" w="lg" len="lg"/>
-          </a:ln>
-        </p:spPr>
-        <p:style>
-          <a:lnRef idx="1">
-            <a:schemeClr val="accent1"/>
-          </a:lnRef>
-          <a:fillRef idx="0">
-            <a:schemeClr val="accent1"/>
-          </a:fillRef>
-          <a:effectRef idx="0">
-            <a:schemeClr val="accent1"/>
-          </a:effectRef>
-          <a:fontRef idx="minor">
-            <a:schemeClr val="tx1"/>
-          </a:fontRef>
-        </p:style>
-      </p:cxnSp>
-      <p:cxnSp>
-        <p:nvCxnSpPr>
-          <p:cNvPr id="60" name="Straight Arrow Connector 15"/>
-          <p:cNvCxnSpPr>
-            <a:cxnSpLocks/>
-          </p:cNvCxnSpPr>
-          <p:nvPr/>
-        </p:nvCxnSpPr>
-        <p:spPr>
-          <a:xfrm>
-            <a:off x="8160693" y="3479334"/>
-            <a:ext cx="0" cy="746944"/>
-          </a:xfrm>
-          <a:prstGeom prst="straightConnector1">
-            <a:avLst/>
-          </a:prstGeom>
-          <a:ln w="63500">
-            <a:solidFill>
-              <a:srgbClr val="C64F00"/>
-            </a:solidFill>
-            <a:tailEnd type="stealth" w="lg" len="lg"/>
-          </a:ln>
-        </p:spPr>
-        <p:style>
-          <a:lnRef idx="1">
-            <a:schemeClr val="accent1"/>
-          </a:lnRef>
-          <a:fillRef idx="0">
-            <a:schemeClr val="accent1"/>
-          </a:fillRef>
-          <a:effectRef idx="0">
-            <a:schemeClr val="accent1"/>
-          </a:effectRef>
-          <a:fontRef idx="minor">
-            <a:schemeClr val="tx1"/>
-          </a:fontRef>
-        </p:style>
-      </p:cxnSp>
-      <p:cxnSp>
-        <p:nvCxnSpPr>
-          <p:cNvPr id="61" name="Straight Arrow Connector 15"/>
-          <p:cNvCxnSpPr>
-            <a:cxnSpLocks/>
-            <a:endCxn id="75" idx="0"/>
-          </p:cNvCxnSpPr>
-          <p:nvPr/>
-        </p:nvCxnSpPr>
-        <p:spPr>
-          <a:xfrm flipH="1">
-            <a:off x="-51050" y="1962005"/>
-            <a:ext cx="5183547" cy="914218"/>
-          </a:xfrm>
-          <a:prstGeom prst="straightConnector1">
-            <a:avLst/>
-          </a:prstGeom>
-          <a:ln w="63500">
-            <a:solidFill>
-              <a:srgbClr val="C64F00"/>
-            </a:solidFill>
-            <a:tailEnd type="none" w="lg" len="lg"/>
-          </a:ln>
-        </p:spPr>
-        <p:style>
-          <a:lnRef idx="1">
-            <a:schemeClr val="accent1"/>
-          </a:lnRef>
-          <a:fillRef idx="0">
-            <a:schemeClr val="accent1"/>
-          </a:fillRef>
-          <a:effectRef idx="0">
-            <a:schemeClr val="accent1"/>
-          </a:effectRef>
-          <a:fontRef idx="minor">
-            <a:schemeClr val="tx1"/>
-          </a:fontRef>
-        </p:style>
-      </p:cxnSp>
-      <p:cxnSp>
-        <p:nvCxnSpPr>
-          <p:cNvPr id="63" name="Straight Arrow Connector 15"/>
-          <p:cNvCxnSpPr>
-            <a:cxnSpLocks/>
-            <a:endCxn id="76" idx="0"/>
-          </p:cNvCxnSpPr>
-          <p:nvPr/>
-        </p:nvCxnSpPr>
-        <p:spPr>
-          <a:xfrm flipH="1">
-            <a:off x="1122056" y="1962005"/>
-            <a:ext cx="4010441" cy="914218"/>
-          </a:xfrm>
-          <a:prstGeom prst="straightConnector1">
-            <a:avLst/>
-          </a:prstGeom>
-          <a:ln w="63500">
-            <a:solidFill>
-              <a:srgbClr val="C64F00"/>
-            </a:solidFill>
-            <a:tailEnd type="none" w="lg" len="lg"/>
-          </a:ln>
-        </p:spPr>
-        <p:style>
-          <a:lnRef idx="1">
-            <a:schemeClr val="accent1"/>
-          </a:lnRef>
-          <a:fillRef idx="0">
-            <a:schemeClr val="accent1"/>
-          </a:fillRef>
-          <a:effectRef idx="0">
-            <a:schemeClr val="accent1"/>
-          </a:effectRef>
-          <a:fontRef idx="minor">
-            <a:schemeClr val="tx1"/>
-          </a:fontRef>
-        </p:style>
-      </p:cxnSp>
-      <p:cxnSp>
-        <p:nvCxnSpPr>
-          <p:cNvPr id="64" name="Straight Arrow Connector 15"/>
-          <p:cNvCxnSpPr>
-            <a:cxnSpLocks/>
-            <a:endCxn id="78" idx="0"/>
-          </p:cNvCxnSpPr>
-          <p:nvPr/>
-        </p:nvCxnSpPr>
-        <p:spPr>
-          <a:xfrm flipH="1">
-            <a:off x="2295163" y="1962005"/>
-            <a:ext cx="2837334" cy="914218"/>
-          </a:xfrm>
-          <a:prstGeom prst="straightConnector1">
-            <a:avLst/>
-          </a:prstGeom>
-          <a:ln w="63500">
-            <a:solidFill>
-              <a:srgbClr val="C64F00"/>
-            </a:solidFill>
-            <a:tailEnd type="none" w="lg" len="lg"/>
-          </a:ln>
-        </p:spPr>
-        <p:style>
-          <a:lnRef idx="1">
-            <a:schemeClr val="accent1"/>
-          </a:lnRef>
-          <a:fillRef idx="0">
-            <a:schemeClr val="accent1"/>
-          </a:fillRef>
-          <a:effectRef idx="0">
-            <a:schemeClr val="accent1"/>
-          </a:effectRef>
-          <a:fontRef idx="minor">
-            <a:schemeClr val="tx1"/>
-          </a:fontRef>
-        </p:style>
-      </p:cxnSp>
-      <p:cxnSp>
-        <p:nvCxnSpPr>
-          <p:cNvPr id="65" name="Straight Arrow Connector 15"/>
-          <p:cNvCxnSpPr>
-            <a:cxnSpLocks/>
-            <a:endCxn id="79" idx="0"/>
-          </p:cNvCxnSpPr>
-          <p:nvPr/>
-        </p:nvCxnSpPr>
-        <p:spPr>
-          <a:xfrm flipH="1">
-            <a:off x="3468269" y="1962005"/>
-            <a:ext cx="1664228" cy="914218"/>
-          </a:xfrm>
-          <a:prstGeom prst="straightConnector1">
-            <a:avLst/>
-          </a:prstGeom>
-          <a:ln w="63500">
-            <a:solidFill>
-              <a:srgbClr val="C64F00"/>
-            </a:solidFill>
-            <a:tailEnd type="none" w="lg" len="lg"/>
-          </a:ln>
-        </p:spPr>
-        <p:style>
-          <a:lnRef idx="1">
-            <a:schemeClr val="accent1"/>
-          </a:lnRef>
-          <a:fillRef idx="0">
-            <a:schemeClr val="accent1"/>
-          </a:fillRef>
-          <a:effectRef idx="0">
-            <a:schemeClr val="accent1"/>
-          </a:effectRef>
-          <a:fontRef idx="minor">
-            <a:schemeClr val="tx1"/>
-          </a:fontRef>
-        </p:style>
-      </p:cxnSp>
-      <p:cxnSp>
-        <p:nvCxnSpPr>
-          <p:cNvPr id="67" name="Straight Arrow Connector 15"/>
-          <p:cNvCxnSpPr>
-            <a:cxnSpLocks/>
-            <a:endCxn id="81" idx="0"/>
-          </p:cNvCxnSpPr>
-          <p:nvPr/>
-        </p:nvCxnSpPr>
-        <p:spPr>
-          <a:xfrm flipH="1">
-            <a:off x="4641376" y="1962005"/>
-            <a:ext cx="491121" cy="914218"/>
-          </a:xfrm>
-          <a:prstGeom prst="straightConnector1">
-            <a:avLst/>
-          </a:prstGeom>
-          <a:ln w="63500">
-            <a:solidFill>
-              <a:srgbClr val="C64F00"/>
-            </a:solidFill>
-            <a:tailEnd type="none" w="lg" len="lg"/>
-          </a:ln>
-        </p:spPr>
-        <p:style>
-          <a:lnRef idx="1">
-            <a:schemeClr val="accent1"/>
-          </a:lnRef>
-          <a:fillRef idx="0">
-            <a:schemeClr val="accent1"/>
-          </a:fillRef>
-          <a:effectRef idx="0">
-            <a:schemeClr val="accent1"/>
-          </a:effectRef>
-          <a:fontRef idx="minor">
-            <a:schemeClr val="tx1"/>
-          </a:fontRef>
-        </p:style>
-      </p:cxnSp>
-      <p:cxnSp>
-        <p:nvCxnSpPr>
-          <p:cNvPr id="68" name="Straight Arrow Connector 15"/>
-          <p:cNvCxnSpPr>
-            <a:cxnSpLocks/>
-            <a:endCxn id="82" idx="0"/>
-          </p:cNvCxnSpPr>
-          <p:nvPr/>
-        </p:nvCxnSpPr>
-        <p:spPr>
-          <a:xfrm>
-            <a:off x="5132497" y="1962005"/>
-            <a:ext cx="681984" cy="914218"/>
-          </a:xfrm>
-          <a:prstGeom prst="straightConnector1">
-            <a:avLst/>
-          </a:prstGeom>
-          <a:ln w="63500">
-            <a:solidFill>
-              <a:srgbClr val="C64F00"/>
-            </a:solidFill>
-            <a:tailEnd type="none" w="lg" len="lg"/>
-          </a:ln>
-        </p:spPr>
-        <p:style>
-          <a:lnRef idx="1">
-            <a:schemeClr val="accent1"/>
-          </a:lnRef>
-          <a:fillRef idx="0">
-            <a:schemeClr val="accent1"/>
-          </a:fillRef>
-          <a:effectRef idx="0">
-            <a:schemeClr val="accent1"/>
-          </a:effectRef>
-          <a:fontRef idx="minor">
-            <a:schemeClr val="tx1"/>
-          </a:fontRef>
-        </p:style>
-      </p:cxnSp>
-      <p:cxnSp>
-        <p:nvCxnSpPr>
-          <p:cNvPr id="70" name="Straight Arrow Connector 15"/>
-          <p:cNvCxnSpPr>
-            <a:cxnSpLocks/>
-            <a:endCxn id="84" idx="0"/>
-          </p:cNvCxnSpPr>
-          <p:nvPr/>
-        </p:nvCxnSpPr>
-        <p:spPr>
-          <a:xfrm>
-            <a:off x="5108060" y="1962005"/>
-            <a:ext cx="1879527" cy="914218"/>
-          </a:xfrm>
-          <a:prstGeom prst="straightConnector1">
-            <a:avLst/>
-          </a:prstGeom>
-          <a:ln w="63500">
-            <a:solidFill>
-              <a:srgbClr val="C64F00"/>
-            </a:solidFill>
-            <a:tailEnd type="none" w="lg" len="lg"/>
-          </a:ln>
-        </p:spPr>
-        <p:style>
-          <a:lnRef idx="1">
-            <a:schemeClr val="accent1"/>
-          </a:lnRef>
-          <a:fillRef idx="0">
-            <a:schemeClr val="accent1"/>
-          </a:fillRef>
-          <a:effectRef idx="0">
-            <a:schemeClr val="accent1"/>
-          </a:effectRef>
-          <a:fontRef idx="minor">
-            <a:schemeClr val="tx1"/>
-          </a:fontRef>
-        </p:style>
-      </p:cxnSp>
-      <p:cxnSp>
-        <p:nvCxnSpPr>
-          <p:cNvPr id="71" name="Straight Arrow Connector 15"/>
-          <p:cNvCxnSpPr>
-            <a:cxnSpLocks/>
-            <a:endCxn id="85" idx="0"/>
-          </p:cNvCxnSpPr>
-          <p:nvPr/>
-        </p:nvCxnSpPr>
-        <p:spPr>
-          <a:xfrm>
-            <a:off x="5132497" y="1962005"/>
-            <a:ext cx="3028197" cy="914218"/>
-          </a:xfrm>
-          <a:prstGeom prst="straightConnector1">
-            <a:avLst/>
-          </a:prstGeom>
-          <a:ln w="63500">
-            <a:solidFill>
-              <a:srgbClr val="C64F00"/>
-            </a:solidFill>
-            <a:tailEnd type="none" w="lg" len="lg"/>
-          </a:ln>
-        </p:spPr>
-        <p:style>
-          <a:lnRef idx="1">
-            <a:schemeClr val="accent1"/>
-          </a:lnRef>
-          <a:fillRef idx="0">
-            <a:schemeClr val="accent1"/>
-          </a:fillRef>
-          <a:effectRef idx="0">
-            <a:schemeClr val="accent1"/>
-          </a:effectRef>
-          <a:fontRef idx="minor">
-            <a:schemeClr val="tx1"/>
-          </a:fontRef>
-        </p:style>
-      </p:cxnSp>
-      <p:cxnSp>
-        <p:nvCxnSpPr>
-          <p:cNvPr id="72" name="Straight Arrow Connector 15"/>
-          <p:cNvCxnSpPr>
-            <a:cxnSpLocks/>
-          </p:cNvCxnSpPr>
-          <p:nvPr/>
-        </p:nvCxnSpPr>
-        <p:spPr>
-          <a:xfrm>
-            <a:off x="9333799" y="3479334"/>
-            <a:ext cx="0" cy="746944"/>
-          </a:xfrm>
-          <a:prstGeom prst="straightConnector1">
-            <a:avLst/>
-          </a:prstGeom>
-          <a:ln w="63500">
-            <a:solidFill>
-              <a:srgbClr val="C64F00"/>
-            </a:solidFill>
-            <a:tailEnd type="stealth" w="lg" len="lg"/>
-          </a:ln>
-        </p:spPr>
-        <p:style>
-          <a:lnRef idx="1">
-            <a:schemeClr val="accent1"/>
-          </a:lnRef>
-          <a:fillRef idx="0">
-            <a:schemeClr val="accent1"/>
-          </a:fillRef>
-          <a:effectRef idx="0">
-            <a:schemeClr val="accent1"/>
-          </a:effectRef>
-          <a:fontRef idx="minor">
-            <a:schemeClr val="tx1"/>
-          </a:fontRef>
-        </p:style>
-      </p:cxnSp>
-      <p:cxnSp>
-        <p:nvCxnSpPr>
-          <p:cNvPr id="73" name="Straight Arrow Connector 15"/>
-          <p:cNvCxnSpPr>
-            <a:cxnSpLocks/>
-            <a:endCxn id="86" idx="0"/>
-          </p:cNvCxnSpPr>
-          <p:nvPr/>
-        </p:nvCxnSpPr>
-        <p:spPr>
-          <a:xfrm>
-            <a:off x="5132497" y="1962005"/>
-            <a:ext cx="4201302" cy="914218"/>
-          </a:xfrm>
-          <a:prstGeom prst="straightConnector1">
-            <a:avLst/>
-          </a:prstGeom>
-          <a:ln w="63500">
-            <a:solidFill>
-              <a:srgbClr val="C64F00"/>
-            </a:solidFill>
-            <a:tailEnd type="none" w="lg" len="lg"/>
-          </a:ln>
-        </p:spPr>
-        <p:style>
-          <a:lnRef idx="1">
-            <a:schemeClr val="accent1"/>
-          </a:lnRef>
-          <a:fillRef idx="0">
-            <a:schemeClr val="accent1"/>
-          </a:fillRef>
-          <a:effectRef idx="0">
-            <a:schemeClr val="accent1"/>
-          </a:effectRef>
-          <a:fontRef idx="minor">
-            <a:schemeClr val="tx1"/>
-          </a:fontRef>
-        </p:style>
-      </p:cxnSp>
       <p:pic>
         <p:nvPicPr>
           <p:cNvPr id="75" name="Picture 14"/>
@@ -6689,7 +5994,7 @@
         </p:blipFill>
         <p:spPr>
           <a:xfrm>
-            <a:off x="-381000" y="2876223"/>
+            <a:off x="-381000" y="3460677"/>
             <a:ext cx="659900" cy="577923"/>
           </a:xfrm>
           <a:prstGeom prst="rect">
@@ -6724,7 +6029,7 @@
         </p:blipFill>
         <p:spPr>
           <a:xfrm>
-            <a:off x="792106" y="2876223"/>
+            <a:off x="792106" y="3460677"/>
             <a:ext cx="659900" cy="577923"/>
           </a:xfrm>
           <a:prstGeom prst="rect">
@@ -6759,7 +6064,7 @@
         </p:blipFill>
         <p:spPr>
           <a:xfrm>
-            <a:off x="1965213" y="2876223"/>
+            <a:off x="1965213" y="3460677"/>
             <a:ext cx="659900" cy="577923"/>
           </a:xfrm>
           <a:prstGeom prst="rect">
@@ -6794,7 +6099,7 @@
         </p:blipFill>
         <p:spPr>
           <a:xfrm>
-            <a:off x="3138319" y="2876223"/>
+            <a:off x="3138319" y="3460677"/>
             <a:ext cx="659900" cy="577923"/>
           </a:xfrm>
           <a:prstGeom prst="rect">
@@ -6829,7 +6134,7 @@
         </p:blipFill>
         <p:spPr>
           <a:xfrm>
-            <a:off x="4311426" y="2876223"/>
+            <a:off x="4311426" y="3460677"/>
             <a:ext cx="659900" cy="577923"/>
           </a:xfrm>
           <a:prstGeom prst="rect">
@@ -6864,7 +6169,7 @@
         </p:blipFill>
         <p:spPr>
           <a:xfrm>
-            <a:off x="5484531" y="2876223"/>
+            <a:off x="5484531" y="3460677"/>
             <a:ext cx="659900" cy="577923"/>
           </a:xfrm>
           <a:prstGeom prst="rect">
@@ -6899,7 +6204,7 @@
         </p:blipFill>
         <p:spPr>
           <a:xfrm>
-            <a:off x="6657638" y="2876223"/>
+            <a:off x="6657638" y="3460677"/>
             <a:ext cx="659900" cy="577923"/>
           </a:xfrm>
           <a:prstGeom prst="rect">
@@ -6934,7 +6239,7 @@
         </p:blipFill>
         <p:spPr>
           <a:xfrm>
-            <a:off x="7830744" y="2876223"/>
+            <a:off x="7830744" y="3460677"/>
             <a:ext cx="659900" cy="577923"/>
           </a:xfrm>
           <a:prstGeom prst="rect">
@@ -6969,7 +6274,7 @@
         </p:blipFill>
         <p:spPr>
           <a:xfrm>
-            <a:off x="9003849" y="2876223"/>
+            <a:off x="9003849" y="3460677"/>
             <a:ext cx="659900" cy="577923"/>
           </a:xfrm>
           <a:prstGeom prst="rect">
@@ -6984,26 +6289,29 @@
       </p:pic>
       <p:sp>
         <p:nvSpPr>
-          <p:cNvPr id="87" name="Rectangle 86"/>
+          <p:cNvPr id="88" name="Rectangle 87"/>
           <p:cNvSpPr>
-            <a:spLocks/>
+            <a:spLocks noChangeAspect="1"/>
           </p:cNvSpPr>
           <p:nvPr/>
         </p:nvSpPr>
         <p:spPr>
           <a:xfrm>
-            <a:off x="4891246" y="1295400"/>
-            <a:ext cx="482502" cy="482502"/>
+            <a:off x="-292301" y="4655014"/>
+            <a:ext cx="874276" cy="874276"/>
           </a:xfrm>
           <a:prstGeom prst="rect">
             <a:avLst/>
           </a:prstGeom>
           <a:solidFill>
-            <a:srgbClr val="EA6B13"/>
+            <a:schemeClr val="accent6">
+              <a:lumMod val="40000"/>
+              <a:lumOff val="60000"/>
+            </a:schemeClr>
           </a:solidFill>
-          <a:ln>
+          <a:ln w="3175">
             <a:solidFill>
-              <a:srgbClr val="EA6B13"/>
+              <a:schemeClr val="bg1"/>
             </a:solidFill>
           </a:ln>
         </p:spPr>
@@ -7034,7 +6342,7 @@
       </p:sp>
       <p:sp>
         <p:nvSpPr>
-          <p:cNvPr id="88" name="Rectangle 87"/>
+          <p:cNvPr id="89" name="Rectangle 88"/>
           <p:cNvSpPr>
             <a:spLocks noChangeAspect="1"/>
           </p:cNvSpPr>
@@ -7043,18 +6351,19 @@
         <p:spPr>
           <a:xfrm>
             <a:off x="-292301" y="4655014"/>
-            <a:ext cx="874276" cy="874276"/>
+            <a:ext cx="482502" cy="482502"/>
           </a:xfrm>
           <a:prstGeom prst="rect">
             <a:avLst/>
           </a:prstGeom>
           <a:solidFill>
-            <a:srgbClr val="EAD511"/>
+            <a:srgbClr val="EA6B13"/>
           </a:solidFill>
-          <a:ln>
+          <a:ln w="3175">
             <a:solidFill>
-              <a:srgbClr val="EAD511"/>
+              <a:schemeClr val="bg1"/>
             </a:solidFill>
+            <a:prstDash val="solid"/>
           </a:ln>
         </p:spPr>
         <p:style>
@@ -7084,7 +6393,7 @@
       </p:sp>
       <p:sp>
         <p:nvSpPr>
-          <p:cNvPr id="89" name="Rectangle 88"/>
+          <p:cNvPr id="90" name="Rectangle 89"/>
           <p:cNvSpPr>
             <a:spLocks noChangeAspect="1"/>
           </p:cNvSpPr>
@@ -7092,20 +6401,22 @@
         </p:nvSpPr>
         <p:spPr>
           <a:xfrm>
-            <a:off x="-292301" y="4655014"/>
-            <a:ext cx="482502" cy="482502"/>
+            <a:off x="684917" y="4655014"/>
+            <a:ext cx="874276" cy="874276"/>
           </a:xfrm>
           <a:prstGeom prst="rect">
             <a:avLst/>
           </a:prstGeom>
           <a:solidFill>
-            <a:srgbClr val="EA6B13"/>
+            <a:schemeClr val="accent6">
+              <a:lumMod val="40000"/>
+              <a:lumOff val="60000"/>
+            </a:schemeClr>
           </a:solidFill>
-          <a:ln>
+          <a:ln w="3175">
             <a:solidFill>
-              <a:srgbClr val="EA6B13"/>
+              <a:schemeClr val="bg1"/>
             </a:solidFill>
-            <a:prstDash val="dash"/>
           </a:ln>
         </p:spPr>
         <p:style>
@@ -7135,7 +6446,7 @@
       </p:sp>
       <p:sp>
         <p:nvSpPr>
-          <p:cNvPr id="90" name="Rectangle 89"/>
+          <p:cNvPr id="91" name="Rectangle 90"/>
           <p:cNvSpPr>
             <a:spLocks noChangeAspect="1"/>
           </p:cNvSpPr>
@@ -7143,19 +6454,20 @@
         </p:nvSpPr>
         <p:spPr>
           <a:xfrm>
-            <a:off x="684917" y="4655014"/>
-            <a:ext cx="874276" cy="874276"/>
+            <a:off x="880805" y="4655014"/>
+            <a:ext cx="482502" cy="482502"/>
           </a:xfrm>
           <a:prstGeom prst="rect">
             <a:avLst/>
           </a:prstGeom>
           <a:solidFill>
-            <a:srgbClr val="EAD511"/>
+            <a:srgbClr val="EA6B13"/>
           </a:solidFill>
-          <a:ln>
+          <a:ln w="3175">
             <a:solidFill>
-              <a:srgbClr val="EAD511"/>
+              <a:schemeClr val="bg1"/>
             </a:solidFill>
+            <a:prstDash val="solid"/>
           </a:ln>
         </p:spPr>
         <p:style>
@@ -7185,7 +6497,7 @@
       </p:sp>
       <p:sp>
         <p:nvSpPr>
-          <p:cNvPr id="91" name="Rectangle 90"/>
+          <p:cNvPr id="92" name="Rectangle 91"/>
           <p:cNvSpPr>
             <a:spLocks noChangeAspect="1"/>
           </p:cNvSpPr>
@@ -7193,20 +6505,22 @@
         </p:nvSpPr>
         <p:spPr>
           <a:xfrm>
-            <a:off x="880805" y="4655014"/>
-            <a:ext cx="482502" cy="482502"/>
+            <a:off x="1662136" y="4655014"/>
+            <a:ext cx="874276" cy="874276"/>
           </a:xfrm>
           <a:prstGeom prst="rect">
             <a:avLst/>
           </a:prstGeom>
           <a:solidFill>
-            <a:srgbClr val="EA6B13"/>
+            <a:schemeClr val="accent6">
+              <a:lumMod val="40000"/>
+              <a:lumOff val="60000"/>
+            </a:schemeClr>
           </a:solidFill>
-          <a:ln>
+          <a:ln w="3175">
             <a:solidFill>
-              <a:srgbClr val="EA6B13"/>
+              <a:schemeClr val="bg1"/>
             </a:solidFill>
-            <a:prstDash val="dash"/>
           </a:ln>
         </p:spPr>
         <p:style>
@@ -7236,7 +6550,7 @@
       </p:sp>
       <p:sp>
         <p:nvSpPr>
-          <p:cNvPr id="92" name="Rectangle 91"/>
+          <p:cNvPr id="93" name="Rectangle 92"/>
           <p:cNvSpPr>
             <a:spLocks noChangeAspect="1"/>
           </p:cNvSpPr>
@@ -7244,19 +6558,20 @@
         </p:nvSpPr>
         <p:spPr>
           <a:xfrm>
-            <a:off x="1662136" y="4655014"/>
-            <a:ext cx="874276" cy="874276"/>
+            <a:off x="2053911" y="4655014"/>
+            <a:ext cx="482502" cy="482502"/>
           </a:xfrm>
           <a:prstGeom prst="rect">
             <a:avLst/>
           </a:prstGeom>
           <a:solidFill>
-            <a:srgbClr val="EAD511"/>
+            <a:srgbClr val="EA6B13"/>
           </a:solidFill>
-          <a:ln>
+          <a:ln w="3175">
             <a:solidFill>
-              <a:srgbClr val="EAD511"/>
+              <a:schemeClr val="bg1"/>
             </a:solidFill>
+            <a:prstDash val="solid"/>
           </a:ln>
         </p:spPr>
         <p:style>
@@ -7286,7 +6601,7 @@
       </p:sp>
       <p:sp>
         <p:nvSpPr>
-          <p:cNvPr id="93" name="Rectangle 92"/>
+          <p:cNvPr id="94" name="Rectangle 93"/>
           <p:cNvSpPr>
             <a:spLocks noChangeAspect="1"/>
           </p:cNvSpPr>
@@ -7294,20 +6609,22 @@
         </p:nvSpPr>
         <p:spPr>
           <a:xfrm>
-            <a:off x="2053911" y="4655014"/>
-            <a:ext cx="482502" cy="482502"/>
+            <a:off x="3227017" y="4459126"/>
+            <a:ext cx="874276" cy="874276"/>
           </a:xfrm>
           <a:prstGeom prst="rect">
             <a:avLst/>
           </a:prstGeom>
           <a:solidFill>
-            <a:srgbClr val="EA6B13"/>
+            <a:schemeClr val="accent6">
+              <a:lumMod val="40000"/>
+              <a:lumOff val="60000"/>
+            </a:schemeClr>
           </a:solidFill>
-          <a:ln>
+          <a:ln w="3175">
             <a:solidFill>
-              <a:srgbClr val="EA6B13"/>
+              <a:schemeClr val="bg1"/>
             </a:solidFill>
-            <a:prstDash val="dash"/>
           </a:ln>
         </p:spPr>
         <p:style>
@@ -7337,7 +6654,7 @@
       </p:sp>
       <p:sp>
         <p:nvSpPr>
-          <p:cNvPr id="94" name="Rectangle 93"/>
+          <p:cNvPr id="95" name="Rectangle 94"/>
           <p:cNvSpPr>
             <a:spLocks noChangeAspect="1"/>
           </p:cNvSpPr>
@@ -7345,19 +6662,20 @@
         </p:nvSpPr>
         <p:spPr>
           <a:xfrm>
-            <a:off x="3227017" y="4459126"/>
-            <a:ext cx="874276" cy="874276"/>
+            <a:off x="3227017" y="4655014"/>
+            <a:ext cx="482502" cy="482502"/>
           </a:xfrm>
           <a:prstGeom prst="rect">
             <a:avLst/>
           </a:prstGeom>
           <a:solidFill>
-            <a:srgbClr val="EAD511"/>
+            <a:srgbClr val="EA6B13"/>
           </a:solidFill>
-          <a:ln>
+          <a:ln w="3175">
             <a:solidFill>
-              <a:srgbClr val="EAD511"/>
+              <a:schemeClr val="bg1"/>
             </a:solidFill>
+            <a:prstDash val="solid"/>
           </a:ln>
         </p:spPr>
         <p:style>
@@ -7387,7 +6705,7 @@
       </p:sp>
       <p:sp>
         <p:nvSpPr>
-          <p:cNvPr id="95" name="Rectangle 94"/>
+          <p:cNvPr id="96" name="Rectangle 95"/>
           <p:cNvSpPr>
             <a:spLocks noChangeAspect="1"/>
           </p:cNvSpPr>
@@ -7395,20 +6713,22 @@
         </p:nvSpPr>
         <p:spPr>
           <a:xfrm>
-            <a:off x="3227017" y="4655014"/>
-            <a:ext cx="482502" cy="482502"/>
+            <a:off x="4204235" y="4459126"/>
+            <a:ext cx="874276" cy="874276"/>
           </a:xfrm>
           <a:prstGeom prst="rect">
             <a:avLst/>
           </a:prstGeom>
           <a:solidFill>
-            <a:srgbClr val="EA6B13"/>
+            <a:schemeClr val="accent6">
+              <a:lumMod val="40000"/>
+              <a:lumOff val="60000"/>
+            </a:schemeClr>
           </a:solidFill>
-          <a:ln>
+          <a:ln w="3175">
             <a:solidFill>
-              <a:srgbClr val="EA6B13"/>
+              <a:schemeClr val="bg1"/>
             </a:solidFill>
-            <a:prstDash val="dash"/>
           </a:ln>
         </p:spPr>
         <p:style>
@@ -7438,7 +6758,7 @@
       </p:sp>
       <p:sp>
         <p:nvSpPr>
-          <p:cNvPr id="96" name="Rectangle 95"/>
+          <p:cNvPr id="97" name="Rectangle 96"/>
           <p:cNvSpPr>
             <a:spLocks noChangeAspect="1"/>
           </p:cNvSpPr>
@@ -7446,19 +6766,20 @@
         </p:nvSpPr>
         <p:spPr>
           <a:xfrm>
-            <a:off x="4204235" y="4459126"/>
-            <a:ext cx="874276" cy="874276"/>
+            <a:off x="4400123" y="4655014"/>
+            <a:ext cx="482502" cy="482502"/>
           </a:xfrm>
           <a:prstGeom prst="rect">
             <a:avLst/>
           </a:prstGeom>
           <a:solidFill>
-            <a:srgbClr val="EAD511"/>
+            <a:srgbClr val="EA6B13"/>
           </a:solidFill>
-          <a:ln>
+          <a:ln w="3175">
             <a:solidFill>
-              <a:srgbClr val="EAD511"/>
+              <a:schemeClr val="bg1"/>
             </a:solidFill>
+            <a:prstDash val="solid"/>
           </a:ln>
         </p:spPr>
         <p:style>
@@ -7488,7 +6809,7 @@
       </p:sp>
       <p:sp>
         <p:nvSpPr>
-          <p:cNvPr id="97" name="Rectangle 96"/>
+          <p:cNvPr id="98" name="Rectangle 97"/>
           <p:cNvSpPr>
             <a:spLocks noChangeAspect="1"/>
           </p:cNvSpPr>
@@ -7496,20 +6817,22 @@
         </p:nvSpPr>
         <p:spPr>
           <a:xfrm>
-            <a:off x="4400123" y="4655014"/>
-            <a:ext cx="482502" cy="482502"/>
+            <a:off x="5181454" y="4459126"/>
+            <a:ext cx="874276" cy="874276"/>
           </a:xfrm>
           <a:prstGeom prst="rect">
             <a:avLst/>
           </a:prstGeom>
           <a:solidFill>
-            <a:srgbClr val="EA6B13"/>
+            <a:schemeClr val="accent6">
+              <a:lumMod val="40000"/>
+              <a:lumOff val="60000"/>
+            </a:schemeClr>
           </a:solidFill>
-          <a:ln>
+          <a:ln w="3175">
             <a:solidFill>
-              <a:srgbClr val="EA6B13"/>
+              <a:schemeClr val="bg1"/>
             </a:solidFill>
-            <a:prstDash val="dash"/>
           </a:ln>
         </p:spPr>
         <p:style>
@@ -7539,7 +6862,7 @@
       </p:sp>
       <p:sp>
         <p:nvSpPr>
-          <p:cNvPr id="98" name="Rectangle 97"/>
+          <p:cNvPr id="99" name="Rectangle 98"/>
           <p:cNvSpPr>
             <a:spLocks noChangeAspect="1"/>
           </p:cNvSpPr>
@@ -7547,19 +6870,20 @@
         </p:nvSpPr>
         <p:spPr>
           <a:xfrm>
-            <a:off x="5181454" y="4459126"/>
-            <a:ext cx="874276" cy="874276"/>
+            <a:off x="5573229" y="4655014"/>
+            <a:ext cx="482502" cy="482502"/>
           </a:xfrm>
           <a:prstGeom prst="rect">
             <a:avLst/>
           </a:prstGeom>
           <a:solidFill>
-            <a:srgbClr val="EAD511"/>
+            <a:srgbClr val="EA6B13"/>
           </a:solidFill>
-          <a:ln>
+          <a:ln w="3175">
             <a:solidFill>
-              <a:srgbClr val="EAD511"/>
+              <a:schemeClr val="bg1"/>
             </a:solidFill>
+            <a:prstDash val="solid"/>
           </a:ln>
         </p:spPr>
         <p:style>
@@ -7589,7 +6913,7 @@
       </p:sp>
       <p:sp>
         <p:nvSpPr>
-          <p:cNvPr id="99" name="Rectangle 98"/>
+          <p:cNvPr id="100" name="Rectangle 99"/>
           <p:cNvSpPr>
             <a:spLocks noChangeAspect="1"/>
           </p:cNvSpPr>
@@ -7597,20 +6921,22 @@
         </p:nvSpPr>
         <p:spPr>
           <a:xfrm>
-            <a:off x="5573229" y="4655014"/>
-            <a:ext cx="482502" cy="482502"/>
+            <a:off x="6746334" y="4263239"/>
+            <a:ext cx="874276" cy="874276"/>
           </a:xfrm>
           <a:prstGeom prst="rect">
             <a:avLst/>
           </a:prstGeom>
           <a:solidFill>
-            <a:srgbClr val="EA6B13"/>
+            <a:schemeClr val="accent6">
+              <a:lumMod val="40000"/>
+              <a:lumOff val="60000"/>
+            </a:schemeClr>
           </a:solidFill>
-          <a:ln>
+          <a:ln w="3175">
             <a:solidFill>
-              <a:srgbClr val="EA6B13"/>
+              <a:schemeClr val="bg1"/>
             </a:solidFill>
-            <a:prstDash val="dash"/>
           </a:ln>
         </p:spPr>
         <p:style>
@@ -7640,7 +6966,7 @@
       </p:sp>
       <p:sp>
         <p:nvSpPr>
-          <p:cNvPr id="100" name="Rectangle 99"/>
+          <p:cNvPr id="101" name="Rectangle 100"/>
           <p:cNvSpPr>
             <a:spLocks noChangeAspect="1"/>
           </p:cNvSpPr>
@@ -7648,19 +6974,20 @@
         </p:nvSpPr>
         <p:spPr>
           <a:xfrm>
-            <a:off x="6746334" y="4263239"/>
-            <a:ext cx="874276" cy="874276"/>
+            <a:off x="6746334" y="4655014"/>
+            <a:ext cx="482502" cy="482502"/>
           </a:xfrm>
           <a:prstGeom prst="rect">
             <a:avLst/>
           </a:prstGeom>
           <a:solidFill>
-            <a:srgbClr val="EAD511"/>
+            <a:srgbClr val="EA6B13"/>
           </a:solidFill>
-          <a:ln>
+          <a:ln w="3175">
             <a:solidFill>
-              <a:srgbClr val="EAD511"/>
+              <a:schemeClr val="bg1"/>
             </a:solidFill>
+            <a:prstDash val="solid"/>
           </a:ln>
         </p:spPr>
         <p:style>
@@ -7690,7 +7017,7 @@
       </p:sp>
       <p:sp>
         <p:nvSpPr>
-          <p:cNvPr id="101" name="Rectangle 100"/>
+          <p:cNvPr id="102" name="Rectangle 101"/>
           <p:cNvSpPr>
             <a:spLocks noChangeAspect="1"/>
           </p:cNvSpPr>
@@ -7698,20 +7025,22 @@
         </p:nvSpPr>
         <p:spPr>
           <a:xfrm>
-            <a:off x="6746334" y="4655014"/>
-            <a:ext cx="482502" cy="482502"/>
+            <a:off x="7723552" y="4263239"/>
+            <a:ext cx="874276" cy="874276"/>
           </a:xfrm>
           <a:prstGeom prst="rect">
             <a:avLst/>
           </a:prstGeom>
           <a:solidFill>
-            <a:srgbClr val="EA6B13"/>
+            <a:schemeClr val="accent6">
+              <a:lumMod val="40000"/>
+              <a:lumOff val="60000"/>
+            </a:schemeClr>
           </a:solidFill>
-          <a:ln>
+          <a:ln w="3175">
             <a:solidFill>
-              <a:srgbClr val="EA6B13"/>
+              <a:schemeClr val="bg1"/>
             </a:solidFill>
-            <a:prstDash val="dash"/>
           </a:ln>
         </p:spPr>
         <p:style>
@@ -7741,7 +7070,7 @@
       </p:sp>
       <p:sp>
         <p:nvSpPr>
-          <p:cNvPr id="102" name="Rectangle 101"/>
+          <p:cNvPr id="103" name="Rectangle 102"/>
           <p:cNvSpPr>
             <a:spLocks noChangeAspect="1"/>
           </p:cNvSpPr>
@@ -7749,19 +7078,20 @@
         </p:nvSpPr>
         <p:spPr>
           <a:xfrm>
-            <a:off x="7723552" y="4263239"/>
-            <a:ext cx="874276" cy="874276"/>
+            <a:off x="7919440" y="4655014"/>
+            <a:ext cx="482502" cy="482502"/>
           </a:xfrm>
           <a:prstGeom prst="rect">
             <a:avLst/>
           </a:prstGeom>
           <a:solidFill>
-            <a:srgbClr val="EAD511"/>
+            <a:srgbClr val="EA6B13"/>
           </a:solidFill>
-          <a:ln>
+          <a:ln w="3175">
             <a:solidFill>
-              <a:srgbClr val="EAD511"/>
+              <a:schemeClr val="bg1"/>
             </a:solidFill>
+            <a:prstDash val="solid"/>
           </a:ln>
         </p:spPr>
         <p:style>
@@ -7791,7 +7121,7 @@
       </p:sp>
       <p:sp>
         <p:nvSpPr>
-          <p:cNvPr id="103" name="Rectangle 102"/>
+          <p:cNvPr id="104" name="Rectangle 103"/>
           <p:cNvSpPr>
             <a:spLocks noChangeAspect="1"/>
           </p:cNvSpPr>
@@ -7799,20 +7129,22 @@
         </p:nvSpPr>
         <p:spPr>
           <a:xfrm>
-            <a:off x="7919440" y="4655014"/>
-            <a:ext cx="482502" cy="482502"/>
+            <a:off x="8700772" y="4263239"/>
+            <a:ext cx="874276" cy="874276"/>
           </a:xfrm>
           <a:prstGeom prst="rect">
             <a:avLst/>
           </a:prstGeom>
           <a:solidFill>
-            <a:srgbClr val="EA6B13"/>
+            <a:schemeClr val="accent6">
+              <a:lumMod val="40000"/>
+              <a:lumOff val="60000"/>
+            </a:schemeClr>
           </a:solidFill>
-          <a:ln>
+          <a:ln w="3175">
             <a:solidFill>
-              <a:srgbClr val="EA6B13"/>
+              <a:schemeClr val="bg1"/>
             </a:solidFill>
-            <a:prstDash val="dash"/>
           </a:ln>
         </p:spPr>
         <p:style>
@@ -7842,7 +7174,7 @@
       </p:sp>
       <p:sp>
         <p:nvSpPr>
-          <p:cNvPr id="104" name="Rectangle 103"/>
+          <p:cNvPr id="105" name="Rectangle 104"/>
           <p:cNvSpPr>
             <a:spLocks noChangeAspect="1"/>
           </p:cNvSpPr>
@@ -7850,19 +7182,20 @@
         </p:nvSpPr>
         <p:spPr>
           <a:xfrm>
-            <a:off x="8700772" y="4263239"/>
-            <a:ext cx="874276" cy="874276"/>
+            <a:off x="9092547" y="4655014"/>
+            <a:ext cx="482502" cy="482502"/>
           </a:xfrm>
           <a:prstGeom prst="rect">
             <a:avLst/>
           </a:prstGeom>
           <a:solidFill>
-            <a:srgbClr val="EAD511"/>
+            <a:srgbClr val="EA6B13"/>
           </a:solidFill>
-          <a:ln>
+          <a:ln w="3175">
             <a:solidFill>
-              <a:srgbClr val="EAD511"/>
+              <a:schemeClr val="bg1"/>
             </a:solidFill>
+            <a:prstDash val="solid"/>
           </a:ln>
         </p:spPr>
         <p:style>
@@ -7892,28 +7225,28 @@
       </p:sp>
       <p:sp>
         <p:nvSpPr>
-          <p:cNvPr id="105" name="Rectangle 104"/>
-          <p:cNvSpPr>
-            <a:spLocks noChangeAspect="1"/>
-          </p:cNvSpPr>
-          <p:nvPr/>
-        </p:nvSpPr>
-        <p:spPr>
-          <a:xfrm>
-            <a:off x="9092547" y="4655014"/>
-            <a:ext cx="482502" cy="482502"/>
+          <p:cNvPr id="66" name="Rectangle 65"/>
+          <p:cNvSpPr/>
+          <p:nvPr/>
+        </p:nvSpPr>
+        <p:spPr>
+          <a:xfrm>
+            <a:off x="3153370" y="1219200"/>
+            <a:ext cx="1011545" cy="533400"/>
           </a:xfrm>
           <a:prstGeom prst="rect">
             <a:avLst/>
           </a:prstGeom>
           <a:solidFill>
-            <a:srgbClr val="EA6B13"/>
+            <a:schemeClr val="bg1"/>
           </a:solidFill>
-          <a:ln>
+          <a:ln w="3175">
             <a:solidFill>
-              <a:srgbClr val="EA6B13"/>
+              <a:schemeClr val="accent6">
+                <a:lumMod val="75000"/>
+              </a:schemeClr>
             </a:solidFill>
-            <a:prstDash val="dash"/>
+            <a:prstDash val="solid"/>
           </a:ln>
         </p:spPr>
         <p:style>
@@ -7937,14 +7270,583 @@
           <a:lstStyle/>
           <a:p>
             <a:pPr algn="ctr"/>
-            <a:endParaRPr lang="en-US"/>
+            <a:endParaRPr lang="en-SG"/>
+          </a:p>
+        </p:txBody>
+      </p:sp>
+      <p:sp>
+        <p:nvSpPr>
+          <p:cNvPr id="69" name="Trapezoid 68"/>
+          <p:cNvSpPr/>
+          <p:nvPr/>
+        </p:nvSpPr>
+        <p:spPr>
+          <a:xfrm>
+            <a:off x="3006861" y="990600"/>
+            <a:ext cx="1304563" cy="228600"/>
+          </a:xfrm>
+          <a:prstGeom prst="trapezoid">
+            <a:avLst>
+              <a:gd name="adj" fmla="val 65404"/>
+            </a:avLst>
+          </a:prstGeom>
+          <a:solidFill>
+            <a:schemeClr val="bg1"/>
+          </a:solidFill>
+          <a:ln w="3175">
+            <a:solidFill>
+              <a:schemeClr val="accent6">
+                <a:lumMod val="75000"/>
+              </a:schemeClr>
+            </a:solidFill>
+            <a:prstDash val="solid"/>
+          </a:ln>
+        </p:spPr>
+        <p:style>
+          <a:lnRef idx="2">
+            <a:schemeClr val="accent1">
+              <a:shade val="50000"/>
+            </a:schemeClr>
+          </a:lnRef>
+          <a:fillRef idx="1">
+            <a:schemeClr val="accent1"/>
+          </a:fillRef>
+          <a:effectRef idx="0">
+            <a:schemeClr val="accent1"/>
+          </a:effectRef>
+          <a:fontRef idx="minor">
+            <a:schemeClr val="lt1"/>
+          </a:fontRef>
+        </p:style>
+        <p:txBody>
+          <a:bodyPr rtlCol="0" anchor="ctr"/>
+          <a:lstStyle/>
+          <a:p>
+            <a:pPr algn="ctr"/>
+            <a:endParaRPr lang="en-SG"/>
+          </a:p>
+        </p:txBody>
+      </p:sp>
+      <p:sp>
+        <p:nvSpPr>
+          <p:cNvPr id="74" name="Rectangle 73"/>
+          <p:cNvSpPr/>
+          <p:nvPr/>
+        </p:nvSpPr>
+        <p:spPr>
+          <a:xfrm>
+            <a:off x="3304308" y="1492372"/>
+            <a:ext cx="257355" cy="260228"/>
+          </a:xfrm>
+          <a:prstGeom prst="rect">
+            <a:avLst/>
+          </a:prstGeom>
+          <a:solidFill>
+            <a:srgbClr val="EA6B13"/>
+          </a:solidFill>
+          <a:ln w="3175">
+            <a:solidFill>
+              <a:schemeClr val="accent6">
+                <a:lumMod val="75000"/>
+              </a:schemeClr>
+            </a:solidFill>
+            <a:prstDash val="solid"/>
+          </a:ln>
+        </p:spPr>
+        <p:style>
+          <a:lnRef idx="2">
+            <a:schemeClr val="accent1">
+              <a:shade val="50000"/>
+            </a:schemeClr>
+          </a:lnRef>
+          <a:fillRef idx="1">
+            <a:schemeClr val="accent1"/>
+          </a:fillRef>
+          <a:effectRef idx="0">
+            <a:schemeClr val="accent1"/>
+          </a:effectRef>
+          <a:fontRef idx="minor">
+            <a:schemeClr val="lt1"/>
+          </a:fontRef>
+        </p:style>
+        <p:txBody>
+          <a:bodyPr rtlCol="0" anchor="ctr"/>
+          <a:lstStyle/>
+          <a:p>
+            <a:pPr algn="ctr"/>
+            <a:endParaRPr lang="en-SG"/>
+          </a:p>
+        </p:txBody>
+      </p:sp>
+      <p:sp>
+        <p:nvSpPr>
+          <p:cNvPr id="106" name="Rectangle 105"/>
+          <p:cNvSpPr/>
+          <p:nvPr/>
+        </p:nvSpPr>
+        <p:spPr>
+          <a:xfrm>
+            <a:off x="3713016" y="1380381"/>
+            <a:ext cx="346055" cy="372219"/>
+          </a:xfrm>
+          <a:prstGeom prst="rect">
+            <a:avLst/>
+          </a:prstGeom>
+          <a:solidFill>
+            <a:srgbClr val="0070C0"/>
+          </a:solidFill>
+          <a:ln w="3175">
+            <a:solidFill>
+              <a:srgbClr val="0070C0"/>
+            </a:solidFill>
+            <a:prstDash val="solid"/>
+          </a:ln>
+        </p:spPr>
+        <p:style>
+          <a:lnRef idx="2">
+            <a:schemeClr val="accent1">
+              <a:shade val="50000"/>
+            </a:schemeClr>
+          </a:lnRef>
+          <a:fillRef idx="1">
+            <a:schemeClr val="accent1"/>
+          </a:fillRef>
+          <a:effectRef idx="0">
+            <a:schemeClr val="accent1"/>
+          </a:effectRef>
+          <a:fontRef idx="minor">
+            <a:schemeClr val="lt1"/>
+          </a:fontRef>
+        </p:style>
+        <p:txBody>
+          <a:bodyPr rtlCol="0" anchor="ctr"/>
+          <a:lstStyle/>
+          <a:p>
+            <a:pPr algn="ctr"/>
+            <a:endParaRPr lang="en-SG"/>
+          </a:p>
+        </p:txBody>
+      </p:sp>
+      <p:sp>
+        <p:nvSpPr>
+          <p:cNvPr id="107" name="Rectangle 106"/>
+          <p:cNvSpPr/>
+          <p:nvPr/>
+        </p:nvSpPr>
+        <p:spPr>
+          <a:xfrm>
+            <a:off x="5033442" y="1219199"/>
+            <a:ext cx="1011545" cy="533400"/>
+          </a:xfrm>
+          <a:prstGeom prst="rect">
+            <a:avLst/>
+          </a:prstGeom>
+          <a:solidFill>
+            <a:schemeClr val="bg1"/>
+          </a:solidFill>
+          <a:ln w="3175">
+            <a:solidFill>
+              <a:schemeClr val="accent6">
+                <a:lumMod val="75000"/>
+              </a:schemeClr>
+            </a:solidFill>
+            <a:prstDash val="solid"/>
+          </a:ln>
+        </p:spPr>
+        <p:style>
+          <a:lnRef idx="2">
+            <a:schemeClr val="accent1">
+              <a:shade val="50000"/>
+            </a:schemeClr>
+          </a:lnRef>
+          <a:fillRef idx="1">
+            <a:schemeClr val="accent1"/>
+          </a:fillRef>
+          <a:effectRef idx="0">
+            <a:schemeClr val="accent1"/>
+          </a:effectRef>
+          <a:fontRef idx="minor">
+            <a:schemeClr val="lt1"/>
+          </a:fontRef>
+        </p:style>
+        <p:txBody>
+          <a:bodyPr rtlCol="0" anchor="ctr"/>
+          <a:lstStyle/>
+          <a:p>
+            <a:pPr algn="ctr"/>
+            <a:endParaRPr lang="en-SG"/>
+          </a:p>
+        </p:txBody>
+      </p:sp>
+      <p:sp>
+        <p:nvSpPr>
+          <p:cNvPr id="108" name="Trapezoid 107"/>
+          <p:cNvSpPr/>
+          <p:nvPr/>
+        </p:nvSpPr>
+        <p:spPr>
+          <a:xfrm>
+            <a:off x="4886933" y="990599"/>
+            <a:ext cx="1304563" cy="228600"/>
+          </a:xfrm>
+          <a:prstGeom prst="trapezoid">
+            <a:avLst>
+              <a:gd name="adj" fmla="val 65404"/>
+            </a:avLst>
+          </a:prstGeom>
+          <a:solidFill>
+            <a:schemeClr val="bg1"/>
+          </a:solidFill>
+          <a:ln w="3175">
+            <a:solidFill>
+              <a:schemeClr val="accent6">
+                <a:lumMod val="75000"/>
+              </a:schemeClr>
+            </a:solidFill>
+            <a:prstDash val="solid"/>
+          </a:ln>
+        </p:spPr>
+        <p:style>
+          <a:lnRef idx="2">
+            <a:schemeClr val="accent1">
+              <a:shade val="50000"/>
+            </a:schemeClr>
+          </a:lnRef>
+          <a:fillRef idx="1">
+            <a:schemeClr val="accent1"/>
+          </a:fillRef>
+          <a:effectRef idx="0">
+            <a:schemeClr val="accent1"/>
+          </a:effectRef>
+          <a:fontRef idx="minor">
+            <a:schemeClr val="lt1"/>
+          </a:fontRef>
+        </p:style>
+        <p:txBody>
+          <a:bodyPr rtlCol="0" anchor="ctr"/>
+          <a:lstStyle/>
+          <a:p>
+            <a:pPr algn="ctr"/>
+            <a:endParaRPr lang="en-SG"/>
+          </a:p>
+        </p:txBody>
+      </p:sp>
+      <p:sp>
+        <p:nvSpPr>
+          <p:cNvPr id="109" name="Rectangle 108"/>
+          <p:cNvSpPr>
+            <a:spLocks/>
+          </p:cNvSpPr>
+          <p:nvPr/>
+        </p:nvSpPr>
+        <p:spPr>
+          <a:xfrm>
+            <a:off x="5140030" y="1436376"/>
+            <a:ext cx="346055" cy="372219"/>
+          </a:xfrm>
+          <a:prstGeom prst="rect">
+            <a:avLst/>
+          </a:prstGeom>
+          <a:solidFill>
+            <a:srgbClr val="EA6B13"/>
+          </a:solidFill>
+          <a:ln w="3175">
+            <a:solidFill>
+              <a:schemeClr val="accent6">
+                <a:lumMod val="75000"/>
+              </a:schemeClr>
+            </a:solidFill>
+            <a:prstDash val="solid"/>
+          </a:ln>
+        </p:spPr>
+        <p:style>
+          <a:lnRef idx="2">
+            <a:schemeClr val="accent1">
+              <a:shade val="50000"/>
+            </a:schemeClr>
+          </a:lnRef>
+          <a:fillRef idx="1">
+            <a:schemeClr val="accent1"/>
+          </a:fillRef>
+          <a:effectRef idx="0">
+            <a:schemeClr val="accent1"/>
+          </a:effectRef>
+          <a:fontRef idx="minor">
+            <a:schemeClr val="lt1"/>
+          </a:fontRef>
+        </p:style>
+        <p:txBody>
+          <a:bodyPr rtlCol="0" anchor="ctr"/>
+          <a:lstStyle/>
+          <a:p>
+            <a:pPr algn="ctr"/>
+            <a:endParaRPr lang="en-SG"/>
+          </a:p>
+        </p:txBody>
+      </p:sp>
+      <p:sp>
+        <p:nvSpPr>
+          <p:cNvPr id="110" name="Rectangle 109"/>
+          <p:cNvSpPr>
+            <a:spLocks/>
+          </p:cNvSpPr>
+          <p:nvPr/>
+        </p:nvSpPr>
+        <p:spPr>
+          <a:xfrm>
+            <a:off x="5593088" y="1380381"/>
+            <a:ext cx="346055" cy="372219"/>
+          </a:xfrm>
+          <a:prstGeom prst="rect">
+            <a:avLst/>
+          </a:prstGeom>
+          <a:solidFill>
+            <a:srgbClr val="0070C0"/>
+          </a:solidFill>
+          <a:ln w="3175">
+            <a:solidFill>
+              <a:srgbClr val="0070C0"/>
+            </a:solidFill>
+            <a:prstDash val="solid"/>
+          </a:ln>
+        </p:spPr>
+        <p:style>
+          <a:lnRef idx="2">
+            <a:schemeClr val="accent1">
+              <a:shade val="50000"/>
+            </a:schemeClr>
+          </a:lnRef>
+          <a:fillRef idx="1">
+            <a:schemeClr val="accent1"/>
+          </a:fillRef>
+          <a:effectRef idx="0">
+            <a:schemeClr val="accent1"/>
+          </a:effectRef>
+          <a:fontRef idx="minor">
+            <a:schemeClr val="lt1"/>
+          </a:fontRef>
+        </p:style>
+        <p:txBody>
+          <a:bodyPr rtlCol="0" anchor="ctr"/>
+          <a:lstStyle/>
+          <a:p>
+            <a:pPr algn="ctr"/>
+            <a:endParaRPr lang="en-SG"/>
+          </a:p>
+        </p:txBody>
+      </p:sp>
+      <p:sp>
+        <p:nvSpPr>
+          <p:cNvPr id="111" name="Rectangle 110"/>
+          <p:cNvSpPr/>
+          <p:nvPr/>
+        </p:nvSpPr>
+        <p:spPr>
+          <a:xfrm>
+            <a:off x="6667762" y="1217922"/>
+            <a:ext cx="1011545" cy="533400"/>
+          </a:xfrm>
+          <a:prstGeom prst="rect">
+            <a:avLst/>
+          </a:prstGeom>
+          <a:solidFill>
+            <a:schemeClr val="bg1"/>
+          </a:solidFill>
+          <a:ln w="3175">
+            <a:solidFill>
+              <a:schemeClr val="accent6">
+                <a:lumMod val="75000"/>
+              </a:schemeClr>
+            </a:solidFill>
+            <a:prstDash val="solid"/>
+          </a:ln>
+        </p:spPr>
+        <p:style>
+          <a:lnRef idx="2">
+            <a:schemeClr val="accent1">
+              <a:shade val="50000"/>
+            </a:schemeClr>
+          </a:lnRef>
+          <a:fillRef idx="1">
+            <a:schemeClr val="accent1"/>
+          </a:fillRef>
+          <a:effectRef idx="0">
+            <a:schemeClr val="accent1"/>
+          </a:effectRef>
+          <a:fontRef idx="minor">
+            <a:schemeClr val="lt1"/>
+          </a:fontRef>
+        </p:style>
+        <p:txBody>
+          <a:bodyPr rtlCol="0" anchor="ctr"/>
+          <a:lstStyle/>
+          <a:p>
+            <a:pPr algn="ctr"/>
+            <a:endParaRPr lang="en-SG"/>
+          </a:p>
+        </p:txBody>
+      </p:sp>
+      <p:sp>
+        <p:nvSpPr>
+          <p:cNvPr id="112" name="Trapezoid 111"/>
+          <p:cNvSpPr/>
+          <p:nvPr/>
+        </p:nvSpPr>
+        <p:spPr>
+          <a:xfrm>
+            <a:off x="6521253" y="989322"/>
+            <a:ext cx="1304563" cy="228600"/>
+          </a:xfrm>
+          <a:prstGeom prst="trapezoid">
+            <a:avLst>
+              <a:gd name="adj" fmla="val 65404"/>
+            </a:avLst>
+          </a:prstGeom>
+          <a:solidFill>
+            <a:schemeClr val="bg1"/>
+          </a:solidFill>
+          <a:ln w="3175">
+            <a:solidFill>
+              <a:schemeClr val="accent6">
+                <a:lumMod val="75000"/>
+              </a:schemeClr>
+            </a:solidFill>
+            <a:prstDash val="solid"/>
+          </a:ln>
+        </p:spPr>
+        <p:style>
+          <a:lnRef idx="2">
+            <a:schemeClr val="accent1">
+              <a:shade val="50000"/>
+            </a:schemeClr>
+          </a:lnRef>
+          <a:fillRef idx="1">
+            <a:schemeClr val="accent1"/>
+          </a:fillRef>
+          <a:effectRef idx="0">
+            <a:schemeClr val="accent1"/>
+          </a:effectRef>
+          <a:fontRef idx="minor">
+            <a:schemeClr val="lt1"/>
+          </a:fontRef>
+        </p:style>
+        <p:txBody>
+          <a:bodyPr rtlCol="0" anchor="ctr"/>
+          <a:lstStyle/>
+          <a:p>
+            <a:pPr algn="ctr"/>
+            <a:endParaRPr lang="en-SG"/>
+          </a:p>
+        </p:txBody>
+      </p:sp>
+      <p:sp>
+        <p:nvSpPr>
+          <p:cNvPr id="113" name="Rectangle 112"/>
+          <p:cNvSpPr>
+            <a:spLocks/>
+          </p:cNvSpPr>
+          <p:nvPr/>
+        </p:nvSpPr>
+        <p:spPr>
+          <a:xfrm>
+            <a:off x="6774350" y="1380381"/>
+            <a:ext cx="346055" cy="372219"/>
+          </a:xfrm>
+          <a:prstGeom prst="rect">
+            <a:avLst/>
+          </a:prstGeom>
+          <a:solidFill>
+            <a:srgbClr val="EA6B13"/>
+          </a:solidFill>
+          <a:ln w="3175">
+            <a:solidFill>
+              <a:schemeClr val="accent6">
+                <a:lumMod val="75000"/>
+              </a:schemeClr>
+            </a:solidFill>
+            <a:prstDash val="solid"/>
+          </a:ln>
+        </p:spPr>
+        <p:style>
+          <a:lnRef idx="2">
+            <a:schemeClr val="accent1">
+              <a:shade val="50000"/>
+            </a:schemeClr>
+          </a:lnRef>
+          <a:fillRef idx="1">
+            <a:schemeClr val="accent1"/>
+          </a:fillRef>
+          <a:effectRef idx="0">
+            <a:schemeClr val="accent1"/>
+          </a:effectRef>
+          <a:fontRef idx="minor">
+            <a:schemeClr val="lt1"/>
+          </a:fontRef>
+        </p:style>
+        <p:txBody>
+          <a:bodyPr rtlCol="0" anchor="ctr"/>
+          <a:lstStyle/>
+          <a:p>
+            <a:pPr algn="ctr"/>
+            <a:endParaRPr lang="en-SG"/>
+          </a:p>
+        </p:txBody>
+      </p:sp>
+      <p:sp>
+        <p:nvSpPr>
+          <p:cNvPr id="114" name="Rectangle 113"/>
+          <p:cNvSpPr>
+            <a:spLocks/>
+          </p:cNvSpPr>
+          <p:nvPr/>
+        </p:nvSpPr>
+        <p:spPr>
+          <a:xfrm>
+            <a:off x="7227408" y="1380381"/>
+            <a:ext cx="346055" cy="372219"/>
+          </a:xfrm>
+          <a:prstGeom prst="rect">
+            <a:avLst/>
+          </a:prstGeom>
+          <a:solidFill>
+            <a:srgbClr val="0070C0"/>
+          </a:solidFill>
+          <a:ln w="3175">
+            <a:solidFill>
+              <a:srgbClr val="0070C0"/>
+            </a:solidFill>
+            <a:prstDash val="solid"/>
+          </a:ln>
+        </p:spPr>
+        <p:style>
+          <a:lnRef idx="2">
+            <a:schemeClr val="accent1">
+              <a:shade val="50000"/>
+            </a:schemeClr>
+          </a:lnRef>
+          <a:fillRef idx="1">
+            <a:schemeClr val="accent1"/>
+          </a:fillRef>
+          <a:effectRef idx="0">
+            <a:schemeClr val="accent1"/>
+          </a:effectRef>
+          <a:fontRef idx="minor">
+            <a:schemeClr val="lt1"/>
+          </a:fontRef>
+        </p:style>
+        <p:txBody>
+          <a:bodyPr rtlCol="0" anchor="ctr"/>
+          <a:lstStyle/>
+          <a:p>
+            <a:pPr algn="ctr"/>
+            <a:endParaRPr lang="en-SG"/>
           </a:p>
         </p:txBody>
       </p:sp>
     </p:spTree>
     <p:extLst>
       <p:ext uri="{BB962C8B-B14F-4D97-AF65-F5344CB8AC3E}">
-        <p14:creationId xmlns:p14="http://schemas.microsoft.com/office/powerpoint/2010/main" val="1886720377"/>
+        <p14:creationId xmlns:p14="http://schemas.microsoft.com/office/powerpoint/2010/main" val="1805699913"/>
       </p:ext>
     </p:extLst>
   </p:cSld>
@@ -7986,7 +7888,7 @@
         </p:nvSpPr>
         <p:spPr>
           <a:xfrm rot="8126086">
-            <a:off x="2343304" y="2907663"/>
+            <a:off x="2343304" y="3525186"/>
             <a:ext cx="1469224" cy="1243504"/>
           </a:xfrm>
           <a:prstGeom prst="leftArrow">
@@ -8040,7 +7942,7 @@
         </p:nvCxnSpPr>
         <p:spPr>
           <a:xfrm>
-            <a:off x="1869150" y="2997432"/>
+            <a:off x="1869150" y="3614955"/>
             <a:ext cx="1257236" cy="3650"/>
           </a:xfrm>
           <a:prstGeom prst="line">
@@ -8073,7 +7975,7 @@
         </p:nvCxnSpPr>
         <p:spPr>
           <a:xfrm>
-            <a:off x="1869150" y="4264045"/>
+            <a:off x="1869150" y="4881568"/>
             <a:ext cx="1257236" cy="3650"/>
           </a:xfrm>
           <a:prstGeom prst="line">
@@ -8106,7 +8008,7 @@
         </p:nvCxnSpPr>
         <p:spPr>
           <a:xfrm flipH="1">
-            <a:off x="1997448" y="2990118"/>
+            <a:off x="1997448" y="3607641"/>
             <a:ext cx="15771" cy="1284890"/>
           </a:xfrm>
           <a:prstGeom prst="straightConnector1">
@@ -8140,7 +8042,7 @@
         </p:nvSpPr>
         <p:spPr>
           <a:xfrm>
-            <a:off x="609600" y="3449663"/>
+            <a:off x="609600" y="4067186"/>
             <a:ext cx="1415259" cy="369332"/>
           </a:xfrm>
           <a:prstGeom prst="rect">
@@ -8169,7 +8071,7 @@
         </p:nvSpPr>
         <p:spPr>
           <a:xfrm rot="2700000">
-            <a:off x="3187859" y="2558289"/>
+            <a:off x="3187859" y="3175812"/>
             <a:ext cx="1448923" cy="369332"/>
           </a:xfrm>
           <a:prstGeom prst="rect">
@@ -8198,7 +8100,7 @@
         </p:nvCxnSpPr>
         <p:spPr>
           <a:xfrm rot="18900000" flipH="1">
-            <a:off x="3715360" y="2269103"/>
+            <a:off x="3715360" y="2886626"/>
             <a:ext cx="15771" cy="1284888"/>
           </a:xfrm>
           <a:prstGeom prst="straightConnector1">
@@ -8497,6 +8399,178 @@
               <a:t>Explanation of visual vs actual height and width</a:t>
             </a:r>
             <a:endParaRPr lang="en-SG" dirty="0"/>
+          </a:p>
+        </p:txBody>
+      </p:sp>
+      <p:pic>
+        <p:nvPicPr>
+          <p:cNvPr id="1026" name="Picture 2" descr="https://lh5.googleusercontent.com/e52QBI65w_63LpqYdsltYt_qaLKmo1tjDfuULZaGk4diqWCge-Bkr2k5SDZnVGp2AnkiLcW3I59AQjb9wYNKW35-En3H076IbyAgDI2wyyhMmmotp53ljWF8VPBFI6RbyQvyUjlW"/>
+          <p:cNvPicPr>
+            <a:picLocks noChangeAspect="1" noChangeArrowheads="1"/>
+          </p:cNvPicPr>
+          <p:nvPr/>
+        </p:nvPicPr>
+        <p:blipFill>
+          <a:blip r:embed="rId2">
+            <a:extLst>
+              <a:ext uri="{28A0092B-C50C-407E-A947-70E740481C1C}">
+                <a14:useLocalDpi xmlns:a14="http://schemas.microsoft.com/office/drawing/2010/main" val="0"/>
+              </a:ext>
+            </a:extLst>
+          </a:blip>
+          <a:srcRect/>
+          <a:stretch>
+            <a:fillRect/>
+          </a:stretch>
+        </p:blipFill>
+        <p:spPr bwMode="auto">
+          <a:xfrm>
+            <a:off x="386843" y="457200"/>
+            <a:ext cx="2876550" cy="1905000"/>
+          </a:xfrm>
+          <a:prstGeom prst="rect">
+            <a:avLst/>
+          </a:prstGeom>
+          <a:noFill/>
+          <a:extLst>
+            <a:ext uri="{909E8E84-426E-40DD-AFC4-6F175D3DCCD1}">
+              <a14:hiddenFill xmlns:a14="http://schemas.microsoft.com/office/drawing/2010/main">
+                <a:solidFill>
+                  <a:srgbClr val="FFFFFF"/>
+                </a:solidFill>
+              </a14:hiddenFill>
+            </a:ext>
+          </a:extLst>
+        </p:spPr>
+      </p:pic>
+      <p:sp>
+        <p:nvSpPr>
+          <p:cNvPr id="21" name="TextBox 20"/>
+          <p:cNvSpPr txBox="1"/>
+          <p:nvPr/>
+        </p:nvSpPr>
+        <p:spPr>
+          <a:xfrm>
+            <a:off x="3066472" y="1727199"/>
+            <a:ext cx="1186222" cy="307777"/>
+          </a:xfrm>
+          <a:prstGeom prst="rect">
+            <a:avLst/>
+          </a:prstGeom>
+          <a:noFill/>
+        </p:spPr>
+        <p:txBody>
+          <a:bodyPr wrap="none" rtlCol="0">
+            <a:spAutoFit/>
+          </a:bodyPr>
+          <a:lstStyle/>
+          <a:p>
+            <a:r>
+              <a:rPr lang="en-US" sz="1400" dirty="0" smtClean="0">
+                <a:solidFill>
+                  <a:schemeClr val="bg1">
+                    <a:lumMod val="65000"/>
+                  </a:schemeClr>
+                </a:solidFill>
+              </a:rPr>
+              <a:t>Bounding box</a:t>
+            </a:r>
+            <a:endParaRPr lang="en-US" sz="1400" dirty="0">
+              <a:solidFill>
+                <a:schemeClr val="bg1">
+                  <a:lumMod val="65000"/>
+                </a:schemeClr>
+              </a:solidFill>
+            </a:endParaRPr>
+          </a:p>
+        </p:txBody>
+      </p:sp>
+      <p:sp>
+        <p:nvSpPr>
+          <p:cNvPr id="2" name="Freeform 1"/>
+          <p:cNvSpPr/>
+          <p:nvPr/>
+        </p:nvSpPr>
+        <p:spPr>
+          <a:xfrm>
+            <a:off x="2807855" y="1699491"/>
+            <a:ext cx="318531" cy="205509"/>
+          </a:xfrm>
+          <a:custGeom>
+            <a:avLst/>
+            <a:gdLst>
+              <a:gd name="connsiteX0" fmla="*/ 230909 w 230909"/>
+              <a:gd name="connsiteY0" fmla="*/ 92364 h 101251"/>
+              <a:gd name="connsiteX1" fmla="*/ 92363 w 230909"/>
+              <a:gd name="connsiteY1" fmla="*/ 92364 h 101251"/>
+              <a:gd name="connsiteX2" fmla="*/ 0 w 230909"/>
+              <a:gd name="connsiteY2" fmla="*/ 0 h 101251"/>
+            </a:gdLst>
+            <a:ahLst/>
+            <a:cxnLst>
+              <a:cxn ang="0">
+                <a:pos x="connsiteX0" y="connsiteY0"/>
+              </a:cxn>
+              <a:cxn ang="0">
+                <a:pos x="connsiteX1" y="connsiteY1"/>
+              </a:cxn>
+              <a:cxn ang="0">
+                <a:pos x="connsiteX2" y="connsiteY2"/>
+              </a:cxn>
+            </a:cxnLst>
+            <a:rect l="l" t="t" r="r" b="b"/>
+            <a:pathLst>
+              <a:path w="230909" h="101251">
+                <a:moveTo>
+                  <a:pt x="230909" y="92364"/>
+                </a:moveTo>
+                <a:cubicBezTo>
+                  <a:pt x="180878" y="100061"/>
+                  <a:pt x="130848" y="107758"/>
+                  <a:pt x="92363" y="92364"/>
+                </a:cubicBezTo>
+                <a:cubicBezTo>
+                  <a:pt x="53878" y="76970"/>
+                  <a:pt x="26939" y="38485"/>
+                  <a:pt x="0" y="0"/>
+                </a:cubicBezTo>
+              </a:path>
+            </a:pathLst>
+          </a:custGeom>
+          <a:noFill/>
+          <a:ln w="19050">
+            <a:solidFill>
+              <a:schemeClr val="bg1">
+                <a:lumMod val="75000"/>
+              </a:schemeClr>
+            </a:solidFill>
+            <a:prstDash val="sysDot"/>
+            <a:headEnd type="none" w="med" len="med"/>
+            <a:tailEnd type="arrow" w="med" len="med"/>
+          </a:ln>
+        </p:spPr>
+        <p:style>
+          <a:lnRef idx="2">
+            <a:schemeClr val="accent1">
+              <a:shade val="50000"/>
+            </a:schemeClr>
+          </a:lnRef>
+          <a:fillRef idx="1">
+            <a:schemeClr val="accent1"/>
+          </a:fillRef>
+          <a:effectRef idx="0">
+            <a:schemeClr val="accent1"/>
+          </a:effectRef>
+          <a:fontRef idx="minor">
+            <a:schemeClr val="lt1"/>
+          </a:fontRef>
+        </p:style>
+        <p:txBody>
+          <a:bodyPr rtlCol="0" anchor="ctr"/>
+          <a:lstStyle/>
+          <a:p>
+            <a:pPr algn="ctr"/>
+            <a:endParaRPr lang="en-SG"/>
           </a:p>
         </p:txBody>
       </p:sp>
@@ -11819,287 +11893,6 @@
 </p:sld>
 </file>
 
-<file path=ppt/slides/slide18.xml><?xml version="1.0" encoding="utf-8"?>
-<p:sld xmlns:a="http://schemas.openxmlformats.org/drawingml/2006/main" xmlns:r="http://schemas.openxmlformats.org/officeDocument/2006/relationships" xmlns:p="http://schemas.openxmlformats.org/presentationml/2006/main" show="0">
-  <p:cSld>
-    <p:spTree>
-      <p:nvGrpSpPr>
-        <p:cNvPr id="1" name=""/>
-        <p:cNvGrpSpPr/>
-        <p:nvPr/>
-      </p:nvGrpSpPr>
-      <p:grpSpPr>
-        <a:xfrm>
-          <a:off x="0" y="0"/>
-          <a:ext cx="0" cy="0"/>
-          <a:chOff x="0" y="0"/>
-          <a:chExt cx="0" cy="0"/>
-        </a:xfrm>
-      </p:grpSpPr>
-      <p:pic>
-        <p:nvPicPr>
-          <p:cNvPr id="5122" name="Picture 2" descr="C:\Users\dcsdcr\AppData\Local\Microsoft\Windows\Temporary Internet Files\Content.IE5\63QLKUF0\20130802_SiberianHusky_009[1].jpg"/>
-          <p:cNvPicPr>
-            <a:picLocks noChangeAspect="1" noChangeArrowheads="1"/>
-          </p:cNvPicPr>
-          <p:nvPr/>
-        </p:nvPicPr>
-        <p:blipFill rotWithShape="1">
-          <a:blip r:embed="rId2" cstate="print">
-            <a:extLst>
-              <a:ext uri="{28A0092B-C50C-407E-A947-70E740481C1C}">
-                <a14:useLocalDpi xmlns:a14="http://schemas.microsoft.com/office/drawing/2010/main" val="0"/>
-              </a:ext>
-            </a:extLst>
-          </a:blip>
-          <a:srcRect l="29838" r="34225" b="1155"/>
-          <a:stretch/>
-        </p:blipFill>
-        <p:spPr bwMode="auto">
-          <a:xfrm>
-            <a:off x="1447800" y="5257800"/>
-            <a:ext cx="1872065" cy="1012964"/>
-          </a:xfrm>
-          <a:prstGeom prst="rect">
-            <a:avLst/>
-          </a:prstGeom>
-          <a:noFill/>
-          <a:extLst>
-            <a:ext uri="{909E8E84-426E-40DD-AFC4-6F175D3DCCD1}">
-              <a14:hiddenFill xmlns:a14="http://schemas.microsoft.com/office/drawing/2010/main">
-                <a:solidFill>
-                  <a:srgbClr val="FFFFFF"/>
-                </a:solidFill>
-              </a14:hiddenFill>
-            </a:ext>
-          </a:extLst>
-        </p:spPr>
-      </p:pic>
-      <p:pic>
-        <p:nvPicPr>
-          <p:cNvPr id="15" name="Picture 2" descr="C:\Users\dcsdcr\AppData\Local\Microsoft\Windows\Temporary Internet Files\Content.IE5\63QLKUF0\20130802_SiberianHusky_009[1].jpg"/>
-          <p:cNvPicPr>
-            <a:picLocks noChangeAspect="1" noChangeArrowheads="1"/>
-          </p:cNvPicPr>
-          <p:nvPr/>
-        </p:nvPicPr>
-        <p:blipFill rotWithShape="1">
-          <a:blip r:embed="rId3" cstate="print">
-            <a:extLst>
-              <a:ext uri="{28A0092B-C50C-407E-A947-70E740481C1C}">
-                <a14:useLocalDpi xmlns:a14="http://schemas.microsoft.com/office/drawing/2010/main" val="0"/>
-              </a:ext>
-            </a:extLst>
-          </a:blip>
-          <a:srcRect l="29838" r="34225" b="1155"/>
-          <a:stretch/>
-        </p:blipFill>
-        <p:spPr bwMode="auto">
-          <a:xfrm>
-            <a:off x="1461654" y="228600"/>
-            <a:ext cx="1872065" cy="3218206"/>
-          </a:xfrm>
-          <a:prstGeom prst="rect">
-            <a:avLst/>
-          </a:prstGeom>
-          <a:noFill/>
-          <a:extLst>
-            <a:ext uri="{909E8E84-426E-40DD-AFC4-6F175D3DCCD1}">
-              <a14:hiddenFill xmlns:a14="http://schemas.microsoft.com/office/drawing/2010/main">
-                <a:solidFill>
-                  <a:srgbClr val="FFFFFF"/>
-                </a:solidFill>
-              </a14:hiddenFill>
-            </a:ext>
-          </a:extLst>
-        </p:spPr>
-      </p:pic>
-      <p:pic>
-        <p:nvPicPr>
-          <p:cNvPr id="16" name="Picture 2" descr="C:\Users\dcsdcr\AppData\Local\Microsoft\Windows\Temporary Internet Files\Content.IE5\63QLKUF0\20130802_SiberianHusky_009[1].jpg"/>
-          <p:cNvPicPr>
-            <a:picLocks noChangeAspect="1" noChangeArrowheads="1"/>
-          </p:cNvPicPr>
-          <p:nvPr/>
-        </p:nvPicPr>
-        <p:blipFill rotWithShape="1">
-          <a:blip r:embed="rId4" cstate="print">
-            <a:extLst>
-              <a:ext uri="{28A0092B-C50C-407E-A947-70E740481C1C}">
-                <a14:useLocalDpi xmlns:a14="http://schemas.microsoft.com/office/drawing/2010/main" val="0"/>
-              </a:ext>
-            </a:extLst>
-          </a:blip>
-          <a:srcRect l="29838" r="34225" b="1155"/>
-          <a:stretch/>
-        </p:blipFill>
-        <p:spPr bwMode="auto">
-          <a:xfrm>
-            <a:off x="6477000" y="5229694"/>
-            <a:ext cx="583495" cy="1003068"/>
-          </a:xfrm>
-          <a:prstGeom prst="rect">
-            <a:avLst/>
-          </a:prstGeom>
-          <a:noFill/>
-          <a:extLst>
-            <a:ext uri="{909E8E84-426E-40DD-AFC4-6F175D3DCCD1}">
-              <a14:hiddenFill xmlns:a14="http://schemas.microsoft.com/office/drawing/2010/main">
-                <a:solidFill>
-                  <a:srgbClr val="FFFFFF"/>
-                </a:solidFill>
-              </a14:hiddenFill>
-            </a:ext>
-          </a:extLst>
-        </p:spPr>
-      </p:pic>
-      <p:sp>
-        <p:nvSpPr>
-          <p:cNvPr id="12" name="TextBox 3"/>
-          <p:cNvSpPr txBox="1"/>
-          <p:nvPr/>
-        </p:nvSpPr>
-        <p:spPr>
-          <a:xfrm>
-            <a:off x="2667001" y="4038600"/>
-            <a:ext cx="1828800" cy="369332"/>
-          </a:xfrm>
-          <a:prstGeom prst="rect">
-            <a:avLst/>
-          </a:prstGeom>
-          <a:noFill/>
-        </p:spPr>
-        <p:txBody>
-          <a:bodyPr wrap="square" rtlCol="0">
-            <a:spAutoFit/>
-          </a:bodyPr>
-          <a:lstStyle/>
-          <a:p>
-            <a:r>
-              <a:rPr lang="en-US" dirty="0" smtClean="0"/>
-              <a:t>Un-squish height</a:t>
-            </a:r>
-            <a:endParaRPr lang="en-SG" dirty="0"/>
-          </a:p>
-        </p:txBody>
-      </p:sp>
-      <p:sp>
-        <p:nvSpPr>
-          <p:cNvPr id="13" name="TextBox 3"/>
-          <p:cNvSpPr txBox="1"/>
-          <p:nvPr/>
-        </p:nvSpPr>
-        <p:spPr>
-          <a:xfrm>
-            <a:off x="3962400" y="6048096"/>
-            <a:ext cx="1828800" cy="369332"/>
-          </a:xfrm>
-          <a:prstGeom prst="rect">
-            <a:avLst/>
-          </a:prstGeom>
-          <a:noFill/>
-        </p:spPr>
-        <p:txBody>
-          <a:bodyPr wrap="square" rtlCol="0">
-            <a:spAutoFit/>
-          </a:bodyPr>
-          <a:lstStyle/>
-          <a:p>
-            <a:r>
-              <a:rPr lang="en-US" dirty="0" smtClean="0"/>
-              <a:t>Un-squish width</a:t>
-            </a:r>
-            <a:endParaRPr lang="en-SG" dirty="0"/>
-          </a:p>
-        </p:txBody>
-      </p:sp>
-      <p:cxnSp>
-        <p:nvCxnSpPr>
-          <p:cNvPr id="3" name="Straight Arrow Connector 2"/>
-          <p:cNvCxnSpPr/>
-          <p:nvPr/>
-        </p:nvCxnSpPr>
-        <p:spPr>
-          <a:xfrm>
-            <a:off x="3581401" y="5731228"/>
-            <a:ext cx="2514599" cy="0"/>
-          </a:xfrm>
-          <a:prstGeom prst="straightConnector1">
-            <a:avLst/>
-          </a:prstGeom>
-          <a:ln>
-            <a:tailEnd type="arrow"/>
-          </a:ln>
-        </p:spPr>
-        <p:style>
-          <a:lnRef idx="1">
-            <a:schemeClr val="accent1"/>
-          </a:lnRef>
-          <a:fillRef idx="0">
-            <a:schemeClr val="accent1"/>
-          </a:fillRef>
-          <a:effectRef idx="0">
-            <a:schemeClr val="accent1"/>
-          </a:effectRef>
-          <a:fontRef idx="minor">
-            <a:schemeClr val="tx1"/>
-          </a:fontRef>
-        </p:style>
-      </p:cxnSp>
-      <p:cxnSp>
-        <p:nvCxnSpPr>
-          <p:cNvPr id="17" name="Straight Arrow Connector 16"/>
-          <p:cNvCxnSpPr/>
-          <p:nvPr/>
-        </p:nvCxnSpPr>
-        <p:spPr>
-          <a:xfrm flipV="1">
-            <a:off x="2397686" y="3733800"/>
-            <a:ext cx="0" cy="1295400"/>
-          </a:xfrm>
-          <a:prstGeom prst="straightConnector1">
-            <a:avLst/>
-          </a:prstGeom>
-          <a:ln>
-            <a:tailEnd type="arrow"/>
-          </a:ln>
-        </p:spPr>
-        <p:style>
-          <a:lnRef idx="1">
-            <a:schemeClr val="accent1"/>
-          </a:lnRef>
-          <a:fillRef idx="0">
-            <a:schemeClr val="accent1"/>
-          </a:fillRef>
-          <a:effectRef idx="0">
-            <a:schemeClr val="accent1"/>
-          </a:effectRef>
-          <a:fontRef idx="minor">
-            <a:schemeClr val="tx1"/>
-          </a:fontRef>
-        </p:style>
-      </p:cxnSp>
-    </p:spTree>
-    <p:extLst>
-      <p:ext uri="{BB962C8B-B14F-4D97-AF65-F5344CB8AC3E}">
-        <p14:creationId xmlns:p14="http://schemas.microsoft.com/office/powerpoint/2010/main" val="3818236580"/>
-      </p:ext>
-    </p:extLst>
-  </p:cSld>
-  <p:clrMapOvr>
-    <a:masterClrMapping/>
-  </p:clrMapOvr>
-  <mc:AlternateContent xmlns:mc="http://schemas.openxmlformats.org/markup-compatibility/2006" xmlns:p14="http://schemas.microsoft.com/office/powerpoint/2010/main">
-    <mc:Choice Requires="p14">
-      <p:transition spd="slow" p14:dur="2000"/>
-    </mc:Choice>
-    <mc:Fallback xmlns="">
-      <p:transition spd="slow"/>
-    </mc:Fallback>
-  </mc:AlternateContent>
-</p:sld>
-</file>
-
 <file path=ppt/slides/slide2.xml><?xml version="1.0" encoding="utf-8"?>
 <p:sld xmlns:a="http://schemas.openxmlformats.org/drawingml/2006/main" xmlns:r="http://schemas.openxmlformats.org/officeDocument/2006/relationships" xmlns:p="http://schemas.openxmlformats.org/presentationml/2006/main">
   <p:cSld>
@@ -14170,11 +13963,11 @@
   <p:clrMapOvr>
     <a:masterClrMapping/>
   </p:clrMapOvr>
-  <mc:AlternateContent xmlns:mc="http://schemas.openxmlformats.org/markup-compatibility/2006">
-    <mc:Choice xmlns:p14="http://schemas.microsoft.com/office/powerpoint/2010/main" Requires="p14">
+  <mc:AlternateContent xmlns:mc="http://schemas.openxmlformats.org/markup-compatibility/2006" xmlns:p14="http://schemas.microsoft.com/office/powerpoint/2010/main">
+    <mc:Choice Requires="p14">
       <p:transition spd="slow" p14:dur="2000"/>
     </mc:Choice>
-    <mc:Fallback>
+    <mc:Fallback xmlns="">
       <p:transition spd="slow"/>
     </mc:Fallback>
   </mc:AlternateContent>
@@ -14247,11 +14040,11 @@
   <p:clrMapOvr>
     <a:masterClrMapping/>
   </p:clrMapOvr>
-  <mc:AlternateContent xmlns:mc="http://schemas.openxmlformats.org/markup-compatibility/2006">
-    <mc:Choice xmlns:p14="http://schemas.microsoft.com/office/powerpoint/2010/main" Requires="p14">
+  <mc:AlternateContent xmlns:mc="http://schemas.openxmlformats.org/markup-compatibility/2006" xmlns:p14="http://schemas.microsoft.com/office/powerpoint/2010/main">
+    <mc:Choice Requires="p14">
       <p:transition spd="slow" p14:dur="2000"/>
     </mc:Choice>
-    <mc:Fallback>
+    <mc:Fallback xmlns="">
       <p:transition spd="slow"/>
     </mc:Fallback>
   </mc:AlternateContent>
@@ -15256,7 +15049,7 @@
   <a:extraClrSchemeLst/>
   <a:extLst>
     <a:ext uri="{05A4C25C-085E-4340-85A3-A5531E510DB2}">
-      <thm15:themeFamily xmlns:thm15="http://schemas.microsoft.com/office/thememl/2012/main" name="Office Theme" id="{62F939B6-93AF-4DB8-9C6B-D6C7DFDC589F}" vid="{4A3C46E8-61CC-4603-A589-7422A47A8E4A}"/>
+      <thm15:themeFamily xmlns="" xmlns:thm15="http://schemas.microsoft.com/office/thememl/2012/main" name="Office Theme" id="{62F939B6-93AF-4DB8-9C6B-D6C7DFDC589F}" vid="{4A3C46E8-61CC-4603-A589-7422A47A8E4A}"/>
     </a:ext>
   </a:extLst>
 </a:theme>

</xml_diff>